<commit_message>
Vizu can now request buzzer sound to robot. Help tab added
</commit_message>
<xml_diff>
--- a/docs/SwArchitecture.pptx
+++ b/docs/SwArchitecture.pptx
@@ -248,7 +248,7 @@
           <a:p>
             <a:fld id="{2782ACDD-568A-4D5B-9A72-61F2F85B1323}" type="datetimeFigureOut">
               <a:rPr lang="fr-FR" smtClean="0"/>
-              <a:t>16/03/2017</a:t>
+              <a:t>22/03/2017</a:t>
             </a:fld>
             <a:endParaRPr lang="fr-FR"/>
           </a:p>
@@ -416,7 +416,7 @@
           <a:p>
             <a:fld id="{2782ACDD-568A-4D5B-9A72-61F2F85B1323}" type="datetimeFigureOut">
               <a:rPr lang="fr-FR" smtClean="0"/>
-              <a:t>16/03/2017</a:t>
+              <a:t>22/03/2017</a:t>
             </a:fld>
             <a:endParaRPr lang="fr-FR"/>
           </a:p>
@@ -594,7 +594,7 @@
           <a:p>
             <a:fld id="{2782ACDD-568A-4D5B-9A72-61F2F85B1323}" type="datetimeFigureOut">
               <a:rPr lang="fr-FR" smtClean="0"/>
-              <a:t>16/03/2017</a:t>
+              <a:t>22/03/2017</a:t>
             </a:fld>
             <a:endParaRPr lang="fr-FR"/>
           </a:p>
@@ -762,7 +762,7 @@
           <a:p>
             <a:fld id="{2782ACDD-568A-4D5B-9A72-61F2F85B1323}" type="datetimeFigureOut">
               <a:rPr lang="fr-FR" smtClean="0"/>
-              <a:t>16/03/2017</a:t>
+              <a:t>22/03/2017</a:t>
             </a:fld>
             <a:endParaRPr lang="fr-FR"/>
           </a:p>
@@ -1007,7 +1007,7 @@
           <a:p>
             <a:fld id="{2782ACDD-568A-4D5B-9A72-61F2F85B1323}" type="datetimeFigureOut">
               <a:rPr lang="fr-FR" smtClean="0"/>
-              <a:t>16/03/2017</a:t>
+              <a:t>22/03/2017</a:t>
             </a:fld>
             <a:endParaRPr lang="fr-FR"/>
           </a:p>
@@ -1236,7 +1236,7 @@
           <a:p>
             <a:fld id="{2782ACDD-568A-4D5B-9A72-61F2F85B1323}" type="datetimeFigureOut">
               <a:rPr lang="fr-FR" smtClean="0"/>
-              <a:t>16/03/2017</a:t>
+              <a:t>22/03/2017</a:t>
             </a:fld>
             <a:endParaRPr lang="fr-FR"/>
           </a:p>
@@ -1600,7 +1600,7 @@
           <a:p>
             <a:fld id="{2782ACDD-568A-4D5B-9A72-61F2F85B1323}" type="datetimeFigureOut">
               <a:rPr lang="fr-FR" smtClean="0"/>
-              <a:t>16/03/2017</a:t>
+              <a:t>22/03/2017</a:t>
             </a:fld>
             <a:endParaRPr lang="fr-FR"/>
           </a:p>
@@ -1717,7 +1717,7 @@
           <a:p>
             <a:fld id="{2782ACDD-568A-4D5B-9A72-61F2F85B1323}" type="datetimeFigureOut">
               <a:rPr lang="fr-FR" smtClean="0"/>
-              <a:t>16/03/2017</a:t>
+              <a:t>22/03/2017</a:t>
             </a:fld>
             <a:endParaRPr lang="fr-FR"/>
           </a:p>
@@ -1812,7 +1812,7 @@
           <a:p>
             <a:fld id="{2782ACDD-568A-4D5B-9A72-61F2F85B1323}" type="datetimeFigureOut">
               <a:rPr lang="fr-FR" smtClean="0"/>
-              <a:t>16/03/2017</a:t>
+              <a:t>22/03/2017</a:t>
             </a:fld>
             <a:endParaRPr lang="fr-FR"/>
           </a:p>
@@ -2087,7 +2087,7 @@
           <a:p>
             <a:fld id="{2782ACDD-568A-4D5B-9A72-61F2F85B1323}" type="datetimeFigureOut">
               <a:rPr lang="fr-FR" smtClean="0"/>
-              <a:t>16/03/2017</a:t>
+              <a:t>22/03/2017</a:t>
             </a:fld>
             <a:endParaRPr lang="fr-FR"/>
           </a:p>
@@ -2339,7 +2339,7 @@
           <a:p>
             <a:fld id="{2782ACDD-568A-4D5B-9A72-61F2F85B1323}" type="datetimeFigureOut">
               <a:rPr lang="fr-FR" smtClean="0"/>
-              <a:t>16/03/2017</a:t>
+              <a:t>22/03/2017</a:t>
             </a:fld>
             <a:endParaRPr lang="fr-FR"/>
           </a:p>
@@ -2550,7 +2550,7 @@
           <a:p>
             <a:fld id="{2782ACDD-568A-4D5B-9A72-61F2F85B1323}" type="datetimeFigureOut">
               <a:rPr lang="fr-FR" smtClean="0"/>
-              <a:t>16/03/2017</a:t>
+              <a:t>22/03/2017</a:t>
             </a:fld>
             <a:endParaRPr lang="fr-FR"/>
           </a:p>
@@ -5480,14 +5480,14 @@
                 <a:gridCol w="2843689">
                   <a:extLst>
                     <a:ext uri="{9D8B030D-6E8A-4147-A177-3AD203B41FA5}">
-                      <a16:colId xmlns="" xmlns:a16="http://schemas.microsoft.com/office/drawing/2014/main" val="4249046580"/>
+                      <a16:colId xmlns:a16="http://schemas.microsoft.com/office/drawing/2014/main" xmlns="" val="4249046580"/>
                     </a:ext>
                   </a:extLst>
                 </a:gridCol>
                 <a:gridCol w="7116439">
                   <a:extLst>
                     <a:ext uri="{9D8B030D-6E8A-4147-A177-3AD203B41FA5}">
-                      <a16:colId xmlns="" xmlns:a16="http://schemas.microsoft.com/office/drawing/2014/main" val="2166689304"/>
+                      <a16:colId xmlns:a16="http://schemas.microsoft.com/office/drawing/2014/main" xmlns="" val="2166689304"/>
                     </a:ext>
                   </a:extLst>
                 </a:gridCol>
@@ -5523,7 +5523,7 @@
                 </a:tc>
                 <a:extLst>
                   <a:ext uri="{0D108BD9-81ED-4DB2-BD59-A6C34878D82A}">
-                    <a16:rowId xmlns="" xmlns:a16="http://schemas.microsoft.com/office/drawing/2014/main" val="1558262199"/>
+                    <a16:rowId xmlns:a16="http://schemas.microsoft.com/office/drawing/2014/main" xmlns="" val="1558262199"/>
                   </a:ext>
                 </a:extLst>
               </a:tr>
@@ -5562,7 +5562,7 @@
                 </a:tc>
                 <a:extLst>
                   <a:ext uri="{0D108BD9-81ED-4DB2-BD59-A6C34878D82A}">
-                    <a16:rowId xmlns="" xmlns:a16="http://schemas.microsoft.com/office/drawing/2014/main" val="3975330181"/>
+                    <a16:rowId xmlns:a16="http://schemas.microsoft.com/office/drawing/2014/main" xmlns="" val="3975330181"/>
                   </a:ext>
                 </a:extLst>
               </a:tr>
@@ -5643,7 +5643,7 @@
                 </a:tc>
                 <a:extLst>
                   <a:ext uri="{0D108BD9-81ED-4DB2-BD59-A6C34878D82A}">
-                    <a16:rowId xmlns="" xmlns:a16="http://schemas.microsoft.com/office/drawing/2014/main" val="145727790"/>
+                    <a16:rowId xmlns:a16="http://schemas.microsoft.com/office/drawing/2014/main" xmlns="" val="145727790"/>
                   </a:ext>
                 </a:extLst>
               </a:tr>
@@ -5678,7 +5678,7 @@
                 </a:tc>
                 <a:extLst>
                   <a:ext uri="{0D108BD9-81ED-4DB2-BD59-A6C34878D82A}">
-                    <a16:rowId xmlns="" xmlns:a16="http://schemas.microsoft.com/office/drawing/2014/main" val="1909270051"/>
+                    <a16:rowId xmlns:a16="http://schemas.microsoft.com/office/drawing/2014/main" xmlns="" val="1909270051"/>
                   </a:ext>
                 </a:extLst>
               </a:tr>
@@ -5741,7 +5741,7 @@
                 </a:tc>
                 <a:extLst>
                   <a:ext uri="{0D108BD9-81ED-4DB2-BD59-A6C34878D82A}">
-                    <a16:rowId xmlns="" xmlns:a16="http://schemas.microsoft.com/office/drawing/2014/main" val="1361958173"/>
+                    <a16:rowId xmlns:a16="http://schemas.microsoft.com/office/drawing/2014/main" xmlns="" val="1361958173"/>
                   </a:ext>
                 </a:extLst>
               </a:tr>
@@ -6293,14 +6293,14 @@
                 <a:gridCol w="2843689">
                   <a:extLst>
                     <a:ext uri="{9D8B030D-6E8A-4147-A177-3AD203B41FA5}">
-                      <a16:colId xmlns="" xmlns:a16="http://schemas.microsoft.com/office/drawing/2014/main" val="4249046580"/>
+                      <a16:colId xmlns:a16="http://schemas.microsoft.com/office/drawing/2014/main" xmlns="" val="4249046580"/>
                     </a:ext>
                   </a:extLst>
                 </a:gridCol>
                 <a:gridCol w="7116439">
                   <a:extLst>
                     <a:ext uri="{9D8B030D-6E8A-4147-A177-3AD203B41FA5}">
-                      <a16:colId xmlns="" xmlns:a16="http://schemas.microsoft.com/office/drawing/2014/main" val="2166689304"/>
+                      <a16:colId xmlns:a16="http://schemas.microsoft.com/office/drawing/2014/main" xmlns="" val="2166689304"/>
                     </a:ext>
                   </a:extLst>
                 </a:gridCol>
@@ -6336,7 +6336,7 @@
                 </a:tc>
                 <a:extLst>
                   <a:ext uri="{0D108BD9-81ED-4DB2-BD59-A6C34878D82A}">
-                    <a16:rowId xmlns="" xmlns:a16="http://schemas.microsoft.com/office/drawing/2014/main" val="1558262199"/>
+                    <a16:rowId xmlns:a16="http://schemas.microsoft.com/office/drawing/2014/main" xmlns="" val="1558262199"/>
                   </a:ext>
                 </a:extLst>
               </a:tr>
@@ -6393,7 +6393,7 @@
                 </a:tc>
                 <a:extLst>
                   <a:ext uri="{0D108BD9-81ED-4DB2-BD59-A6C34878D82A}">
-                    <a16:rowId xmlns="" xmlns:a16="http://schemas.microsoft.com/office/drawing/2014/main" val="3975330181"/>
+                    <a16:rowId xmlns:a16="http://schemas.microsoft.com/office/drawing/2014/main" xmlns="" val="3975330181"/>
                   </a:ext>
                 </a:extLst>
               </a:tr>
@@ -6506,7 +6506,7 @@
                 </a:tc>
                 <a:extLst>
                   <a:ext uri="{0D108BD9-81ED-4DB2-BD59-A6C34878D82A}">
-                    <a16:rowId xmlns="" xmlns:a16="http://schemas.microsoft.com/office/drawing/2014/main" val="145727790"/>
+                    <a16:rowId xmlns:a16="http://schemas.microsoft.com/office/drawing/2014/main" xmlns="" val="145727790"/>
                   </a:ext>
                 </a:extLst>
               </a:tr>
@@ -6549,7 +6549,7 @@
                 </a:tc>
                 <a:extLst>
                   <a:ext uri="{0D108BD9-81ED-4DB2-BD59-A6C34878D82A}">
-                    <a16:rowId xmlns="" xmlns:a16="http://schemas.microsoft.com/office/drawing/2014/main" val="1909270051"/>
+                    <a16:rowId xmlns:a16="http://schemas.microsoft.com/office/drawing/2014/main" xmlns="" val="1909270051"/>
                   </a:ext>
                 </a:extLst>
               </a:tr>
@@ -6584,7 +6584,7 @@
                 </a:tc>
                 <a:extLst>
                   <a:ext uri="{0D108BD9-81ED-4DB2-BD59-A6C34878D82A}">
-                    <a16:rowId xmlns="" xmlns:a16="http://schemas.microsoft.com/office/drawing/2014/main" val="1361958173"/>
+                    <a16:rowId xmlns:a16="http://schemas.microsoft.com/office/drawing/2014/main" xmlns="" val="1361958173"/>
                   </a:ext>
                 </a:extLst>
               </a:tr>
@@ -7999,14 +7999,14 @@
                 <a:gridCol w="2843689">
                   <a:extLst>
                     <a:ext uri="{9D8B030D-6E8A-4147-A177-3AD203B41FA5}">
-                      <a16:colId xmlns="" xmlns:a16="http://schemas.microsoft.com/office/drawing/2014/main" val="4249046580"/>
+                      <a16:colId xmlns:a16="http://schemas.microsoft.com/office/drawing/2014/main" xmlns="" val="4249046580"/>
                     </a:ext>
                   </a:extLst>
                 </a:gridCol>
                 <a:gridCol w="7116439">
                   <a:extLst>
                     <a:ext uri="{9D8B030D-6E8A-4147-A177-3AD203B41FA5}">
-                      <a16:colId xmlns="" xmlns:a16="http://schemas.microsoft.com/office/drawing/2014/main" val="2166689304"/>
+                      <a16:colId xmlns:a16="http://schemas.microsoft.com/office/drawing/2014/main" xmlns="" val="2166689304"/>
                     </a:ext>
                   </a:extLst>
                 </a:gridCol>
@@ -8042,7 +8042,7 @@
                 </a:tc>
                 <a:extLst>
                   <a:ext uri="{0D108BD9-81ED-4DB2-BD59-A6C34878D82A}">
-                    <a16:rowId xmlns="" xmlns:a16="http://schemas.microsoft.com/office/drawing/2014/main" val="1558262199"/>
+                    <a16:rowId xmlns:a16="http://schemas.microsoft.com/office/drawing/2014/main" xmlns="" val="1558262199"/>
                   </a:ext>
                 </a:extLst>
               </a:tr>
@@ -8089,7 +8089,7 @@
                 </a:tc>
                 <a:extLst>
                   <a:ext uri="{0D108BD9-81ED-4DB2-BD59-A6C34878D82A}">
-                    <a16:rowId xmlns="" xmlns:a16="http://schemas.microsoft.com/office/drawing/2014/main" val="3975330181"/>
+                    <a16:rowId xmlns:a16="http://schemas.microsoft.com/office/drawing/2014/main" xmlns="" val="3975330181"/>
                   </a:ext>
                 </a:extLst>
               </a:tr>
@@ -8170,7 +8170,7 @@
                 </a:tc>
                 <a:extLst>
                   <a:ext uri="{0D108BD9-81ED-4DB2-BD59-A6C34878D82A}">
-                    <a16:rowId xmlns="" xmlns:a16="http://schemas.microsoft.com/office/drawing/2014/main" val="145727790"/>
+                    <a16:rowId xmlns:a16="http://schemas.microsoft.com/office/drawing/2014/main" xmlns="" val="145727790"/>
                   </a:ext>
                 </a:extLst>
               </a:tr>
@@ -8205,7 +8205,7 @@
                 </a:tc>
                 <a:extLst>
                   <a:ext uri="{0D108BD9-81ED-4DB2-BD59-A6C34878D82A}">
-                    <a16:rowId xmlns="" xmlns:a16="http://schemas.microsoft.com/office/drawing/2014/main" val="1909270051"/>
+                    <a16:rowId xmlns:a16="http://schemas.microsoft.com/office/drawing/2014/main" xmlns="" val="1909270051"/>
                   </a:ext>
                 </a:extLst>
               </a:tr>
@@ -8405,7 +8405,7 @@
                 </a:tc>
                 <a:extLst>
                   <a:ext uri="{0D108BD9-81ED-4DB2-BD59-A6C34878D82A}">
-                    <a16:rowId xmlns="" xmlns:a16="http://schemas.microsoft.com/office/drawing/2014/main" val="1361958173"/>
+                    <a16:rowId xmlns:a16="http://schemas.microsoft.com/office/drawing/2014/main" xmlns="" val="1361958173"/>
                   </a:ext>
                 </a:extLst>
               </a:tr>
@@ -8608,14 +8608,14 @@
                 <a:gridCol w="2843689">
                   <a:extLst>
                     <a:ext uri="{9D8B030D-6E8A-4147-A177-3AD203B41FA5}">
-                      <a16:colId xmlns="" xmlns:a16="http://schemas.microsoft.com/office/drawing/2014/main" val="4249046580"/>
+                      <a16:colId xmlns:a16="http://schemas.microsoft.com/office/drawing/2014/main" xmlns="" val="4249046580"/>
                     </a:ext>
                   </a:extLst>
                 </a:gridCol>
                 <a:gridCol w="7116439">
                   <a:extLst>
                     <a:ext uri="{9D8B030D-6E8A-4147-A177-3AD203B41FA5}">
-                      <a16:colId xmlns="" xmlns:a16="http://schemas.microsoft.com/office/drawing/2014/main" val="2166689304"/>
+                      <a16:colId xmlns:a16="http://schemas.microsoft.com/office/drawing/2014/main" xmlns="" val="2166689304"/>
                     </a:ext>
                   </a:extLst>
                 </a:gridCol>
@@ -8651,7 +8651,7 @@
                 </a:tc>
                 <a:extLst>
                   <a:ext uri="{0D108BD9-81ED-4DB2-BD59-A6C34878D82A}">
-                    <a16:rowId xmlns="" xmlns:a16="http://schemas.microsoft.com/office/drawing/2014/main" val="1558262199"/>
+                    <a16:rowId xmlns:a16="http://schemas.microsoft.com/office/drawing/2014/main" xmlns="" val="1558262199"/>
                   </a:ext>
                 </a:extLst>
               </a:tr>
@@ -8690,7 +8690,7 @@
                 </a:tc>
                 <a:extLst>
                   <a:ext uri="{0D108BD9-81ED-4DB2-BD59-A6C34878D82A}">
-                    <a16:rowId xmlns="" xmlns:a16="http://schemas.microsoft.com/office/drawing/2014/main" val="3975330181"/>
+                    <a16:rowId xmlns:a16="http://schemas.microsoft.com/office/drawing/2014/main" xmlns="" val="3975330181"/>
                   </a:ext>
                 </a:extLst>
               </a:tr>
@@ -8759,7 +8759,7 @@
                 </a:tc>
                 <a:extLst>
                   <a:ext uri="{0D108BD9-81ED-4DB2-BD59-A6C34878D82A}">
-                    <a16:rowId xmlns="" xmlns:a16="http://schemas.microsoft.com/office/drawing/2014/main" val="145727790"/>
+                    <a16:rowId xmlns:a16="http://schemas.microsoft.com/office/drawing/2014/main" xmlns="" val="145727790"/>
                   </a:ext>
                 </a:extLst>
               </a:tr>
@@ -8814,7 +8814,7 @@
                 </a:tc>
                 <a:extLst>
                   <a:ext uri="{0D108BD9-81ED-4DB2-BD59-A6C34878D82A}">
-                    <a16:rowId xmlns="" xmlns:a16="http://schemas.microsoft.com/office/drawing/2014/main" val="1909270051"/>
+                    <a16:rowId xmlns:a16="http://schemas.microsoft.com/office/drawing/2014/main" xmlns="" val="1909270051"/>
                   </a:ext>
                 </a:extLst>
               </a:tr>
@@ -8891,14 +8891,14 @@
           <p:nvPr>
             <p:extLst>
               <p:ext uri="{D42A27DB-BD31-4B8C-83A1-F6EECF244321}">
-                <p14:modId xmlns:p14="http://schemas.microsoft.com/office/powerpoint/2010/main" val="1147345377"/>
+                <p14:modId xmlns:p14="http://schemas.microsoft.com/office/powerpoint/2010/main" val="3869567937"/>
               </p:ext>
             </p:extLst>
           </p:nvPr>
         </p:nvGraphicFramePr>
         <p:xfrm>
           <a:off x="977900" y="2463799"/>
-          <a:ext cx="10541000" cy="3926906"/>
+          <a:ext cx="10375901" cy="3980071"/>
         </p:xfrm>
         <a:graphic>
           <a:graphicData uri="http://schemas.openxmlformats.org/drawingml/2006/table">
@@ -8907,136 +8907,136 @@
                 <a:tableStyleId>{69C7853C-536D-4A76-A0AE-DD22124D55A5}</a:tableStyleId>
               </a:tblPr>
               <a:tblGrid>
-                <a:gridCol w="1311553"/>
-                <a:gridCol w="2301597"/>
-                <a:gridCol w="2178050"/>
-                <a:gridCol w="4749800"/>
+                <a:gridCol w="1291011"/>
+                <a:gridCol w="2265548"/>
+                <a:gridCol w="2143936"/>
+                <a:gridCol w="4675406"/>
               </a:tblGrid>
-              <a:tr h="251085">
-                <a:tc>
-                  <a:txBody>
-                    <a:bodyPr/>
-                    <a:lstStyle/>
-                    <a:p>
-                      <a:r>
-                        <a:rPr lang="en-US" sz="1100" dirty="0" smtClean="0"/>
+              <a:tr h="223178">
+                <a:tc>
+                  <a:txBody>
+                    <a:bodyPr/>
+                    <a:lstStyle/>
+                    <a:p>
+                      <a:r>
+                        <a:rPr lang="en-US" sz="1050" dirty="0" smtClean="0"/>
                         <a:t>Type</a:t>
                       </a:r>
-                      <a:endParaRPr lang="fr-FR" sz="1100" dirty="0"/>
-                    </a:p>
-                  </a:txBody>
-                  <a:tcPr/>
-                </a:tc>
-                <a:tc>
-                  <a:txBody>
-                    <a:bodyPr/>
-                    <a:lstStyle/>
-                    <a:p>
-                      <a:r>
-                        <a:rPr lang="en-US" sz="1100" dirty="0" smtClean="0"/>
+                      <a:endParaRPr lang="fr-FR" sz="1050" dirty="0"/>
+                    </a:p>
+                  </a:txBody>
+                  <a:tcPr/>
+                </a:tc>
+                <a:tc>
+                  <a:txBody>
+                    <a:bodyPr/>
+                    <a:lstStyle/>
+                    <a:p>
+                      <a:r>
+                        <a:rPr lang="en-US" sz="1050" dirty="0" smtClean="0"/>
                         <a:t>Function</a:t>
                       </a:r>
-                      <a:endParaRPr lang="fr-FR" sz="1100" dirty="0"/>
-                    </a:p>
-                  </a:txBody>
-                  <a:tcPr/>
-                </a:tc>
-                <a:tc>
-                  <a:txBody>
-                    <a:bodyPr/>
-                    <a:lstStyle/>
-                    <a:p>
-                      <a:r>
-                        <a:rPr lang="en-US" sz="1100" dirty="0" err="1" smtClean="0"/>
+                      <a:endParaRPr lang="fr-FR" sz="1050" dirty="0"/>
+                    </a:p>
+                  </a:txBody>
+                  <a:tcPr/>
+                </a:tc>
+                <a:tc>
+                  <a:txBody>
+                    <a:bodyPr/>
+                    <a:lstStyle/>
+                    <a:p>
+                      <a:r>
+                        <a:rPr lang="en-US" sz="1050" dirty="0" err="1" smtClean="0"/>
                         <a:t>Occurence</a:t>
                       </a:r>
-                      <a:endParaRPr lang="fr-FR" sz="1100" dirty="0"/>
-                    </a:p>
-                  </a:txBody>
-                  <a:tcPr/>
-                </a:tc>
-                <a:tc>
-                  <a:txBody>
-                    <a:bodyPr/>
-                    <a:lstStyle/>
-                    <a:p>
-                      <a:r>
-                        <a:rPr lang="en-US" sz="1100" dirty="0" smtClean="0"/>
+                      <a:endParaRPr lang="fr-FR" sz="1050" dirty="0"/>
+                    </a:p>
+                  </a:txBody>
+                  <a:tcPr/>
+                </a:tc>
+                <a:tc>
+                  <a:txBody>
+                    <a:bodyPr/>
+                    <a:lstStyle/>
+                    <a:p>
+                      <a:r>
+                        <a:rPr lang="en-US" sz="1050" dirty="0" smtClean="0"/>
                         <a:t>Content</a:t>
                       </a:r>
-                      <a:endParaRPr lang="fr-FR" sz="1100" dirty="0"/>
+                      <a:endParaRPr lang="fr-FR" sz="1050" dirty="0"/>
                     </a:p>
                   </a:txBody>
                   <a:tcPr/>
                 </a:tc>
               </a:tr>
-              <a:tr h="251085">
-                <a:tc>
-                  <a:txBody>
-                    <a:bodyPr/>
-                    <a:lstStyle/>
-                    <a:p>
-                      <a:r>
-                        <a:rPr lang="en-US" sz="1100" dirty="0" smtClean="0"/>
+              <a:tr h="223178">
+                <a:tc>
+                  <a:txBody>
+                    <a:bodyPr/>
+                    <a:lstStyle/>
+                    <a:p>
+                      <a:r>
+                        <a:rPr lang="en-US" sz="1050" dirty="0" smtClean="0"/>
                         <a:t>IT</a:t>
                       </a:r>
-                      <a:endParaRPr lang="fr-FR" sz="1100" dirty="0"/>
-                    </a:p>
-                  </a:txBody>
-                  <a:tcPr/>
-                </a:tc>
-                <a:tc>
-                  <a:txBody>
-                    <a:bodyPr/>
-                    <a:lstStyle/>
-                    <a:p>
-                      <a:r>
-                        <a:rPr lang="fr-FR" sz="1100" dirty="0" err="1" smtClean="0"/>
+                      <a:endParaRPr lang="fr-FR" sz="1050" dirty="0"/>
+                    </a:p>
+                  </a:txBody>
+                  <a:tcPr/>
+                </a:tc>
+                <a:tc>
+                  <a:txBody>
+                    <a:bodyPr/>
+                    <a:lstStyle/>
+                    <a:p>
+                      <a:r>
+                        <a:rPr lang="fr-FR" sz="1050" dirty="0" err="1" smtClean="0"/>
                         <a:t>veryFast_interrupt</a:t>
                       </a:r>
-                      <a:endParaRPr lang="fr-FR" sz="1100" dirty="0"/>
-                    </a:p>
-                  </a:txBody>
-                  <a:tcPr/>
-                </a:tc>
-                <a:tc>
-                  <a:txBody>
-                    <a:bodyPr/>
-                    <a:lstStyle/>
-                    <a:p>
-                      <a:r>
-                        <a:rPr lang="en-US" sz="1100" dirty="0" smtClean="0"/>
+                      <a:endParaRPr lang="fr-FR" sz="1050" dirty="0"/>
+                    </a:p>
+                  </a:txBody>
+                  <a:tcPr/>
+                </a:tc>
+                <a:tc>
+                  <a:txBody>
+                    <a:bodyPr/>
+                    <a:lstStyle/>
+                    <a:p>
+                      <a:r>
+                        <a:rPr lang="en-US" sz="1050" dirty="0" smtClean="0"/>
                         <a:t>Period :</a:t>
                       </a:r>
                       <a:r>
-                        <a:rPr lang="en-US" sz="1100" baseline="0" dirty="0" smtClean="0"/>
+                        <a:rPr lang="en-US" sz="1050" baseline="0" dirty="0" smtClean="0"/>
                         <a:t> 50 u</a:t>
                       </a:r>
                       <a:r>
-                        <a:rPr lang="en-US" sz="1100" dirty="0" smtClean="0"/>
+                        <a:rPr lang="en-US" sz="1050" dirty="0" smtClean="0"/>
                         <a:t>s</a:t>
                       </a:r>
-                      <a:endParaRPr lang="fr-FR" sz="1100" dirty="0"/>
-                    </a:p>
-                  </a:txBody>
-                  <a:tcPr/>
-                </a:tc>
-                <a:tc>
-                  <a:txBody>
-                    <a:bodyPr/>
-                    <a:lstStyle/>
-                    <a:p>
-                      <a:r>
-                        <a:rPr lang="en-US" sz="1100" dirty="0" smtClean="0"/>
+                      <a:endParaRPr lang="fr-FR" sz="1050" dirty="0"/>
+                    </a:p>
+                  </a:txBody>
+                  <a:tcPr/>
+                </a:tc>
+                <a:tc>
+                  <a:txBody>
+                    <a:bodyPr/>
+                    <a:lstStyle/>
+                    <a:p>
+                      <a:r>
+                        <a:rPr lang="en-US" sz="1050" dirty="0" smtClean="0"/>
                         <a:t>Stepper motor commands.</a:t>
                       </a:r>
-                      <a:endParaRPr lang="fr-FR" sz="1100" dirty="0"/>
+                      <a:endParaRPr lang="fr-FR" sz="1050" dirty="0"/>
                     </a:p>
                   </a:txBody>
                   <a:tcPr/>
                 </a:tc>
               </a:tr>
-              <a:tr h="251085">
+              <a:tr h="223178">
                 <a:tc>
                   <a:txBody>
                     <a:bodyPr/>
@@ -9060,163 +9060,163 @@
                         <a:defRPr/>
                       </a:pPr>
                       <a:r>
-                        <a:rPr lang="en-US" sz="1100" dirty="0" smtClean="0"/>
+                        <a:rPr lang="en-US" sz="1050" dirty="0" smtClean="0"/>
                         <a:t>IT</a:t>
                       </a:r>
-                      <a:endParaRPr lang="fr-FR" sz="1100" dirty="0" smtClean="0"/>
-                    </a:p>
-                  </a:txBody>
-                  <a:tcPr/>
-                </a:tc>
-                <a:tc>
-                  <a:txBody>
-                    <a:bodyPr/>
-                    <a:lstStyle/>
-                    <a:p>
-                      <a:r>
-                        <a:rPr lang="fr-FR" sz="1100" dirty="0" err="1" smtClean="0"/>
+                      <a:endParaRPr lang="fr-FR" sz="1050" dirty="0" smtClean="0"/>
+                    </a:p>
+                  </a:txBody>
+                  <a:tcPr/>
+                </a:tc>
+                <a:tc>
+                  <a:txBody>
+                    <a:bodyPr/>
+                    <a:lstStyle/>
+                    <a:p>
+                      <a:r>
+                        <a:rPr lang="fr-FR" sz="1050" dirty="0" err="1" smtClean="0"/>
                         <a:t>fast_interrupt</a:t>
                       </a:r>
-                      <a:endParaRPr lang="fr-FR" sz="1100" dirty="0"/>
-                    </a:p>
-                  </a:txBody>
-                  <a:tcPr/>
-                </a:tc>
-                <a:tc>
-                  <a:txBody>
-                    <a:bodyPr/>
-                    <a:lstStyle/>
-                    <a:p>
-                      <a:r>
-                        <a:rPr lang="en-US" sz="1100" dirty="0" smtClean="0"/>
+                      <a:endParaRPr lang="fr-FR" sz="1050" dirty="0"/>
+                    </a:p>
+                  </a:txBody>
+                  <a:tcPr/>
+                </a:tc>
+                <a:tc>
+                  <a:txBody>
+                    <a:bodyPr/>
+                    <a:lstStyle/>
+                    <a:p>
+                      <a:r>
+                        <a:rPr lang="en-US" sz="1050" dirty="0" smtClean="0"/>
                         <a:t>Period : 1 </a:t>
                       </a:r>
                       <a:r>
-                        <a:rPr lang="en-US" sz="1100" dirty="0" err="1" smtClean="0"/>
+                        <a:rPr lang="en-US" sz="1050" dirty="0" err="1" smtClean="0"/>
                         <a:t>ms</a:t>
                       </a:r>
-                      <a:endParaRPr lang="fr-FR" sz="1100" dirty="0"/>
-                    </a:p>
-                  </a:txBody>
-                  <a:tcPr/>
-                </a:tc>
-                <a:tc>
-                  <a:txBody>
-                    <a:bodyPr/>
-                    <a:lstStyle/>
-                    <a:p>
-                      <a:r>
-                        <a:rPr lang="en-US" sz="1100" dirty="0" smtClean="0"/>
+                      <a:endParaRPr lang="fr-FR" sz="1050" dirty="0"/>
+                    </a:p>
+                  </a:txBody>
+                  <a:tcPr/>
+                </a:tc>
+                <a:tc>
+                  <a:txBody>
+                    <a:bodyPr/>
+                    <a:lstStyle/>
+                    <a:p>
+                      <a:r>
+                        <a:rPr lang="en-US" sz="1050" dirty="0" smtClean="0"/>
                         <a:t>SW GPIO filters.</a:t>
                       </a:r>
-                      <a:endParaRPr lang="fr-FR" sz="1100" dirty="0"/>
+                      <a:endParaRPr lang="fr-FR" sz="1050" dirty="0"/>
                     </a:p>
                   </a:txBody>
                   <a:tcPr/>
                 </a:tc>
               </a:tr>
-              <a:tr h="439399">
-                <a:tc>
-                  <a:txBody>
-                    <a:bodyPr/>
-                    <a:lstStyle/>
-                    <a:p>
-                      <a:r>
-                        <a:rPr lang="en-US" sz="1100" dirty="0" smtClean="0"/>
+              <a:tr h="389978">
+                <a:tc>
+                  <a:txBody>
+                    <a:bodyPr/>
+                    <a:lstStyle/>
+                    <a:p>
+                      <a:r>
+                        <a:rPr lang="en-US" sz="1050" dirty="0" smtClean="0"/>
                         <a:t>IT</a:t>
                       </a:r>
-                      <a:endParaRPr lang="fr-FR" sz="1100" dirty="0"/>
-                    </a:p>
-                  </a:txBody>
-                  <a:tcPr/>
-                </a:tc>
-                <a:tc>
-                  <a:txBody>
-                    <a:bodyPr/>
-                    <a:lstStyle/>
-                    <a:p>
-                      <a:r>
-                        <a:rPr lang="fr-FR" sz="1100" dirty="0" err="1" smtClean="0"/>
+                      <a:endParaRPr lang="fr-FR" sz="1050" dirty="0"/>
+                    </a:p>
+                  </a:txBody>
+                  <a:tcPr/>
+                </a:tc>
+                <a:tc>
+                  <a:txBody>
+                    <a:bodyPr/>
+                    <a:lstStyle/>
+                    <a:p>
+                      <a:r>
+                        <a:rPr lang="fr-FR" sz="1050" dirty="0" err="1" smtClean="0"/>
                         <a:t>ArdUART</a:t>
                       </a:r>
                       <a:r>
-                        <a:rPr lang="fr-FR" sz="1100" dirty="0" smtClean="0"/>
+                        <a:rPr lang="fr-FR" sz="1050" dirty="0" smtClean="0"/>
                         <a:t>::</a:t>
                       </a:r>
                       <a:r>
-                        <a:rPr lang="fr-FR" sz="1100" dirty="0" err="1" smtClean="0"/>
+                        <a:rPr lang="fr-FR" sz="1050" dirty="0" err="1" smtClean="0"/>
                         <a:t>IrqHandler</a:t>
                       </a:r>
-                      <a:endParaRPr lang="fr-FR" sz="1100" dirty="0"/>
-                    </a:p>
-                  </a:txBody>
-                  <a:tcPr/>
-                </a:tc>
-                <a:tc>
-                  <a:txBody>
-                    <a:bodyPr/>
-                    <a:lstStyle/>
-                    <a:p>
-                      <a:r>
-                        <a:rPr lang="en-US" sz="1100" dirty="0" smtClean="0"/>
+                      <a:endParaRPr lang="fr-FR" sz="1050" dirty="0"/>
+                    </a:p>
+                  </a:txBody>
+                  <a:tcPr/>
+                </a:tc>
+                <a:tc>
+                  <a:txBody>
+                    <a:bodyPr/>
+                    <a:lstStyle/>
+                    <a:p>
+                      <a:r>
+                        <a:rPr lang="en-US" sz="1050" dirty="0" smtClean="0"/>
                         <a:t>Every byte sent</a:t>
                       </a:r>
                     </a:p>
                     <a:p>
                       <a:r>
-                        <a:rPr lang="en-US" sz="1100" dirty="0" smtClean="0"/>
+                        <a:rPr lang="en-US" sz="1050" dirty="0" smtClean="0"/>
                         <a:t>Every byte received</a:t>
                       </a:r>
-                      <a:endParaRPr lang="fr-FR" sz="1100" dirty="0"/>
-                    </a:p>
-                  </a:txBody>
-                  <a:tcPr/>
-                </a:tc>
-                <a:tc>
-                  <a:txBody>
-                    <a:bodyPr/>
-                    <a:lstStyle/>
-                    <a:p>
-                      <a:r>
-                        <a:rPr lang="en-US" sz="1100" dirty="0" smtClean="0"/>
+                      <a:endParaRPr lang="fr-FR" sz="1050" dirty="0"/>
+                    </a:p>
+                  </a:txBody>
+                  <a:tcPr/>
+                </a:tc>
+                <a:tc>
+                  <a:txBody>
+                    <a:bodyPr/>
+                    <a:lstStyle/>
+                    <a:p>
+                      <a:r>
+                        <a:rPr lang="en-US" sz="1050" dirty="0" smtClean="0"/>
                         <a:t>Read/Send UART</a:t>
                       </a:r>
                       <a:r>
-                        <a:rPr lang="en-US" sz="1100" baseline="0" dirty="0" smtClean="0"/>
+                        <a:rPr lang="en-US" sz="1050" baseline="0" dirty="0" smtClean="0"/>
                         <a:t> </a:t>
                       </a:r>
                       <a:r>
-                        <a:rPr lang="en-US" sz="1100" dirty="0" smtClean="0"/>
+                        <a:rPr lang="en-US" sz="1050" dirty="0" smtClean="0"/>
                         <a:t>data.</a:t>
                       </a:r>
-                      <a:endParaRPr lang="fr-FR" sz="1100" dirty="0"/>
+                      <a:endParaRPr lang="fr-FR" sz="1050" dirty="0"/>
                     </a:p>
                   </a:txBody>
                   <a:tcPr/>
                 </a:tc>
               </a:tr>
-              <a:tr h="251085">
-                <a:tc>
-                  <a:txBody>
-                    <a:bodyPr/>
-                    <a:lstStyle/>
-                    <a:p>
-                      <a:r>
-                        <a:rPr lang="en-US" sz="1100" dirty="0" smtClean="0"/>
+              <a:tr h="223178">
+                <a:tc>
+                  <a:txBody>
+                    <a:bodyPr/>
+                    <a:lstStyle/>
+                    <a:p>
+                      <a:r>
+                        <a:rPr lang="en-US" sz="1050" dirty="0" smtClean="0"/>
                         <a:t>IT</a:t>
                       </a:r>
-                      <a:endParaRPr lang="fr-FR" sz="1100" dirty="0"/>
-                    </a:p>
-                  </a:txBody>
-                  <a:tcPr/>
-                </a:tc>
-                <a:tc>
-                  <a:txBody>
-                    <a:bodyPr/>
-                    <a:lstStyle/>
-                    <a:p>
-                      <a:r>
-                        <a:rPr lang="fr-FR" sz="1100" kern="1200" dirty="0" err="1" smtClean="0">
+                      <a:endParaRPr lang="fr-FR" sz="1050" dirty="0"/>
+                    </a:p>
+                  </a:txBody>
+                  <a:tcPr/>
+                </a:tc>
+                <a:tc>
+                  <a:txBody>
+                    <a:bodyPr/>
+                    <a:lstStyle/>
+                    <a:p>
+                      <a:r>
+                        <a:rPr lang="fr-FR" sz="1050" kern="1200" dirty="0" err="1" smtClean="0">
                           <a:solidFill>
                             <a:schemeClr val="dk1"/>
                           </a:solidFill>
@@ -9226,18 +9226,18 @@
                         </a:rPr>
                         <a:t>Servo_Handler</a:t>
                       </a:r>
-                      <a:endParaRPr lang="fr-FR" sz="1100" dirty="0"/>
-                    </a:p>
-                  </a:txBody>
-                  <a:tcPr/>
-                </a:tc>
-                <a:tc>
-                  <a:txBody>
-                    <a:bodyPr/>
-                    <a:lstStyle/>
-                    <a:p>
-                      <a:r>
-                        <a:rPr lang="en-US" sz="1100" dirty="0" smtClean="0">
+                      <a:endParaRPr lang="fr-FR" sz="1050" dirty="0"/>
+                    </a:p>
+                  </a:txBody>
+                  <a:tcPr/>
+                </a:tc>
+                <a:tc>
+                  <a:txBody>
+                    <a:bodyPr/>
+                    <a:lstStyle/>
+                    <a:p>
+                      <a:r>
+                        <a:rPr lang="en-US" sz="1050" dirty="0" smtClean="0">
                           <a:solidFill>
                             <a:srgbClr val="FF0000"/>
                           </a:solidFill>
@@ -9245,7 +9245,7 @@
                         <a:t>Period : 1</a:t>
                       </a:r>
                       <a:r>
-                        <a:rPr lang="en-US" sz="1100" baseline="0" dirty="0" smtClean="0">
+                        <a:rPr lang="en-US" sz="1050" baseline="0" dirty="0" smtClean="0">
                           <a:solidFill>
                             <a:srgbClr val="FF0000"/>
                           </a:solidFill>
@@ -9253,14 +9253,14 @@
                         <a:t> </a:t>
                       </a:r>
                       <a:r>
-                        <a:rPr lang="en-US" sz="1100" baseline="0" dirty="0" err="1" smtClean="0">
+                        <a:rPr lang="en-US" sz="1050" baseline="0" dirty="0" err="1" smtClean="0">
                           <a:solidFill>
                             <a:srgbClr val="FF0000"/>
                           </a:solidFill>
                         </a:rPr>
                         <a:t>ms</a:t>
                       </a:r>
-                      <a:endParaRPr lang="fr-FR" sz="1100" dirty="0">
+                      <a:endParaRPr lang="fr-FR" sz="1050" dirty="0">
                         <a:solidFill>
                           <a:srgbClr val="FF0000"/>
                         </a:solidFill>
@@ -9275,16 +9275,16 @@
                     <a:lstStyle/>
                     <a:p>
                       <a:r>
-                        <a:rPr lang="en-US" sz="1100" dirty="0" smtClean="0"/>
+                        <a:rPr lang="en-US" sz="1050" dirty="0" smtClean="0"/>
                         <a:t>Servo commands.</a:t>
                       </a:r>
-                      <a:endParaRPr lang="fr-FR" sz="1100" dirty="0"/>
+                      <a:endParaRPr lang="fr-FR" sz="1050" dirty="0"/>
                     </a:p>
                   </a:txBody>
                   <a:tcPr/>
                 </a:tc>
               </a:tr>
-              <a:tr h="251085">
+              <a:tr h="223178">
                 <a:tc>
                   <a:txBody>
                     <a:bodyPr/>
@@ -9308,21 +9308,21 @@
                         <a:defRPr/>
                       </a:pPr>
                       <a:r>
-                        <a:rPr lang="en-US" sz="1100" dirty="0" smtClean="0"/>
+                        <a:rPr lang="en-US" sz="1050" dirty="0" smtClean="0"/>
                         <a:t>IT</a:t>
                       </a:r>
-                      <a:endParaRPr lang="fr-FR" sz="1100" dirty="0" smtClean="0"/>
-                    </a:p>
-                  </a:txBody>
-                  <a:tcPr/>
-                </a:tc>
-                <a:tc>
-                  <a:txBody>
-                    <a:bodyPr/>
-                    <a:lstStyle/>
-                    <a:p>
-                      <a:r>
-                        <a:rPr lang="fr-FR" sz="1100" kern="1200" dirty="0" err="1" smtClean="0">
+                      <a:endParaRPr lang="fr-FR" sz="1050" dirty="0" smtClean="0"/>
+                    </a:p>
+                  </a:txBody>
+                  <a:tcPr/>
+                </a:tc>
+                <a:tc>
+                  <a:txBody>
+                    <a:bodyPr/>
+                    <a:lstStyle/>
+                    <a:p>
+                      <a:r>
+                        <a:rPr lang="fr-FR" sz="1050" kern="1200" dirty="0" err="1" smtClean="0">
                           <a:solidFill>
                             <a:schemeClr val="dk1"/>
                           </a:solidFill>
@@ -9333,7 +9333,7 @@
                         <a:t>TwoWire</a:t>
                       </a:r>
                       <a:r>
-                        <a:rPr lang="fr-FR" sz="1100" kern="1200" dirty="0" smtClean="0">
+                        <a:rPr lang="fr-FR" sz="1050" kern="1200" dirty="0" smtClean="0">
                           <a:solidFill>
                             <a:schemeClr val="dk1"/>
                           </a:solidFill>
@@ -9344,7 +9344,7 @@
                         <a:t>::</a:t>
                       </a:r>
                       <a:r>
-                        <a:rPr lang="fr-FR" sz="1100" kern="1200" dirty="0" err="1" smtClean="0">
+                        <a:rPr lang="fr-FR" sz="1050" kern="1200" dirty="0" err="1" smtClean="0">
                           <a:solidFill>
                             <a:schemeClr val="dk1"/>
                           </a:solidFill>
@@ -9354,45 +9354,45 @@
                         </a:rPr>
                         <a:t>onService</a:t>
                       </a:r>
-                      <a:endParaRPr lang="fr-FR" sz="1100" dirty="0"/>
-                    </a:p>
-                  </a:txBody>
-                  <a:tcPr/>
-                </a:tc>
-                <a:tc>
-                  <a:txBody>
-                    <a:bodyPr/>
-                    <a:lstStyle/>
-                    <a:p>
-                      <a:r>
-                        <a:rPr lang="en-US" sz="1100" dirty="0" smtClean="0"/>
+                      <a:endParaRPr lang="fr-FR" sz="1050" dirty="0"/>
+                    </a:p>
+                  </a:txBody>
+                  <a:tcPr/>
+                </a:tc>
+                <a:tc>
+                  <a:txBody>
+                    <a:bodyPr/>
+                    <a:lstStyle/>
+                    <a:p>
+                      <a:r>
+                        <a:rPr lang="en-US" sz="1050" dirty="0" smtClean="0"/>
                         <a:t>I2C</a:t>
                       </a:r>
                       <a:r>
-                        <a:rPr lang="en-US" sz="1100" baseline="0" dirty="0" smtClean="0"/>
+                        <a:rPr lang="en-US" sz="1050" baseline="0" dirty="0" smtClean="0"/>
                         <a:t> event</a:t>
                       </a:r>
-                      <a:endParaRPr lang="fr-FR" sz="1100" dirty="0"/>
-                    </a:p>
-                  </a:txBody>
-                  <a:tcPr/>
-                </a:tc>
-                <a:tc>
-                  <a:txBody>
-                    <a:bodyPr/>
-                    <a:lstStyle/>
-                    <a:p>
-                      <a:r>
-                        <a:rPr lang="en-US" sz="1100" dirty="0" smtClean="0"/>
+                      <a:endParaRPr lang="fr-FR" sz="1050" dirty="0"/>
+                    </a:p>
+                  </a:txBody>
+                  <a:tcPr/>
+                </a:tc>
+                <a:tc>
+                  <a:txBody>
+                    <a:bodyPr/>
+                    <a:lstStyle/>
+                    <a:p>
+                      <a:r>
+                        <a:rPr lang="en-US" sz="1050" dirty="0" smtClean="0"/>
                         <a:t>Read/Send I2C data.</a:t>
                       </a:r>
-                      <a:endParaRPr lang="fr-FR" sz="1100" dirty="0"/>
+                      <a:endParaRPr lang="fr-FR" sz="1050" dirty="0"/>
                     </a:p>
                   </a:txBody>
                   <a:tcPr/>
                 </a:tc>
               </a:tr>
-              <a:tr h="290852">
+              <a:tr h="258139">
                 <a:tc>
                   <a:txBody>
                     <a:bodyPr/>
@@ -9416,66 +9416,66 @@
                         <a:defRPr/>
                       </a:pPr>
                       <a:r>
-                        <a:rPr lang="en-US" sz="1100" dirty="0" smtClean="0"/>
+                        <a:rPr lang="en-US" sz="1050" dirty="0" smtClean="0"/>
                         <a:t>IT</a:t>
                       </a:r>
-                      <a:endParaRPr lang="fr-FR" sz="1100" dirty="0" smtClean="0"/>
-                    </a:p>
-                  </a:txBody>
-                  <a:tcPr/>
-                </a:tc>
-                <a:tc>
-                  <a:txBody>
-                    <a:bodyPr/>
-                    <a:lstStyle/>
-                    <a:p>
-                      <a:r>
-                        <a:rPr lang="fr-FR" sz="1100" dirty="0" err="1" smtClean="0"/>
+                      <a:endParaRPr lang="fr-FR" sz="1050" dirty="0" smtClean="0"/>
+                    </a:p>
+                  </a:txBody>
+                  <a:tcPr/>
+                </a:tc>
+                <a:tc>
+                  <a:txBody>
+                    <a:bodyPr/>
+                    <a:lstStyle/>
+                    <a:p>
+                      <a:r>
+                        <a:rPr lang="fr-FR" sz="1050" dirty="0" err="1" smtClean="0"/>
                         <a:t>SysTick_Handler</a:t>
                       </a:r>
-                      <a:endParaRPr lang="fr-FR" sz="1100" dirty="0"/>
-                    </a:p>
-                  </a:txBody>
-                  <a:tcPr/>
-                </a:tc>
-                <a:tc>
-                  <a:txBody>
-                    <a:bodyPr/>
-                    <a:lstStyle/>
-                    <a:p>
-                      <a:r>
-                        <a:rPr lang="en-US" sz="1100" dirty="0" smtClean="0"/>
+                      <a:endParaRPr lang="fr-FR" sz="1050" dirty="0"/>
+                    </a:p>
+                  </a:txBody>
+                  <a:tcPr/>
+                </a:tc>
+                <a:tc>
+                  <a:txBody>
+                    <a:bodyPr/>
+                    <a:lstStyle/>
+                    <a:p>
+                      <a:r>
+                        <a:rPr lang="en-US" sz="1050" dirty="0" smtClean="0"/>
                         <a:t>Period : 1ms</a:t>
                       </a:r>
-                      <a:endParaRPr lang="fr-FR" sz="1100" dirty="0"/>
-                    </a:p>
-                  </a:txBody>
-                  <a:tcPr/>
-                </a:tc>
-                <a:tc>
-                  <a:txBody>
-                    <a:bodyPr/>
-                    <a:lstStyle/>
-                    <a:p>
-                      <a:r>
-                        <a:rPr lang="en-US" sz="1100" dirty="0" smtClean="0"/>
+                      <a:endParaRPr lang="fr-FR" sz="1050" dirty="0"/>
+                    </a:p>
+                  </a:txBody>
+                  <a:tcPr/>
+                </a:tc>
+                <a:tc>
+                  <a:txBody>
+                    <a:bodyPr/>
+                    <a:lstStyle/>
+                    <a:p>
+                      <a:r>
+                        <a:rPr lang="en-US" sz="1050" dirty="0" smtClean="0"/>
                         <a:t>Boot</a:t>
                       </a:r>
                       <a:r>
-                        <a:rPr lang="en-US" sz="1100" baseline="0" dirty="0" smtClean="0"/>
+                        <a:rPr lang="en-US" sz="1050" baseline="0" dirty="0" smtClean="0"/>
                         <a:t> </a:t>
                       </a:r>
                       <a:r>
-                        <a:rPr lang="en-US" sz="1100" baseline="0" smtClean="0"/>
+                        <a:rPr lang="en-US" sz="1050" baseline="0" smtClean="0"/>
                         <a:t>time count</a:t>
                       </a:r>
-                      <a:endParaRPr lang="fr-FR" sz="1100" dirty="0"/>
+                      <a:endParaRPr lang="fr-FR" sz="1050" dirty="0"/>
                     </a:p>
                   </a:txBody>
                   <a:tcPr/>
                 </a:tc>
               </a:tr>
-              <a:tr h="290852">
+              <a:tr h="258139">
                 <a:tc>
                   <a:txBody>
                     <a:bodyPr/>
@@ -9499,76 +9499,58 @@
                         <a:defRPr/>
                       </a:pPr>
                       <a:r>
-                        <a:rPr lang="en-US" sz="1100" dirty="0" smtClean="0"/>
-                        <a:t>Thread</a:t>
-                      </a:r>
-                      <a:endParaRPr lang="fr-FR" sz="1100" dirty="0" smtClean="0"/>
-                    </a:p>
-                  </a:txBody>
-                  <a:tcPr/>
-                </a:tc>
-                <a:tc>
-                  <a:txBody>
-                    <a:bodyPr/>
-                    <a:lstStyle/>
-                    <a:p>
-                      <a:r>
-                        <a:rPr lang="fr-FR" sz="1100" dirty="0" err="1" smtClean="0"/>
-                        <a:t>prvIdleTask</a:t>
-                      </a:r>
-                      <a:endParaRPr lang="fr-FR" sz="1100" dirty="0"/>
-                    </a:p>
-                  </a:txBody>
-                  <a:tcPr/>
-                </a:tc>
-                <a:tc>
-                  <a:txBody>
-                    <a:bodyPr/>
-                    <a:lstStyle/>
-                    <a:p>
-                      <a:r>
-                        <a:rPr lang="en-US" sz="1100" dirty="0" smtClean="0"/>
-                        <a:t>When no other</a:t>
-                      </a:r>
-                      <a:r>
-                        <a:rPr lang="en-US" sz="1100" baseline="0" dirty="0" smtClean="0"/>
-                        <a:t> thread is running</a:t>
-                      </a:r>
-                      <a:endParaRPr lang="fr-FR" sz="1100" dirty="0"/>
-                    </a:p>
-                  </a:txBody>
-                  <a:tcPr/>
-                </a:tc>
-                <a:tc>
-                  <a:txBody>
-                    <a:bodyPr/>
-                    <a:lstStyle/>
-                    <a:p>
-                      <a:r>
-                        <a:rPr lang="en-US" sz="1100" dirty="0" smtClean="0"/>
-                        <a:t>“Empty”.</a:t>
-                      </a:r>
-                      <a:endParaRPr lang="fr-FR" sz="1100" dirty="0"/>
+                        <a:rPr lang="en-US" sz="1050" dirty="0" smtClean="0"/>
+                        <a:t>IT</a:t>
+                      </a:r>
+                      <a:endParaRPr lang="fr-FR" sz="1050" dirty="0" smtClean="0"/>
+                    </a:p>
+                  </a:txBody>
+                  <a:tcPr/>
+                </a:tc>
+                <a:tc>
+                  <a:txBody>
+                    <a:bodyPr/>
+                    <a:lstStyle/>
+                    <a:p>
+                      <a:r>
+                        <a:rPr lang="fr-FR" sz="1050" dirty="0" err="1" smtClean="0"/>
+                        <a:t>Buzzer_Handler</a:t>
+                      </a:r>
+                      <a:endParaRPr lang="fr-FR" sz="1050" dirty="0"/>
+                    </a:p>
+                  </a:txBody>
+                  <a:tcPr/>
+                </a:tc>
+                <a:tc>
+                  <a:txBody>
+                    <a:bodyPr/>
+                    <a:lstStyle/>
+                    <a:p>
+                      <a:r>
+                        <a:rPr lang="en-US" sz="1050" dirty="0" smtClean="0"/>
+                        <a:t>Variable period</a:t>
+                      </a:r>
+                      <a:endParaRPr lang="fr-FR" sz="1050" dirty="0"/>
+                    </a:p>
+                  </a:txBody>
+                  <a:tcPr/>
+                </a:tc>
+                <a:tc>
+                  <a:txBody>
+                    <a:bodyPr/>
+                    <a:lstStyle/>
+                    <a:p>
+                      <a:r>
+                        <a:rPr lang="en-US" sz="1050" dirty="0" smtClean="0"/>
+                        <a:t>Buzzer command</a:t>
+                      </a:r>
+                      <a:endParaRPr lang="fr-FR" sz="1050" dirty="0"/>
                     </a:p>
                   </a:txBody>
                   <a:tcPr/>
                 </a:tc>
               </a:tr>
-              <a:tr h="315003">
-                <a:tc>
-                  <a:txBody>
-                    <a:bodyPr/>
-                    <a:lstStyle/>
-                    <a:p>
-                      <a:r>
-                        <a:rPr lang="en-US" sz="1100" dirty="0" smtClean="0"/>
-                        <a:t>Thread</a:t>
-                      </a:r>
-                      <a:endParaRPr lang="fr-FR" sz="1100" dirty="0"/>
-                    </a:p>
-                  </a:txBody>
-                  <a:tcPr/>
-                </a:tc>
+              <a:tr h="258139">
                 <a:tc>
                   <a:txBody>
                     <a:bodyPr/>
@@ -9592,40 +9574,72 @@
                         <a:defRPr/>
                       </a:pPr>
                       <a:r>
-                        <a:rPr lang="fr-FR" sz="1100" dirty="0" err="1" smtClean="0"/>
-                        <a:t>ComOnUart</a:t>
-                      </a:r>
-                      <a:r>
-                        <a:rPr lang="fr-FR" sz="1100" dirty="0" smtClean="0"/>
-                        <a:t>::</a:t>
-                      </a:r>
-                      <a:r>
-                        <a:rPr lang="fr-FR" sz="1100" dirty="0" err="1" smtClean="0"/>
-                        <a:t>Receiver</a:t>
-                      </a:r>
-                      <a:r>
-                        <a:rPr lang="fr-FR" sz="1100" dirty="0" smtClean="0"/>
-                        <a:t>::</a:t>
-                      </a:r>
-                      <a:r>
-                        <a:rPr lang="fr-FR" sz="1100" dirty="0" err="1" smtClean="0"/>
-                        <a:t>run</a:t>
-                      </a:r>
-                      <a:endParaRPr lang="fr-FR" sz="1100" dirty="0" smtClean="0"/>
-                    </a:p>
-                  </a:txBody>
-                  <a:tcPr/>
-                </a:tc>
-                <a:tc>
-                  <a:txBody>
-                    <a:bodyPr/>
-                    <a:lstStyle/>
-                    <a:p>
-                      <a:r>
-                        <a:rPr lang="en-US" sz="1100" dirty="0" smtClean="0"/>
-                        <a:t>Episodic</a:t>
-                      </a:r>
-                      <a:endParaRPr lang="fr-FR" sz="1100" dirty="0"/>
+                        <a:rPr lang="en-US" sz="1050" dirty="0" smtClean="0"/>
+                        <a:t>Thread</a:t>
+                      </a:r>
+                      <a:endParaRPr lang="fr-FR" sz="1050" dirty="0" smtClean="0"/>
+                    </a:p>
+                  </a:txBody>
+                  <a:tcPr/>
+                </a:tc>
+                <a:tc>
+                  <a:txBody>
+                    <a:bodyPr/>
+                    <a:lstStyle/>
+                    <a:p>
+                      <a:r>
+                        <a:rPr lang="fr-FR" sz="1050" dirty="0" err="1" smtClean="0"/>
+                        <a:t>prvIdleTask</a:t>
+                      </a:r>
+                      <a:endParaRPr lang="fr-FR" sz="1050" dirty="0"/>
+                    </a:p>
+                  </a:txBody>
+                  <a:tcPr/>
+                </a:tc>
+                <a:tc>
+                  <a:txBody>
+                    <a:bodyPr/>
+                    <a:lstStyle/>
+                    <a:p>
+                      <a:r>
+                        <a:rPr lang="en-US" sz="1050" dirty="0" smtClean="0"/>
+                        <a:t>When no other</a:t>
+                      </a:r>
+                      <a:r>
+                        <a:rPr lang="en-US" sz="1050" baseline="0" dirty="0" smtClean="0"/>
+                        <a:t> thread is running</a:t>
+                      </a:r>
+                      <a:endParaRPr lang="fr-FR" sz="1050" dirty="0"/>
+                    </a:p>
+                  </a:txBody>
+                  <a:tcPr/>
+                </a:tc>
+                <a:tc>
+                  <a:txBody>
+                    <a:bodyPr/>
+                    <a:lstStyle/>
+                    <a:p>
+                      <a:r>
+                        <a:rPr lang="en-US" sz="1050" dirty="0" smtClean="0"/>
+                        <a:t>“Empty”.</a:t>
+                      </a:r>
+                      <a:endParaRPr lang="fr-FR" sz="1050" dirty="0"/>
+                    </a:p>
+                  </a:txBody>
+                  <a:tcPr/>
+                </a:tc>
+              </a:tr>
+              <a:tr h="279574">
+                <a:tc>
+                  <a:txBody>
+                    <a:bodyPr/>
+                    <a:lstStyle/>
+                    <a:p>
+                      <a:r>
+                        <a:rPr lang="en-US" sz="1050" dirty="0" smtClean="0"/>
+                        <a:t>Thread</a:t>
+                      </a:r>
+                      <a:endParaRPr lang="fr-FR" sz="1050" dirty="0"/>
                     </a:p>
                   </a:txBody>
                   <a:tcPr/>
@@ -9653,40 +9667,44 @@
                         <a:defRPr/>
                       </a:pPr>
                       <a:r>
-                        <a:rPr lang="en-US" sz="1100" dirty="0" smtClean="0"/>
-                        <a:t>Reads what </a:t>
-                      </a:r>
-                      <a:r>
-                        <a:rPr lang="fr-FR" sz="1100" dirty="0" err="1" smtClean="0"/>
-                        <a:t>ArdUART</a:t>
-                      </a:r>
-                      <a:r>
-                        <a:rPr lang="fr-FR" sz="1100" dirty="0" smtClean="0"/>
+                        <a:rPr lang="fr-FR" sz="1050" dirty="0" err="1" smtClean="0"/>
+                        <a:t>ComOnUart</a:t>
+                      </a:r>
+                      <a:r>
+                        <a:rPr lang="fr-FR" sz="1050" dirty="0" smtClean="0"/>
                         <a:t>::</a:t>
                       </a:r>
                       <a:r>
-                        <a:rPr lang="fr-FR" sz="1100" dirty="0" err="1" smtClean="0"/>
-                        <a:t>IrqHandler</a:t>
-                      </a:r>
-                      <a:r>
-                        <a:rPr lang="fr-FR" sz="1100" dirty="0" smtClean="0"/>
-                        <a:t> has </a:t>
-                      </a:r>
-                      <a:r>
-                        <a:rPr lang="fr-FR" sz="1100" dirty="0" err="1" smtClean="0"/>
-                        <a:t>provided</a:t>
-                      </a:r>
-                      <a:r>
-                        <a:rPr lang="en-US" sz="1100" dirty="0" smtClean="0"/>
-                        <a:t> .</a:t>
-                      </a:r>
-                      <a:endParaRPr lang="fr-FR" sz="1100" dirty="0"/>
-                    </a:p>
-                  </a:txBody>
-                  <a:tcPr/>
-                </a:tc>
-              </a:tr>
-              <a:tr h="251085">
+                        <a:rPr lang="fr-FR" sz="1050" dirty="0" err="1" smtClean="0"/>
+                        <a:t>Receiver</a:t>
+                      </a:r>
+                      <a:r>
+                        <a:rPr lang="fr-FR" sz="1050" dirty="0" smtClean="0"/>
+                        <a:t>::</a:t>
+                      </a:r>
+                      <a:r>
+                        <a:rPr lang="fr-FR" sz="1050" dirty="0" err="1" smtClean="0"/>
+                        <a:t>run</a:t>
+                      </a:r>
+                      <a:endParaRPr lang="fr-FR" sz="1050" dirty="0" smtClean="0"/>
+                    </a:p>
+                  </a:txBody>
+                  <a:tcPr/>
+                </a:tc>
+                <a:tc>
+                  <a:txBody>
+                    <a:bodyPr/>
+                    <a:lstStyle/>
+                    <a:p>
+                      <a:r>
+                        <a:rPr lang="en-US" sz="1050" dirty="0" smtClean="0"/>
+                        <a:t>Episodic</a:t>
+                      </a:r>
+                      <a:endParaRPr lang="fr-FR" sz="1050" dirty="0"/>
+                    </a:p>
+                  </a:txBody>
+                  <a:tcPr/>
+                </a:tc>
                 <a:tc>
                   <a:txBody>
                     <a:bodyPr/>
@@ -9710,14 +9728,40 @@
                         <a:defRPr/>
                       </a:pPr>
                       <a:r>
-                        <a:rPr lang="en-US" sz="1100" dirty="0" smtClean="0"/>
-                        <a:t>Thread</a:t>
-                      </a:r>
-                      <a:endParaRPr lang="fr-FR" sz="1100" dirty="0"/>
-                    </a:p>
-                  </a:txBody>
-                  <a:tcPr/>
-                </a:tc>
+                        <a:rPr lang="en-US" sz="1050" dirty="0" smtClean="0"/>
+                        <a:t>Reads what </a:t>
+                      </a:r>
+                      <a:r>
+                        <a:rPr lang="fr-FR" sz="1050" dirty="0" err="1" smtClean="0"/>
+                        <a:t>ArdUART</a:t>
+                      </a:r>
+                      <a:r>
+                        <a:rPr lang="fr-FR" sz="1050" dirty="0" smtClean="0"/>
+                        <a:t>::</a:t>
+                      </a:r>
+                      <a:r>
+                        <a:rPr lang="fr-FR" sz="1050" dirty="0" err="1" smtClean="0"/>
+                        <a:t>IrqHandler</a:t>
+                      </a:r>
+                      <a:r>
+                        <a:rPr lang="fr-FR" sz="1050" dirty="0" smtClean="0"/>
+                        <a:t> has </a:t>
+                      </a:r>
+                      <a:r>
+                        <a:rPr lang="fr-FR" sz="1050" dirty="0" err="1" smtClean="0"/>
+                        <a:t>provided</a:t>
+                      </a:r>
+                      <a:r>
+                        <a:rPr lang="en-US" sz="1050" dirty="0" smtClean="0"/>
+                        <a:t> .</a:t>
+                      </a:r>
+                      <a:endParaRPr lang="fr-FR" sz="1050" dirty="0"/>
+                    </a:p>
+                  </a:txBody>
+                  <a:tcPr/>
+                </a:tc>
+              </a:tr>
+              <a:tr h="223178">
                 <a:tc>
                   <a:txBody>
                     <a:bodyPr/>
@@ -9741,18 +9785,10 @@
                         <a:defRPr/>
                       </a:pPr>
                       <a:r>
-                        <a:rPr lang="fr-FR" sz="1100" dirty="0" err="1" smtClean="0"/>
-                        <a:t>ComOnUart</a:t>
-                      </a:r>
-                      <a:r>
-                        <a:rPr lang="fr-FR" sz="1100" dirty="0" smtClean="0"/>
-                        <a:t>::Sender::</a:t>
-                      </a:r>
-                      <a:r>
-                        <a:rPr lang="fr-FR" sz="1100" dirty="0" err="1" smtClean="0"/>
-                        <a:t>run</a:t>
-                      </a:r>
-                      <a:endParaRPr lang="fr-FR" sz="1100" dirty="0" smtClean="0"/>
+                        <a:rPr lang="en-US" sz="1050" dirty="0" smtClean="0"/>
+                        <a:t>Thread</a:t>
+                      </a:r>
+                      <a:endParaRPr lang="fr-FR" sz="1050" dirty="0"/>
                     </a:p>
                   </a:txBody>
                   <a:tcPr/>
@@ -9780,10 +9816,18 @@
                         <a:defRPr/>
                       </a:pPr>
                       <a:r>
-                        <a:rPr lang="en-US" sz="1100" dirty="0" smtClean="0"/>
-                        <a:t>Episodic</a:t>
-                      </a:r>
-                      <a:endParaRPr lang="fr-FR" sz="1100" dirty="0" smtClean="0"/>
+                        <a:rPr lang="fr-FR" sz="1050" dirty="0" err="1" smtClean="0"/>
+                        <a:t>ComOnUart</a:t>
+                      </a:r>
+                      <a:r>
+                        <a:rPr lang="fr-FR" sz="1050" dirty="0" smtClean="0"/>
+                        <a:t>::Sender::</a:t>
+                      </a:r>
+                      <a:r>
+                        <a:rPr lang="fr-FR" sz="1050" dirty="0" err="1" smtClean="0"/>
+                        <a:t>run</a:t>
+                      </a:r>
+                      <a:endParaRPr lang="fr-FR" sz="1050" dirty="0" smtClean="0"/>
                     </a:p>
                   </a:txBody>
                   <a:tcPr/>
@@ -9811,32 +9855,14 @@
                         <a:defRPr/>
                       </a:pPr>
                       <a:r>
-                        <a:rPr lang="en-US" sz="1100" dirty="0" smtClean="0"/>
-                        <a:t>Feeds </a:t>
-                      </a:r>
-                      <a:r>
-                        <a:rPr lang="fr-FR" sz="1100" dirty="0" err="1" smtClean="0"/>
-                        <a:t>ArdUART</a:t>
-                      </a:r>
-                      <a:r>
-                        <a:rPr lang="fr-FR" sz="1100" dirty="0" smtClean="0"/>
-                        <a:t>::</a:t>
-                      </a:r>
-                      <a:r>
-                        <a:rPr lang="fr-FR" sz="1100" dirty="0" err="1" smtClean="0"/>
-                        <a:t>IrqHandler</a:t>
-                      </a:r>
-                      <a:r>
-                        <a:rPr lang="fr-FR" sz="1100" dirty="0" smtClean="0"/>
-                        <a:t>.</a:t>
-                      </a:r>
-                      <a:endParaRPr lang="fr-FR" sz="1100" dirty="0"/>
-                    </a:p>
-                  </a:txBody>
-                  <a:tcPr/>
-                </a:tc>
-              </a:tr>
-              <a:tr h="251085">
+                        <a:rPr lang="en-US" sz="1050" dirty="0" smtClean="0"/>
+                        <a:t>Episodic</a:t>
+                      </a:r>
+                      <a:endParaRPr lang="fr-FR" sz="1050" dirty="0" smtClean="0"/>
+                    </a:p>
+                  </a:txBody>
+                  <a:tcPr/>
+                </a:tc>
                 <a:tc>
                   <a:txBody>
                     <a:bodyPr/>
@@ -9860,74 +9886,32 @@
                         <a:defRPr/>
                       </a:pPr>
                       <a:r>
-                        <a:rPr lang="en-US" sz="1100" dirty="0" smtClean="0"/>
-                        <a:t>Thread</a:t>
-                      </a:r>
-                      <a:endParaRPr lang="fr-FR" sz="1100" dirty="0" smtClean="0"/>
-                    </a:p>
-                  </a:txBody>
-                  <a:tcPr/>
-                </a:tc>
-                <a:tc>
-                  <a:txBody>
-                    <a:bodyPr/>
-                    <a:lstStyle/>
-                    <a:p>
-                      <a:r>
-                        <a:rPr lang="fr-FR" sz="1100" dirty="0" err="1" smtClean="0"/>
-                        <a:t>HmiThread</a:t>
-                      </a:r>
-                      <a:r>
-                        <a:rPr lang="fr-FR" sz="1100" dirty="0" smtClean="0"/>
+                        <a:rPr lang="en-US" sz="1050" dirty="0" smtClean="0"/>
+                        <a:t>Feeds </a:t>
+                      </a:r>
+                      <a:r>
+                        <a:rPr lang="fr-FR" sz="1050" dirty="0" err="1" smtClean="0"/>
+                        <a:t>ArdUART</a:t>
+                      </a:r>
+                      <a:r>
+                        <a:rPr lang="fr-FR" sz="1050" dirty="0" smtClean="0"/>
                         <a:t>::</a:t>
                       </a:r>
                       <a:r>
-                        <a:rPr lang="fr-FR" sz="1100" dirty="0" err="1" smtClean="0"/>
-                        <a:t>run</a:t>
-                      </a:r>
-                      <a:endParaRPr lang="fr-FR" sz="1100" dirty="0"/>
-                    </a:p>
-                  </a:txBody>
-                  <a:tcPr/>
-                </a:tc>
-                <a:tc>
-                  <a:txBody>
-                    <a:bodyPr/>
-                    <a:lstStyle/>
-                    <a:p>
-                      <a:r>
-                        <a:rPr lang="en-US" sz="1100" dirty="0" smtClean="0"/>
-                        <a:t>Period : 50 </a:t>
-                      </a:r>
-                      <a:r>
-                        <a:rPr lang="en-US" sz="1100" dirty="0" err="1" smtClean="0"/>
-                        <a:t>ms</a:t>
-                      </a:r>
-                      <a:endParaRPr lang="fr-FR" sz="1100" dirty="0"/>
-                    </a:p>
-                  </a:txBody>
-                  <a:tcPr/>
-                </a:tc>
-                <a:tc>
-                  <a:txBody>
-                    <a:bodyPr/>
-                    <a:lstStyle/>
-                    <a:p>
-                      <a:r>
-                        <a:rPr lang="en-US" sz="1100" dirty="0" smtClean="0"/>
-                        <a:t>LEDs</a:t>
-                      </a:r>
-                      <a:r>
-                        <a:rPr lang="en-US" sz="1100" baseline="0" dirty="0" smtClean="0"/>
-                        <a:t> commands.</a:t>
-                      </a:r>
-                      <a:endParaRPr lang="fr-FR" sz="1100" dirty="0"/>
+                        <a:rPr lang="fr-FR" sz="1050" dirty="0" err="1" smtClean="0"/>
+                        <a:t>IrqHandler</a:t>
+                      </a:r>
+                      <a:r>
+                        <a:rPr lang="fr-FR" sz="1050" dirty="0" smtClean="0"/>
+                        <a:t>.</a:t>
+                      </a:r>
+                      <a:endParaRPr lang="fr-FR" sz="1050" dirty="0"/>
                     </a:p>
                   </a:txBody>
                   <a:tcPr/>
                 </a:tc>
               </a:tr>
-              <a:tr h="251085">
+              <a:tr h="223178">
                 <a:tc>
                   <a:txBody>
                     <a:bodyPr/>
@@ -9951,70 +9935,74 @@
                         <a:defRPr/>
                       </a:pPr>
                       <a:r>
-                        <a:rPr lang="en-US" sz="1100" dirty="0" smtClean="0"/>
+                        <a:rPr lang="en-US" sz="1050" dirty="0" smtClean="0"/>
                         <a:t>Thread</a:t>
                       </a:r>
-                      <a:endParaRPr lang="fr-FR" sz="1100" dirty="0" smtClean="0"/>
-                    </a:p>
-                  </a:txBody>
-                  <a:tcPr/>
-                </a:tc>
-                <a:tc>
-                  <a:txBody>
-                    <a:bodyPr/>
-                    <a:lstStyle/>
-                    <a:p>
-                      <a:r>
-                        <a:rPr lang="fr-FR" sz="1100" dirty="0" err="1" smtClean="0"/>
-                        <a:t>StrategyThread</a:t>
-                      </a:r>
-                      <a:r>
-                        <a:rPr lang="fr-FR" sz="1100" dirty="0" smtClean="0"/>
+                      <a:endParaRPr lang="fr-FR" sz="1050" dirty="0" smtClean="0"/>
+                    </a:p>
+                  </a:txBody>
+                  <a:tcPr/>
+                </a:tc>
+                <a:tc>
+                  <a:txBody>
+                    <a:bodyPr/>
+                    <a:lstStyle/>
+                    <a:p>
+                      <a:r>
+                        <a:rPr lang="fr-FR" sz="1050" dirty="0" err="1" smtClean="0"/>
+                        <a:t>HmiThread</a:t>
+                      </a:r>
+                      <a:r>
+                        <a:rPr lang="fr-FR" sz="1050" dirty="0" smtClean="0"/>
                         <a:t>::</a:t>
                       </a:r>
                       <a:r>
-                        <a:rPr lang="fr-FR" sz="1100" dirty="0" err="1" smtClean="0"/>
+                        <a:rPr lang="fr-FR" sz="1050" dirty="0" err="1" smtClean="0"/>
                         <a:t>run</a:t>
                       </a:r>
-                      <a:endParaRPr lang="fr-FR" sz="1100" dirty="0"/>
-                    </a:p>
-                  </a:txBody>
-                  <a:tcPr/>
-                </a:tc>
-                <a:tc>
-                  <a:txBody>
-                    <a:bodyPr/>
-                    <a:lstStyle/>
-                    <a:p>
-                      <a:r>
-                        <a:rPr lang="en-US" sz="1100" dirty="0" smtClean="0"/>
-                        <a:t>Episodic</a:t>
-                      </a:r>
-                      <a:endParaRPr lang="fr-FR" sz="1100" dirty="0"/>
-                    </a:p>
-                  </a:txBody>
-                  <a:tcPr/>
-                </a:tc>
-                <a:tc>
-                  <a:txBody>
-                    <a:bodyPr/>
-                    <a:lstStyle/>
-                    <a:p>
-                      <a:r>
-                        <a:rPr lang="en-US" sz="1100" dirty="0" smtClean="0"/>
-                        <a:t>Robot</a:t>
-                      </a:r>
-                      <a:r>
-                        <a:rPr lang="en-US" sz="1100" baseline="0" dirty="0" smtClean="0"/>
-                        <a:t> artificial intelligence</a:t>
-                      </a:r>
-                      <a:endParaRPr lang="fr-FR" sz="1100" dirty="0"/>
+                      <a:endParaRPr lang="fr-FR" sz="1050" dirty="0"/>
+                    </a:p>
+                  </a:txBody>
+                  <a:tcPr/>
+                </a:tc>
+                <a:tc>
+                  <a:txBody>
+                    <a:bodyPr/>
+                    <a:lstStyle/>
+                    <a:p>
+                      <a:r>
+                        <a:rPr lang="en-US" sz="1050" dirty="0" smtClean="0"/>
+                        <a:t>Period : 50 </a:t>
+                      </a:r>
+                      <a:r>
+                        <a:rPr lang="en-US" sz="1050" dirty="0" err="1" smtClean="0"/>
+                        <a:t>ms</a:t>
+                      </a:r>
+                      <a:endParaRPr lang="fr-FR" sz="1050" dirty="0"/>
+                    </a:p>
+                  </a:txBody>
+                  <a:tcPr/>
+                </a:tc>
+                <a:tc>
+                  <a:txBody>
+                    <a:bodyPr/>
+                    <a:lstStyle/>
+                    <a:p>
+                      <a:r>
+                        <a:rPr lang="en-US" sz="1050" dirty="0" smtClean="0"/>
+                        <a:t>LEDs</a:t>
+                      </a:r>
+                      <a:r>
+                        <a:rPr lang="en-US" sz="1050" baseline="0" dirty="0" smtClean="0"/>
+                        <a:t> commands.</a:t>
+                      </a:r>
+                      <a:endParaRPr lang="fr-FR" sz="1050" dirty="0"/>
                     </a:p>
                   </a:txBody>
                   <a:tcPr/>
                 </a:tc>
               </a:tr>
-              <a:tr h="251085">
+              <a:tr h="223178">
                 <a:tc>
                   <a:txBody>
                     <a:bodyPr/>
@@ -10038,36 +10026,70 @@
                         <a:defRPr/>
                       </a:pPr>
                       <a:r>
-                        <a:rPr lang="en-US" sz="1100" dirty="0" smtClean="0"/>
+                        <a:rPr lang="en-US" sz="1050" dirty="0" smtClean="0"/>
                         <a:t>Thread</a:t>
                       </a:r>
-                      <a:endParaRPr lang="fr-FR" sz="1100" dirty="0" smtClean="0"/>
-                    </a:p>
-                  </a:txBody>
-                  <a:tcPr/>
-                </a:tc>
-                <a:tc>
-                  <a:txBody>
-                    <a:bodyPr/>
-                    <a:lstStyle/>
-                    <a:p>
-                      <a:r>
-                        <a:rPr lang="fr-FR" sz="1100" dirty="0" err="1" smtClean="0"/>
-                        <a:t>PollerThread</a:t>
-                      </a:r>
-                      <a:r>
-                        <a:rPr lang="fr-FR" sz="1100" dirty="0" smtClean="0"/>
+                      <a:endParaRPr lang="fr-FR" sz="1050" dirty="0" smtClean="0"/>
+                    </a:p>
+                  </a:txBody>
+                  <a:tcPr/>
+                </a:tc>
+                <a:tc>
+                  <a:txBody>
+                    <a:bodyPr/>
+                    <a:lstStyle/>
+                    <a:p>
+                      <a:r>
+                        <a:rPr lang="fr-FR" sz="1050" dirty="0" err="1" smtClean="0"/>
+                        <a:t>StrategyThread</a:t>
+                      </a:r>
+                      <a:r>
+                        <a:rPr lang="fr-FR" sz="1050" dirty="0" smtClean="0"/>
                         <a:t>::</a:t>
                       </a:r>
                       <a:r>
-                        <a:rPr lang="fr-FR" sz="1100" dirty="0" err="1" smtClean="0"/>
+                        <a:rPr lang="fr-FR" sz="1050" dirty="0" err="1" smtClean="0"/>
                         <a:t>run</a:t>
                       </a:r>
-                      <a:endParaRPr lang="fr-FR" sz="1100" dirty="0"/>
-                    </a:p>
-                  </a:txBody>
-                  <a:tcPr/>
-                </a:tc>
+                      <a:endParaRPr lang="fr-FR" sz="1050" dirty="0"/>
+                    </a:p>
+                  </a:txBody>
+                  <a:tcPr/>
+                </a:tc>
+                <a:tc>
+                  <a:txBody>
+                    <a:bodyPr/>
+                    <a:lstStyle/>
+                    <a:p>
+                      <a:r>
+                        <a:rPr lang="en-US" sz="1050" dirty="0" smtClean="0"/>
+                        <a:t>Episodic</a:t>
+                      </a:r>
+                      <a:endParaRPr lang="fr-FR" sz="1050" dirty="0"/>
+                    </a:p>
+                  </a:txBody>
+                  <a:tcPr/>
+                </a:tc>
+                <a:tc>
+                  <a:txBody>
+                    <a:bodyPr/>
+                    <a:lstStyle/>
+                    <a:p>
+                      <a:r>
+                        <a:rPr lang="en-US" sz="1050" dirty="0" smtClean="0"/>
+                        <a:t>Robot</a:t>
+                      </a:r>
+                      <a:r>
+                        <a:rPr lang="en-US" sz="1050" baseline="0" dirty="0" smtClean="0"/>
+                        <a:t> artificial intelligence</a:t>
+                      </a:r>
+                      <a:endParaRPr lang="fr-FR" sz="1050" dirty="0"/>
+                    </a:p>
+                  </a:txBody>
+                  <a:tcPr/>
+                </a:tc>
+              </a:tr>
+              <a:tr h="223178">
                 <a:tc>
                   <a:txBody>
                     <a:bodyPr/>
@@ -10091,38 +10113,36 @@
                         <a:defRPr/>
                       </a:pPr>
                       <a:r>
-                        <a:rPr lang="en-US" sz="1100" dirty="0" smtClean="0"/>
-                        <a:t>Period : 100 </a:t>
-                      </a:r>
-                      <a:r>
-                        <a:rPr lang="en-US" sz="1100" dirty="0" err="1" smtClean="0"/>
-                        <a:t>ms</a:t>
-                      </a:r>
-                      <a:endParaRPr lang="fr-FR" sz="1100" dirty="0"/>
-                    </a:p>
-                  </a:txBody>
-                  <a:tcPr/>
-                </a:tc>
-                <a:tc>
-                  <a:txBody>
-                    <a:bodyPr/>
-                    <a:lstStyle/>
-                    <a:p>
-                      <a:r>
-                        <a:rPr lang="en-US" sz="1100" dirty="0" smtClean="0"/>
-                        <a:t>Actuators/Sensors</a:t>
-                      </a:r>
-                      <a:r>
-                        <a:rPr lang="en-US" sz="1100" baseline="0" dirty="0" smtClean="0"/>
-                        <a:t> commands.</a:t>
-                      </a:r>
-                      <a:endParaRPr lang="fr-FR" sz="1100" dirty="0"/>
-                    </a:p>
-                  </a:txBody>
-                  <a:tcPr/>
-                </a:tc>
-              </a:tr>
-              <a:tr h="251085">
+                        <a:rPr lang="en-US" sz="1050" dirty="0" smtClean="0"/>
+                        <a:t>Thread</a:t>
+                      </a:r>
+                      <a:endParaRPr lang="fr-FR" sz="1050" dirty="0" smtClean="0"/>
+                    </a:p>
+                  </a:txBody>
+                  <a:tcPr/>
+                </a:tc>
+                <a:tc>
+                  <a:txBody>
+                    <a:bodyPr/>
+                    <a:lstStyle/>
+                    <a:p>
+                      <a:r>
+                        <a:rPr lang="fr-FR" sz="1050" dirty="0" err="1" smtClean="0"/>
+                        <a:t>PollerThread</a:t>
+                      </a:r>
+                      <a:r>
+                        <a:rPr lang="fr-FR" sz="1050" dirty="0" smtClean="0"/>
+                        <a:t>::</a:t>
+                      </a:r>
+                      <a:r>
+                        <a:rPr lang="fr-FR" sz="1050" dirty="0" err="1" smtClean="0"/>
+                        <a:t>run</a:t>
+                      </a:r>
+                      <a:endParaRPr lang="fr-FR" sz="1050" dirty="0"/>
+                    </a:p>
+                  </a:txBody>
+                  <a:tcPr/>
+                </a:tc>
                 <a:tc>
                   <a:txBody>
                     <a:bodyPr/>
@@ -10146,32 +10166,38 @@
                         <a:defRPr/>
                       </a:pPr>
                       <a:r>
-                        <a:rPr lang="en-US" sz="1100" dirty="0" smtClean="0"/>
-                        <a:t>Thread</a:t>
-                      </a:r>
-                      <a:endParaRPr lang="fr-FR" sz="1100" dirty="0" smtClean="0"/>
-                    </a:p>
-                  </a:txBody>
-                  <a:tcPr/>
-                </a:tc>
-                <a:tc>
-                  <a:txBody>
-                    <a:bodyPr/>
-                    <a:lstStyle/>
-                    <a:p>
-                      <a:r>
-                        <a:rPr lang="fr-FR" sz="1100" dirty="0" smtClean="0"/>
-                        <a:t>Navigation::</a:t>
-                      </a:r>
-                      <a:r>
-                        <a:rPr lang="fr-FR" sz="1100" dirty="0" err="1" smtClean="0"/>
-                        <a:t>run</a:t>
-                      </a:r>
-                      <a:endParaRPr lang="fr-FR" sz="1100" dirty="0"/>
-                    </a:p>
-                  </a:txBody>
-                  <a:tcPr/>
-                </a:tc>
+                        <a:rPr lang="en-US" sz="1050" dirty="0" smtClean="0"/>
+                        <a:t>Period : 100 </a:t>
+                      </a:r>
+                      <a:r>
+                        <a:rPr lang="en-US" sz="1050" dirty="0" err="1" smtClean="0"/>
+                        <a:t>ms</a:t>
+                      </a:r>
+                      <a:endParaRPr lang="fr-FR" sz="1050" dirty="0"/>
+                    </a:p>
+                  </a:txBody>
+                  <a:tcPr/>
+                </a:tc>
+                <a:tc>
+                  <a:txBody>
+                    <a:bodyPr/>
+                    <a:lstStyle/>
+                    <a:p>
+                      <a:r>
+                        <a:rPr lang="en-US" sz="1050" dirty="0" smtClean="0"/>
+                        <a:t>Actuators/Sensors</a:t>
+                      </a:r>
+                      <a:r>
+                        <a:rPr lang="en-US" sz="1050" baseline="0" dirty="0" smtClean="0"/>
+                        <a:t> commands.</a:t>
+                      </a:r>
+                      <a:endParaRPr lang="fr-FR" sz="1050" dirty="0"/>
+                    </a:p>
+                  </a:txBody>
+                  <a:tcPr/>
+                </a:tc>
+              </a:tr>
+              <a:tr h="223178">
                 <a:tc>
                   <a:txBody>
                     <a:bodyPr/>
@@ -10195,28 +10221,77 @@
                         <a:defRPr/>
                       </a:pPr>
                       <a:r>
-                        <a:rPr lang="en-US" sz="1100" dirty="0" smtClean="0"/>
+                        <a:rPr lang="en-US" sz="1050" dirty="0" smtClean="0"/>
+                        <a:t>Thread</a:t>
+                      </a:r>
+                      <a:endParaRPr lang="fr-FR" sz="1050" dirty="0" smtClean="0"/>
+                    </a:p>
+                  </a:txBody>
+                  <a:tcPr/>
+                </a:tc>
+                <a:tc>
+                  <a:txBody>
+                    <a:bodyPr/>
+                    <a:lstStyle/>
+                    <a:p>
+                      <a:r>
+                        <a:rPr lang="fr-FR" sz="1050" dirty="0" smtClean="0"/>
+                        <a:t>Navigation::</a:t>
+                      </a:r>
+                      <a:r>
+                        <a:rPr lang="fr-FR" sz="1050" dirty="0" err="1" smtClean="0"/>
+                        <a:t>run</a:t>
+                      </a:r>
+                      <a:endParaRPr lang="fr-FR" sz="1050" dirty="0"/>
+                    </a:p>
+                  </a:txBody>
+                  <a:tcPr/>
+                </a:tc>
+                <a:tc>
+                  <a:txBody>
+                    <a:bodyPr/>
+                    <a:lstStyle/>
+                    <a:p>
+                      <a:pPr marL="0" marR="0" lvl="0" indent="0" algn="l" defTabSz="914400" rtl="0" eaLnBrk="1" fontAlgn="auto" latinLnBrk="0" hangingPunct="1">
+                        <a:lnSpc>
+                          <a:spcPct val="100000"/>
+                        </a:lnSpc>
+                        <a:spcBef>
+                          <a:spcPts val="0"/>
+                        </a:spcBef>
+                        <a:spcAft>
+                          <a:spcPts val="0"/>
+                        </a:spcAft>
+                        <a:buClrTx/>
+                        <a:buSzTx/>
+                        <a:buFontTx/>
+                        <a:buNone/>
+                        <a:tabLst/>
+                        <a:defRPr/>
+                      </a:pPr>
+                      <a:r>
+                        <a:rPr lang="en-US" sz="1050" dirty="0" smtClean="0"/>
                         <a:t>Period : 20ms</a:t>
                       </a:r>
-                      <a:endParaRPr lang="fr-FR" sz="1100" dirty="0"/>
-                    </a:p>
-                  </a:txBody>
-                  <a:tcPr/>
-                </a:tc>
-                <a:tc>
-                  <a:txBody>
-                    <a:bodyPr/>
-                    <a:lstStyle/>
-                    <a:p>
-                      <a:r>
-                        <a:rPr lang="en-US" sz="1100" dirty="0" smtClean="0"/>
+                      <a:endParaRPr lang="fr-FR" sz="1050" dirty="0"/>
+                    </a:p>
+                  </a:txBody>
+                  <a:tcPr/>
+                </a:tc>
+                <a:tc>
+                  <a:txBody>
+                    <a:bodyPr/>
+                    <a:lstStyle/>
+                    <a:p>
+                      <a:r>
+                        <a:rPr lang="en-US" sz="1050" dirty="0" smtClean="0"/>
                         <a:t>Robot</a:t>
                       </a:r>
                       <a:r>
-                        <a:rPr lang="en-US" sz="1100" baseline="0" dirty="0" smtClean="0"/>
+                        <a:rPr lang="en-US" sz="1050" baseline="0" dirty="0" smtClean="0"/>
                         <a:t> displacement management</a:t>
                       </a:r>
-                      <a:endParaRPr lang="fr-FR" sz="1100" dirty="0"/>
+                      <a:endParaRPr lang="fr-FR" sz="1050" dirty="0"/>
                     </a:p>
                   </a:txBody>
                   <a:tcPr/>

</xml_diff>

<commit_message>
Drivers folders re-organized, Buzzer driver in progress, GPIO PWM + RGB led with PWM added
</commit_message>
<xml_diff>
--- a/docs/SwArchitecture.pptx
+++ b/docs/SwArchitecture.pptx
@@ -13,6 +13,7 @@
     <p:sldId id="258" r:id="rId7"/>
     <p:sldId id="263" r:id="rId8"/>
     <p:sldId id="259" r:id="rId9"/>
+    <p:sldId id="265" r:id="rId10"/>
   </p:sldIdLst>
   <p:sldSz cx="12192000" cy="6858000"/>
   <p:notesSz cx="6858000" cy="9144000"/>
@@ -248,7 +249,7 @@
           <a:p>
             <a:fld id="{2782ACDD-568A-4D5B-9A72-61F2F85B1323}" type="datetimeFigureOut">
               <a:rPr lang="fr-FR" smtClean="0"/>
-              <a:t>22/03/2017</a:t>
+              <a:t>26/03/2017</a:t>
             </a:fld>
             <a:endParaRPr lang="fr-FR"/>
           </a:p>
@@ -416,7 +417,7 @@
           <a:p>
             <a:fld id="{2782ACDD-568A-4D5B-9A72-61F2F85B1323}" type="datetimeFigureOut">
               <a:rPr lang="fr-FR" smtClean="0"/>
-              <a:t>22/03/2017</a:t>
+              <a:t>26/03/2017</a:t>
             </a:fld>
             <a:endParaRPr lang="fr-FR"/>
           </a:p>
@@ -594,7 +595,7 @@
           <a:p>
             <a:fld id="{2782ACDD-568A-4D5B-9A72-61F2F85B1323}" type="datetimeFigureOut">
               <a:rPr lang="fr-FR" smtClean="0"/>
-              <a:t>22/03/2017</a:t>
+              <a:t>26/03/2017</a:t>
             </a:fld>
             <a:endParaRPr lang="fr-FR"/>
           </a:p>
@@ -762,7 +763,7 @@
           <a:p>
             <a:fld id="{2782ACDD-568A-4D5B-9A72-61F2F85B1323}" type="datetimeFigureOut">
               <a:rPr lang="fr-FR" smtClean="0"/>
-              <a:t>22/03/2017</a:t>
+              <a:t>26/03/2017</a:t>
             </a:fld>
             <a:endParaRPr lang="fr-FR"/>
           </a:p>
@@ -1007,7 +1008,7 @@
           <a:p>
             <a:fld id="{2782ACDD-568A-4D5B-9A72-61F2F85B1323}" type="datetimeFigureOut">
               <a:rPr lang="fr-FR" smtClean="0"/>
-              <a:t>22/03/2017</a:t>
+              <a:t>26/03/2017</a:t>
             </a:fld>
             <a:endParaRPr lang="fr-FR"/>
           </a:p>
@@ -1236,7 +1237,7 @@
           <a:p>
             <a:fld id="{2782ACDD-568A-4D5B-9A72-61F2F85B1323}" type="datetimeFigureOut">
               <a:rPr lang="fr-FR" smtClean="0"/>
-              <a:t>22/03/2017</a:t>
+              <a:t>26/03/2017</a:t>
             </a:fld>
             <a:endParaRPr lang="fr-FR"/>
           </a:p>
@@ -1600,7 +1601,7 @@
           <a:p>
             <a:fld id="{2782ACDD-568A-4D5B-9A72-61F2F85B1323}" type="datetimeFigureOut">
               <a:rPr lang="fr-FR" smtClean="0"/>
-              <a:t>22/03/2017</a:t>
+              <a:t>26/03/2017</a:t>
             </a:fld>
             <a:endParaRPr lang="fr-FR"/>
           </a:p>
@@ -1717,7 +1718,7 @@
           <a:p>
             <a:fld id="{2782ACDD-568A-4D5B-9A72-61F2F85B1323}" type="datetimeFigureOut">
               <a:rPr lang="fr-FR" smtClean="0"/>
-              <a:t>22/03/2017</a:t>
+              <a:t>26/03/2017</a:t>
             </a:fld>
             <a:endParaRPr lang="fr-FR"/>
           </a:p>
@@ -1812,7 +1813,7 @@
           <a:p>
             <a:fld id="{2782ACDD-568A-4D5B-9A72-61F2F85B1323}" type="datetimeFigureOut">
               <a:rPr lang="fr-FR" smtClean="0"/>
-              <a:t>22/03/2017</a:t>
+              <a:t>26/03/2017</a:t>
             </a:fld>
             <a:endParaRPr lang="fr-FR"/>
           </a:p>
@@ -2087,7 +2088,7 @@
           <a:p>
             <a:fld id="{2782ACDD-568A-4D5B-9A72-61F2F85B1323}" type="datetimeFigureOut">
               <a:rPr lang="fr-FR" smtClean="0"/>
-              <a:t>22/03/2017</a:t>
+              <a:t>26/03/2017</a:t>
             </a:fld>
             <a:endParaRPr lang="fr-FR"/>
           </a:p>
@@ -2339,7 +2340,7 @@
           <a:p>
             <a:fld id="{2782ACDD-568A-4D5B-9A72-61F2F85B1323}" type="datetimeFigureOut">
               <a:rPr lang="fr-FR" smtClean="0"/>
-              <a:t>22/03/2017</a:t>
+              <a:t>26/03/2017</a:t>
             </a:fld>
             <a:endParaRPr lang="fr-FR"/>
           </a:p>
@@ -2550,7 +2551,7 @@
           <a:p>
             <a:fld id="{2782ACDD-568A-4D5B-9A72-61F2F85B1323}" type="datetimeFigureOut">
               <a:rPr lang="fr-FR" smtClean="0"/>
-              <a:t>22/03/2017</a:t>
+              <a:t>26/03/2017</a:t>
             </a:fld>
             <a:endParaRPr lang="fr-FR"/>
           </a:p>
@@ -3261,9 +3262,30 @@
           <a:p>
             <a:pPr algn="ctr"/>
             <a:r>
+              <a:rPr lang="en-US" dirty="0" err="1"/>
+              <a:t>CpuIo</a:t>
+            </a:r>
+            <a:r>
+              <a:rPr lang="en-US" dirty="0"/>
+              <a:t> </a:t>
+            </a:r>
+            <a:r>
               <a:rPr lang="en-US" dirty="0" smtClean="0"/>
-              <a:t>Drivers</a:t>
-            </a:r>
+              <a:t> (</a:t>
+            </a:r>
+            <a:r>
+              <a:rPr lang="en-US" dirty="0" err="1" smtClean="0"/>
+              <a:t>uC</a:t>
+            </a:r>
+            <a:r>
+              <a:rPr lang="en-US" dirty="0" smtClean="0"/>
+              <a:t> </a:t>
+            </a:r>
+            <a:r>
+              <a:rPr lang="en-US" dirty="0" smtClean="0"/>
+              <a:t>Drivers)</a:t>
+            </a:r>
+            <a:endParaRPr lang="en-US" dirty="0" smtClean="0"/>
           </a:p>
         </p:txBody>
       </p:sp>
@@ -5323,7 +5345,9 @@
         </p:nvSpPr>
         <p:spPr/>
         <p:txBody>
-          <a:bodyPr/>
+          <a:bodyPr>
+            <a:normAutofit lnSpcReduction="10000"/>
+          </a:bodyPr>
           <a:lstStyle/>
           <a:p>
             <a:r>
@@ -5332,7 +5356,11 @@
             </a:r>
             <a:r>
               <a:rPr lang="en-US" dirty="0" smtClean="0"/>
-              <a:t> : contains all HW related stuff (drivers), with no intelligence</a:t>
+              <a:t> : contains all </a:t>
+            </a:r>
+            <a:r>
+              <a:rPr lang="en-US" dirty="0" smtClean="0"/>
+              <a:t>microcontroller drivers </a:t>
             </a:r>
           </a:p>
           <a:p>
@@ -5342,7 +5370,11 @@
             </a:r>
             <a:r>
               <a:rPr lang="en-US" dirty="0" smtClean="0"/>
-              <a:t> : a shared package between communicating SW to handle the network layer</a:t>
+              <a:t> </a:t>
+            </a:r>
+            <a:r>
+              <a:rPr lang="en-US" dirty="0" smtClean="0"/>
+              <a:t>: a shared package between communicating SW to handle the network layer</a:t>
             </a:r>
           </a:p>
           <a:p>
@@ -5352,8 +5384,13 @@
             </a:r>
             <a:r>
               <a:rPr lang="en-US" dirty="0" smtClean="0"/>
-              <a:t> : provides SW bricks to create a robot</a:t>
-            </a:r>
+              <a:t> : provides SW bricks to create a </a:t>
+            </a:r>
+            <a:r>
+              <a:rPr lang="en-US" dirty="0" smtClean="0"/>
+              <a:t>robot and board/peripheral drivers</a:t>
+            </a:r>
+            <a:endParaRPr lang="en-US" dirty="0" smtClean="0"/>
           </a:p>
           <a:p>
             <a:r>
@@ -5461,7 +5498,7 @@
           <p:nvPr>
             <p:extLst>
               <p:ext uri="{D42A27DB-BD31-4B8C-83A1-F6EECF244321}">
-                <p14:modId xmlns:p14="http://schemas.microsoft.com/office/powerpoint/2010/main" val="1119658771"/>
+                <p14:modId xmlns:p14="http://schemas.microsoft.com/office/powerpoint/2010/main" val="743508238"/>
               </p:ext>
             </p:extLst>
           </p:nvPr>
@@ -5480,14 +5517,14 @@
                 <a:gridCol w="2843689">
                   <a:extLst>
                     <a:ext uri="{9D8B030D-6E8A-4147-A177-3AD203B41FA5}">
-                      <a16:colId xmlns:a16="http://schemas.microsoft.com/office/drawing/2014/main" xmlns="" val="4249046580"/>
+                      <a16:colId xmlns="" xmlns:a16="http://schemas.microsoft.com/office/drawing/2014/main" val="4249046580"/>
                     </a:ext>
                   </a:extLst>
                 </a:gridCol>
                 <a:gridCol w="7116439">
                   <a:extLst>
                     <a:ext uri="{9D8B030D-6E8A-4147-A177-3AD203B41FA5}">
-                      <a16:colId xmlns:a16="http://schemas.microsoft.com/office/drawing/2014/main" xmlns="" val="2166689304"/>
+                      <a16:colId xmlns="" xmlns:a16="http://schemas.microsoft.com/office/drawing/2014/main" val="2166689304"/>
                     </a:ext>
                   </a:extLst>
                 </a:gridCol>
@@ -5523,7 +5560,7 @@
                 </a:tc>
                 <a:extLst>
                   <a:ext uri="{0D108BD9-81ED-4DB2-BD59-A6C34878D82A}">
-                    <a16:rowId xmlns:a16="http://schemas.microsoft.com/office/drawing/2014/main" xmlns="" val="1558262199"/>
+                    <a16:rowId xmlns="" xmlns:a16="http://schemas.microsoft.com/office/drawing/2014/main" val="1558262199"/>
                   </a:ext>
                 </a:extLst>
               </a:tr>
@@ -5562,7 +5599,7 @@
                 </a:tc>
                 <a:extLst>
                   <a:ext uri="{0D108BD9-81ED-4DB2-BD59-A6C34878D82A}">
-                    <a16:rowId xmlns:a16="http://schemas.microsoft.com/office/drawing/2014/main" xmlns="" val="3975330181"/>
+                    <a16:rowId xmlns="" xmlns:a16="http://schemas.microsoft.com/office/drawing/2014/main" val="3975330181"/>
                   </a:ext>
                 </a:extLst>
               </a:tr>
@@ -5643,7 +5680,7 @@
                 </a:tc>
                 <a:extLst>
                   <a:ext uri="{0D108BD9-81ED-4DB2-BD59-A6C34878D82A}">
-                    <a16:rowId xmlns:a16="http://schemas.microsoft.com/office/drawing/2014/main" xmlns="" val="145727790"/>
+                    <a16:rowId xmlns="" xmlns:a16="http://schemas.microsoft.com/office/drawing/2014/main" val="145727790"/>
                   </a:ext>
                 </a:extLst>
               </a:tr>
@@ -5654,22 +5691,46 @@
                     <a:lstStyle/>
                     <a:p>
                       <a:r>
+                        <a:rPr lang="en-US" sz="1400" dirty="0" err="1" smtClean="0"/>
+                        <a:t>CpuIo</a:t>
+                      </a:r>
+                      <a:endParaRPr lang="fr-FR" sz="1400" dirty="0"/>
+                    </a:p>
+                  </a:txBody>
+                  <a:tcPr/>
+                </a:tc>
+                <a:tc>
+                  <a:txBody>
+                    <a:bodyPr/>
+                    <a:lstStyle/>
+                    <a:p>
+                      <a:r>
                         <a:rPr lang="en-US" sz="1400" dirty="0" smtClean="0"/>
-                        <a:t>Drivers</a:t>
-                      </a:r>
-                      <a:endParaRPr lang="fr-FR" sz="1400" dirty="0"/>
-                    </a:p>
-                  </a:txBody>
-                  <a:tcPr/>
-                </a:tc>
-                <a:tc>
-                  <a:txBody>
-                    <a:bodyPr/>
-                    <a:lstStyle/>
-                    <a:p>
+                        <a:t>Drivers for </a:t>
+                      </a:r>
                       <a:r>
                         <a:rPr lang="en-US" sz="1400" dirty="0" smtClean="0"/>
-                        <a:t>Drivers for peripherals (see green parts below)</a:t>
+                        <a:t>microcontroller</a:t>
+                      </a:r>
+                      <a:r>
+                        <a:rPr lang="en-US" sz="1400" baseline="0" dirty="0" smtClean="0"/>
+                        <a:t> </a:t>
+                      </a:r>
+                      <a:r>
+                        <a:rPr lang="en-US" sz="1400" dirty="0" smtClean="0"/>
+                        <a:t>(see yellow/orange</a:t>
+                      </a:r>
+                      <a:r>
+                        <a:rPr lang="en-US" sz="1400" baseline="0" dirty="0" smtClean="0"/>
+                        <a:t> </a:t>
+                      </a:r>
+                      <a:r>
+                        <a:rPr lang="en-US" sz="1400" dirty="0" smtClean="0"/>
+                        <a:t>parts </a:t>
+                      </a:r>
+                      <a:r>
+                        <a:rPr lang="en-US" sz="1400" dirty="0" smtClean="0"/>
+                        <a:t>below)</a:t>
                       </a:r>
                       <a:endParaRPr lang="fr-FR" sz="1400" dirty="0"/>
                     </a:p>
@@ -5678,7 +5739,7 @@
                 </a:tc>
                 <a:extLst>
                   <a:ext uri="{0D108BD9-81ED-4DB2-BD59-A6C34878D82A}">
-                    <a16:rowId xmlns:a16="http://schemas.microsoft.com/office/drawing/2014/main" xmlns="" val="1909270051"/>
+                    <a16:rowId xmlns="" xmlns:a16="http://schemas.microsoft.com/office/drawing/2014/main" val="1909270051"/>
                   </a:ext>
                 </a:extLst>
               </a:tr>
@@ -5741,7 +5802,7 @@
                 </a:tc>
                 <a:extLst>
                   <a:ext uri="{0D108BD9-81ED-4DB2-BD59-A6C34878D82A}">
-                    <a16:rowId xmlns:a16="http://schemas.microsoft.com/office/drawing/2014/main" xmlns="" val="1361958173"/>
+                    <a16:rowId xmlns="" xmlns:a16="http://schemas.microsoft.com/office/drawing/2014/main" val="1361958173"/>
                   </a:ext>
                 </a:extLst>
               </a:tr>
@@ -6293,14 +6354,14 @@
                 <a:gridCol w="2843689">
                   <a:extLst>
                     <a:ext uri="{9D8B030D-6E8A-4147-A177-3AD203B41FA5}">
-                      <a16:colId xmlns:a16="http://schemas.microsoft.com/office/drawing/2014/main" xmlns="" val="4249046580"/>
+                      <a16:colId xmlns="" xmlns:a16="http://schemas.microsoft.com/office/drawing/2014/main" val="4249046580"/>
                     </a:ext>
                   </a:extLst>
                 </a:gridCol>
                 <a:gridCol w="7116439">
                   <a:extLst>
                     <a:ext uri="{9D8B030D-6E8A-4147-A177-3AD203B41FA5}">
-                      <a16:colId xmlns:a16="http://schemas.microsoft.com/office/drawing/2014/main" xmlns="" val="2166689304"/>
+                      <a16:colId xmlns="" xmlns:a16="http://schemas.microsoft.com/office/drawing/2014/main" val="2166689304"/>
                     </a:ext>
                   </a:extLst>
                 </a:gridCol>
@@ -6336,7 +6397,7 @@
                 </a:tc>
                 <a:extLst>
                   <a:ext uri="{0D108BD9-81ED-4DB2-BD59-A6C34878D82A}">
-                    <a16:rowId xmlns:a16="http://schemas.microsoft.com/office/drawing/2014/main" xmlns="" val="1558262199"/>
+                    <a16:rowId xmlns="" xmlns:a16="http://schemas.microsoft.com/office/drawing/2014/main" val="1558262199"/>
                   </a:ext>
                 </a:extLst>
               </a:tr>
@@ -6393,7 +6454,7 @@
                 </a:tc>
                 <a:extLst>
                   <a:ext uri="{0D108BD9-81ED-4DB2-BD59-A6C34878D82A}">
-                    <a16:rowId xmlns:a16="http://schemas.microsoft.com/office/drawing/2014/main" xmlns="" val="3975330181"/>
+                    <a16:rowId xmlns="" xmlns:a16="http://schemas.microsoft.com/office/drawing/2014/main" val="3975330181"/>
                   </a:ext>
                 </a:extLst>
               </a:tr>
@@ -6506,7 +6567,7 @@
                 </a:tc>
                 <a:extLst>
                   <a:ext uri="{0D108BD9-81ED-4DB2-BD59-A6C34878D82A}">
-                    <a16:rowId xmlns:a16="http://schemas.microsoft.com/office/drawing/2014/main" xmlns="" val="145727790"/>
+                    <a16:rowId xmlns="" xmlns:a16="http://schemas.microsoft.com/office/drawing/2014/main" val="145727790"/>
                   </a:ext>
                 </a:extLst>
               </a:tr>
@@ -6549,7 +6610,7 @@
                 </a:tc>
                 <a:extLst>
                   <a:ext uri="{0D108BD9-81ED-4DB2-BD59-A6C34878D82A}">
-                    <a16:rowId xmlns:a16="http://schemas.microsoft.com/office/drawing/2014/main" xmlns="" val="1909270051"/>
+                    <a16:rowId xmlns="" xmlns:a16="http://schemas.microsoft.com/office/drawing/2014/main" val="1909270051"/>
                   </a:ext>
                 </a:extLst>
               </a:tr>
@@ -6584,7 +6645,7 @@
                 </a:tc>
                 <a:extLst>
                   <a:ext uri="{0D108BD9-81ED-4DB2-BD59-A6C34878D82A}">
-                    <a16:rowId xmlns:a16="http://schemas.microsoft.com/office/drawing/2014/main" xmlns="" val="1361958173"/>
+                    <a16:rowId xmlns="" xmlns:a16="http://schemas.microsoft.com/office/drawing/2014/main" val="1361958173"/>
                   </a:ext>
                 </a:extLst>
               </a:tr>
@@ -7980,14 +8041,14 @@
           <p:nvPr>
             <p:extLst>
               <p:ext uri="{D42A27DB-BD31-4B8C-83A1-F6EECF244321}">
-                <p14:modId xmlns:p14="http://schemas.microsoft.com/office/powerpoint/2010/main" val="1831857489"/>
+                <p14:modId xmlns:p14="http://schemas.microsoft.com/office/powerpoint/2010/main" val="2424102011"/>
               </p:ext>
             </p:extLst>
           </p:nvPr>
         </p:nvGraphicFramePr>
         <p:xfrm>
           <a:off x="724988" y="810192"/>
-          <a:ext cx="9960128" cy="3169920"/>
+          <a:ext cx="9960128" cy="2956560"/>
         </p:xfrm>
         <a:graphic>
           <a:graphicData uri="http://schemas.openxmlformats.org/drawingml/2006/table">
@@ -7999,14 +8060,14 @@
                 <a:gridCol w="2843689">
                   <a:extLst>
                     <a:ext uri="{9D8B030D-6E8A-4147-A177-3AD203B41FA5}">
-                      <a16:colId xmlns:a16="http://schemas.microsoft.com/office/drawing/2014/main" xmlns="" val="4249046580"/>
+                      <a16:colId xmlns="" xmlns:a16="http://schemas.microsoft.com/office/drawing/2014/main" val="4249046580"/>
                     </a:ext>
                   </a:extLst>
                 </a:gridCol>
                 <a:gridCol w="7116439">
                   <a:extLst>
                     <a:ext uri="{9D8B030D-6E8A-4147-A177-3AD203B41FA5}">
-                      <a16:colId xmlns:a16="http://schemas.microsoft.com/office/drawing/2014/main" xmlns="" val="2166689304"/>
+                      <a16:colId xmlns="" xmlns:a16="http://schemas.microsoft.com/office/drawing/2014/main" val="2166689304"/>
                     </a:ext>
                   </a:extLst>
                 </a:gridCol>
@@ -8042,7 +8103,7 @@
                 </a:tc>
                 <a:extLst>
                   <a:ext uri="{0D108BD9-81ED-4DB2-BD59-A6C34878D82A}">
-                    <a16:rowId xmlns:a16="http://schemas.microsoft.com/office/drawing/2014/main" xmlns="" val="1558262199"/>
+                    <a16:rowId xmlns="" xmlns:a16="http://schemas.microsoft.com/office/drawing/2014/main" val="1558262199"/>
                   </a:ext>
                 </a:extLst>
               </a:tr>
@@ -8089,7 +8150,7 @@
                 </a:tc>
                 <a:extLst>
                   <a:ext uri="{0D108BD9-81ED-4DB2-BD59-A6C34878D82A}">
-                    <a16:rowId xmlns:a16="http://schemas.microsoft.com/office/drawing/2014/main" xmlns="" val="3975330181"/>
+                    <a16:rowId xmlns="" xmlns:a16="http://schemas.microsoft.com/office/drawing/2014/main" val="3975330181"/>
                   </a:ext>
                 </a:extLst>
               </a:tr>
@@ -8170,7 +8231,7 @@
                 </a:tc>
                 <a:extLst>
                   <a:ext uri="{0D108BD9-81ED-4DB2-BD59-A6C34878D82A}">
-                    <a16:rowId xmlns:a16="http://schemas.microsoft.com/office/drawing/2014/main" xmlns="" val="145727790"/>
+                    <a16:rowId xmlns="" xmlns:a16="http://schemas.microsoft.com/office/drawing/2014/main" val="145727790"/>
                   </a:ext>
                 </a:extLst>
               </a:tr>
@@ -8205,7 +8266,7 @@
                 </a:tc>
                 <a:extLst>
                   <a:ext uri="{0D108BD9-81ED-4DB2-BD59-A6C34878D82A}">
-                    <a16:rowId xmlns:a16="http://schemas.microsoft.com/office/drawing/2014/main" xmlns="" val="1909270051"/>
+                    <a16:rowId xmlns="" xmlns:a16="http://schemas.microsoft.com/office/drawing/2014/main" val="1909270051"/>
                   </a:ext>
                 </a:extLst>
               </a:tr>
@@ -8235,161 +8296,19 @@
                       </a:r>
                       <a:r>
                         <a:rPr lang="en-US" sz="1400" baseline="0" dirty="0" smtClean="0"/>
-                        <a:t> driver decorators taking the mechanics into account (</a:t>
-                      </a:r>
-                      <a:r>
-                        <a:rPr lang="en-US" sz="1400" kern="1200" baseline="0" dirty="0" smtClean="0">
-                          <a:solidFill>
-                            <a:schemeClr val="dk1"/>
-                          </a:solidFill>
-                          <a:latin typeface="+mn-lt"/>
-                          <a:ea typeface="+mn-ea"/>
-                          <a:cs typeface="+mn-cs"/>
-                        </a:rPr>
-                        <a:t>a </a:t>
-                      </a:r>
-                      <a:r>
-                        <a:rPr lang="fr-FR" sz="1400" kern="1200" baseline="0" dirty="0" smtClean="0">
-                          <a:solidFill>
-                            <a:schemeClr val="dk1"/>
-                          </a:solidFill>
-                          <a:latin typeface="+mn-lt"/>
-                          <a:ea typeface="+mn-ea"/>
-                          <a:cs typeface="+mn-cs"/>
-                        </a:rPr>
-                        <a:t>TCS34725 driver </a:t>
-                      </a:r>
-                      <a:r>
-                        <a:rPr lang="fr-FR" sz="1400" kern="1200" baseline="0" dirty="0" err="1" smtClean="0">
-                          <a:solidFill>
-                            <a:schemeClr val="dk1"/>
-                          </a:solidFill>
-                          <a:latin typeface="+mn-lt"/>
-                          <a:ea typeface="+mn-ea"/>
-                          <a:cs typeface="+mn-cs"/>
-                        </a:rPr>
-                        <a:t>provides</a:t>
-                      </a:r>
-                      <a:r>
-                        <a:rPr lang="fr-FR" sz="1400" kern="1200" baseline="0" dirty="0" smtClean="0">
-                          <a:solidFill>
-                            <a:schemeClr val="dk1"/>
-                          </a:solidFill>
-                          <a:latin typeface="+mn-lt"/>
-                          <a:ea typeface="+mn-ea"/>
-                          <a:cs typeface="+mn-cs"/>
-                        </a:rPr>
                         <a:t> </a:t>
                       </a:r>
                       <a:r>
-                        <a:rPr lang="fr-FR" sz="1400" kern="1200" baseline="0" dirty="0" err="1" smtClean="0">
-                          <a:solidFill>
-                            <a:schemeClr val="dk1"/>
-                          </a:solidFill>
-                          <a:latin typeface="+mn-lt"/>
-                          <a:ea typeface="+mn-ea"/>
-                          <a:cs typeface="+mn-cs"/>
-                        </a:rPr>
-                        <a:t>rgb</a:t>
-                      </a:r>
-                      <a:r>
-                        <a:rPr lang="fr-FR" sz="1400" kern="1200" baseline="0" dirty="0" smtClean="0">
-                          <a:solidFill>
-                            <a:schemeClr val="dk1"/>
-                          </a:solidFill>
-                          <a:latin typeface="+mn-lt"/>
-                          <a:ea typeface="+mn-ea"/>
-                          <a:cs typeface="+mn-cs"/>
-                        </a:rPr>
-                        <a:t> </a:t>
-                      </a:r>
-                      <a:r>
-                        <a:rPr lang="fr-FR" sz="1400" kern="1200" baseline="0" dirty="0" err="1" smtClean="0">
-                          <a:solidFill>
-                            <a:schemeClr val="dk1"/>
-                          </a:solidFill>
-                          <a:latin typeface="+mn-lt"/>
-                          <a:ea typeface="+mn-ea"/>
-                          <a:cs typeface="+mn-cs"/>
-                        </a:rPr>
-                        <a:t>measures</a:t>
-                      </a:r>
-                      <a:r>
-                        <a:rPr lang="fr-FR" sz="1400" kern="1200" baseline="0" dirty="0" smtClean="0">
-                          <a:solidFill>
-                            <a:schemeClr val="dk1"/>
-                          </a:solidFill>
-                          <a:latin typeface="+mn-lt"/>
-                          <a:ea typeface="+mn-ea"/>
-                          <a:cs typeface="+mn-cs"/>
-                        </a:rPr>
-                        <a:t>, a </a:t>
-                      </a:r>
-                      <a:r>
-                        <a:rPr lang="fr-FR" sz="1400" kern="1200" baseline="0" dirty="0" err="1" smtClean="0">
-                          <a:solidFill>
-                            <a:schemeClr val="dk1"/>
-                          </a:solidFill>
-                          <a:latin typeface="+mn-lt"/>
-                          <a:ea typeface="+mn-ea"/>
-                          <a:cs typeface="+mn-cs"/>
-                        </a:rPr>
-                        <a:t>CylinderSensor</a:t>
-                      </a:r>
-                      <a:r>
-                        <a:rPr lang="fr-FR" sz="1400" kern="1200" baseline="0" dirty="0" smtClean="0">
-                          <a:solidFill>
-                            <a:schemeClr val="dk1"/>
-                          </a:solidFill>
-                          <a:latin typeface="+mn-lt"/>
-                          <a:ea typeface="+mn-ea"/>
-                          <a:cs typeface="+mn-cs"/>
-                        </a:rPr>
-                        <a:t> </a:t>
-                      </a:r>
-                      <a:r>
-                        <a:rPr lang="fr-FR" sz="1400" kern="1200" baseline="0" dirty="0" err="1" smtClean="0">
-                          <a:solidFill>
-                            <a:schemeClr val="dk1"/>
-                          </a:solidFill>
-                          <a:latin typeface="+mn-lt"/>
-                          <a:ea typeface="+mn-ea"/>
-                          <a:cs typeface="+mn-cs"/>
-                        </a:rPr>
-                        <a:t>provides</a:t>
-                      </a:r>
-                      <a:r>
-                        <a:rPr lang="fr-FR" sz="1400" kern="1200" baseline="0" dirty="0" smtClean="0">
-                          <a:solidFill>
-                            <a:schemeClr val="dk1"/>
-                          </a:solidFill>
-                          <a:latin typeface="+mn-lt"/>
-                          <a:ea typeface="+mn-ea"/>
-                          <a:cs typeface="+mn-cs"/>
-                        </a:rPr>
-                        <a:t> a </a:t>
-                      </a:r>
-                      <a:r>
-                        <a:rPr lang="fr-FR" sz="1400" kern="1200" baseline="0" dirty="0" err="1" smtClean="0">
-                          <a:solidFill>
-                            <a:schemeClr val="dk1"/>
-                          </a:solidFill>
-                          <a:latin typeface="+mn-lt"/>
-                          <a:ea typeface="+mn-ea"/>
-                          <a:cs typeface="+mn-cs"/>
-                        </a:rPr>
-                        <a:t>cylinder</a:t>
-                      </a:r>
-                      <a:r>
-                        <a:rPr lang="fr-FR" sz="1400" kern="1200" baseline="0" dirty="0" smtClean="0">
-                          <a:solidFill>
-                            <a:schemeClr val="dk1"/>
-                          </a:solidFill>
-                          <a:latin typeface="+mn-lt"/>
-                          <a:ea typeface="+mn-ea"/>
-                          <a:cs typeface="+mn-cs"/>
-                        </a:rPr>
-                        <a:t> face)</a:t>
+                        <a:rPr lang="en-US" sz="1400" baseline="0" dirty="0" smtClean="0"/>
+                        <a:t>drivers (see green </a:t>
+                      </a:r>
+                      <a:r>
+                        <a:rPr lang="en-US" sz="1400" baseline="0" dirty="0" err="1" smtClean="0"/>
+                        <a:t>boxex</a:t>
+                      </a:r>
+                      <a:r>
+                        <a:rPr lang="en-US" sz="1400" baseline="0" dirty="0" smtClean="0"/>
+                        <a:t> on BSP slide)</a:t>
                       </a:r>
                       <a:endParaRPr lang="fr-FR" sz="1400" kern="1200" baseline="0" dirty="0">
                         <a:solidFill>
@@ -8405,7 +8324,7 @@
                 </a:tc>
                 <a:extLst>
                   <a:ext uri="{0D108BD9-81ED-4DB2-BD59-A6C34878D82A}">
-                    <a16:rowId xmlns:a16="http://schemas.microsoft.com/office/drawing/2014/main" xmlns="" val="1361958173"/>
+                    <a16:rowId xmlns="" xmlns:a16="http://schemas.microsoft.com/office/drawing/2014/main" val="1361958173"/>
                   </a:ext>
                 </a:extLst>
               </a:tr>
@@ -8431,7 +8350,23 @@
                     <a:p>
                       <a:r>
                         <a:rPr lang="en-US" sz="1400" dirty="0" smtClean="0"/>
-                        <a:t>Actuators decorators taking the mechanics into account </a:t>
+                        <a:t>Actuators </a:t>
+                      </a:r>
+                      <a:r>
+                        <a:rPr lang="en-US" sz="1400" dirty="0" smtClean="0"/>
+                        <a:t>drivers </a:t>
+                      </a:r>
+                      <a:r>
+                        <a:rPr lang="en-US" sz="1400" baseline="0" dirty="0" smtClean="0"/>
+                        <a:t>(see green </a:t>
+                      </a:r>
+                      <a:r>
+                        <a:rPr lang="en-US" sz="1400" baseline="0" dirty="0" err="1" smtClean="0"/>
+                        <a:t>boxex</a:t>
+                      </a:r>
+                      <a:r>
+                        <a:rPr lang="en-US" sz="1400" baseline="0" dirty="0" smtClean="0"/>
+                        <a:t> on BSP slide)</a:t>
                       </a:r>
                       <a:endParaRPr lang="fr-FR" sz="1400" dirty="0"/>
                     </a:p>
@@ -8608,14 +8543,14 @@
                 <a:gridCol w="2843689">
                   <a:extLst>
                     <a:ext uri="{9D8B030D-6E8A-4147-A177-3AD203B41FA5}">
-                      <a16:colId xmlns:a16="http://schemas.microsoft.com/office/drawing/2014/main" xmlns="" val="4249046580"/>
+                      <a16:colId xmlns="" xmlns:a16="http://schemas.microsoft.com/office/drawing/2014/main" val="4249046580"/>
                     </a:ext>
                   </a:extLst>
                 </a:gridCol>
                 <a:gridCol w="7116439">
                   <a:extLst>
                     <a:ext uri="{9D8B030D-6E8A-4147-A177-3AD203B41FA5}">
-                      <a16:colId xmlns:a16="http://schemas.microsoft.com/office/drawing/2014/main" xmlns="" val="2166689304"/>
+                      <a16:colId xmlns="" xmlns:a16="http://schemas.microsoft.com/office/drawing/2014/main" val="2166689304"/>
                     </a:ext>
                   </a:extLst>
                 </a:gridCol>
@@ -8651,7 +8586,7 @@
                 </a:tc>
                 <a:extLst>
                   <a:ext uri="{0D108BD9-81ED-4DB2-BD59-A6C34878D82A}">
-                    <a16:rowId xmlns:a16="http://schemas.microsoft.com/office/drawing/2014/main" xmlns="" val="1558262199"/>
+                    <a16:rowId xmlns="" xmlns:a16="http://schemas.microsoft.com/office/drawing/2014/main" val="1558262199"/>
                   </a:ext>
                 </a:extLst>
               </a:tr>
@@ -8690,7 +8625,7 @@
                 </a:tc>
                 <a:extLst>
                   <a:ext uri="{0D108BD9-81ED-4DB2-BD59-A6C34878D82A}">
-                    <a16:rowId xmlns:a16="http://schemas.microsoft.com/office/drawing/2014/main" xmlns="" val="3975330181"/>
+                    <a16:rowId xmlns="" xmlns:a16="http://schemas.microsoft.com/office/drawing/2014/main" val="3975330181"/>
                   </a:ext>
                 </a:extLst>
               </a:tr>
@@ -8759,7 +8694,7 @@
                 </a:tc>
                 <a:extLst>
                   <a:ext uri="{0D108BD9-81ED-4DB2-BD59-A6C34878D82A}">
-                    <a16:rowId xmlns:a16="http://schemas.microsoft.com/office/drawing/2014/main" xmlns="" val="145727790"/>
+                    <a16:rowId xmlns="" xmlns:a16="http://schemas.microsoft.com/office/drawing/2014/main" val="145727790"/>
                   </a:ext>
                 </a:extLst>
               </a:tr>
@@ -8814,7 +8749,7 @@
                 </a:tc>
                 <a:extLst>
                   <a:ext uri="{0D108BD9-81ED-4DB2-BD59-A6C34878D82A}">
-                    <a16:rowId xmlns:a16="http://schemas.microsoft.com/office/drawing/2014/main" xmlns="" val="1909270051"/>
+                    <a16:rowId xmlns="" xmlns:a16="http://schemas.microsoft.com/office/drawing/2014/main" val="1909270051"/>
                   </a:ext>
                 </a:extLst>
               </a:tr>
@@ -10430,6 +10365,454 @@
       </p:par>
     </p:tnLst>
   </p:timing>
+</p:sld>
+</file>
+
+<file path=ppt/slides/slide9.xml><?xml version="1.0" encoding="utf-8"?>
+<p:sld xmlns:a="http://schemas.openxmlformats.org/drawingml/2006/main" xmlns:r="http://schemas.openxmlformats.org/officeDocument/2006/relationships" xmlns:p="http://schemas.openxmlformats.org/presentationml/2006/main">
+  <p:cSld>
+    <p:spTree>
+      <p:nvGrpSpPr>
+        <p:cNvPr id="1" name=""/>
+        <p:cNvGrpSpPr/>
+        <p:nvPr/>
+      </p:nvGrpSpPr>
+      <p:grpSpPr>
+        <a:xfrm>
+          <a:off x="0" y="0"/>
+          <a:ext cx="0" cy="0"/>
+          <a:chOff x="0" y="0"/>
+          <a:chExt cx="0" cy="0"/>
+        </a:xfrm>
+      </p:grpSpPr>
+      <p:sp>
+        <p:nvSpPr>
+          <p:cNvPr id="2" name="Titre 1"/>
+          <p:cNvSpPr>
+            <a:spLocks noGrp="1"/>
+          </p:cNvSpPr>
+          <p:nvPr>
+            <p:ph type="title"/>
+          </p:nvPr>
+        </p:nvSpPr>
+        <p:spPr/>
+        <p:txBody>
+          <a:bodyPr/>
+          <a:lstStyle/>
+          <a:p>
+            <a:r>
+              <a:rPr lang="en-US" dirty="0" smtClean="0"/>
+              <a:t>Timers</a:t>
+            </a:r>
+            <a:endParaRPr lang="fr-FR" dirty="0"/>
+          </a:p>
+        </p:txBody>
+      </p:sp>
+      <p:sp>
+        <p:nvSpPr>
+          <p:cNvPr id="3" name="Espace réservé du contenu 2"/>
+          <p:cNvSpPr>
+            <a:spLocks noGrp="1"/>
+          </p:cNvSpPr>
+          <p:nvPr>
+            <p:ph idx="1"/>
+          </p:nvPr>
+        </p:nvSpPr>
+        <p:spPr/>
+        <p:txBody>
+          <a:bodyPr/>
+          <a:lstStyle/>
+          <a:p>
+            <a:pPr marL="0" indent="0">
+              <a:buNone/>
+            </a:pPr>
+            <a:r>
+              <a:rPr lang="en-US" dirty="0" smtClean="0"/>
+              <a:t>Timers affectation is defined in Robot2017.cpp</a:t>
+            </a:r>
+            <a:endParaRPr lang="fr-FR" dirty="0"/>
+          </a:p>
+        </p:txBody>
+      </p:sp>
+      <p:graphicFrame>
+        <p:nvGraphicFramePr>
+          <p:cNvPr id="4" name="Tableau 3"/>
+          <p:cNvGraphicFramePr>
+            <a:graphicFrameLocks noGrp="1"/>
+          </p:cNvGraphicFramePr>
+          <p:nvPr>
+            <p:extLst>
+              <p:ext uri="{D42A27DB-BD31-4B8C-83A1-F6EECF244321}">
+                <p14:modId xmlns:p14="http://schemas.microsoft.com/office/powerpoint/2010/main" val="2108532463"/>
+              </p:ext>
+            </p:extLst>
+          </p:nvPr>
+        </p:nvGraphicFramePr>
+        <p:xfrm>
+          <a:off x="977900" y="2463799"/>
+          <a:ext cx="8231965" cy="1647278"/>
+        </p:xfrm>
+        <a:graphic>
+          <a:graphicData uri="http://schemas.openxmlformats.org/drawingml/2006/table">
+            <a:tbl>
+              <a:tblPr firstRow="1" bandRow="1">
+                <a:tableStyleId>{69C7853C-536D-4A76-A0AE-DD22124D55A5}</a:tableStyleId>
+              </a:tblPr>
+              <a:tblGrid>
+                <a:gridCol w="1291011"/>
+                <a:gridCol w="2265548"/>
+                <a:gridCol w="4675406"/>
+              </a:tblGrid>
+              <a:tr h="209732">
+                <a:tc>
+                  <a:txBody>
+                    <a:bodyPr/>
+                    <a:lstStyle/>
+                    <a:p>
+                      <a:r>
+                        <a:rPr lang="en-US" sz="1050" dirty="0" smtClean="0"/>
+                        <a:t>Timer</a:t>
+                      </a:r>
+                      <a:endParaRPr lang="fr-FR" sz="1050" dirty="0"/>
+                    </a:p>
+                  </a:txBody>
+                  <a:tcPr/>
+                </a:tc>
+                <a:tc>
+                  <a:txBody>
+                    <a:bodyPr/>
+                    <a:lstStyle/>
+                    <a:p>
+                      <a:r>
+                        <a:rPr lang="en-US" sz="1050" dirty="0" smtClean="0"/>
+                        <a:t>Used</a:t>
+                      </a:r>
+                      <a:r>
+                        <a:rPr lang="en-US" sz="1050" baseline="0" dirty="0" smtClean="0"/>
+                        <a:t> in file</a:t>
+                      </a:r>
+                      <a:endParaRPr lang="fr-FR" sz="1050" dirty="0"/>
+                    </a:p>
+                  </a:txBody>
+                  <a:tcPr/>
+                </a:tc>
+                <a:tc>
+                  <a:txBody>
+                    <a:bodyPr/>
+                    <a:lstStyle/>
+                    <a:p>
+                      <a:r>
+                        <a:rPr lang="en-US" sz="1050" dirty="0" smtClean="0"/>
+                        <a:t>Content</a:t>
+                      </a:r>
+                      <a:endParaRPr lang="fr-FR" sz="1050" dirty="0"/>
+                    </a:p>
+                  </a:txBody>
+                  <a:tcPr/>
+                </a:tc>
+              </a:tr>
+              <a:tr h="223178">
+                <a:tc>
+                  <a:txBody>
+                    <a:bodyPr/>
+                    <a:lstStyle/>
+                    <a:p>
+                      <a:r>
+                        <a:rPr lang="en-US" sz="1050" dirty="0" smtClean="0"/>
+                        <a:t>0</a:t>
+                      </a:r>
+                      <a:endParaRPr lang="fr-FR" sz="1050" dirty="0"/>
+                    </a:p>
+                  </a:txBody>
+                  <a:tcPr/>
+                </a:tc>
+                <a:tc>
+                  <a:txBody>
+                    <a:bodyPr/>
+                    <a:lstStyle/>
+                    <a:p>
+                      <a:r>
+                        <a:rPr lang="fr-FR" sz="1050" dirty="0" err="1" smtClean="0"/>
+                        <a:t>FreeRTOS_ARM.c</a:t>
+                      </a:r>
+                      <a:endParaRPr lang="fr-FR" sz="1050" dirty="0"/>
+                    </a:p>
+                  </a:txBody>
+                  <a:tcPr/>
+                </a:tc>
+                <a:tc>
+                  <a:txBody>
+                    <a:bodyPr/>
+                    <a:lstStyle/>
+                    <a:p>
+                      <a:r>
+                        <a:rPr lang="en-US" sz="1050" dirty="0" smtClean="0"/>
+                        <a:t>Get thread CPU usage</a:t>
+                      </a:r>
+                      <a:endParaRPr lang="fr-FR" sz="1050" dirty="0"/>
+                    </a:p>
+                  </a:txBody>
+                  <a:tcPr/>
+                </a:tc>
+              </a:tr>
+              <a:tr h="223178">
+                <a:tc>
+                  <a:txBody>
+                    <a:bodyPr/>
+                    <a:lstStyle/>
+                    <a:p>
+                      <a:pPr marL="0" marR="0" lvl="0" indent="0" algn="l" defTabSz="914400" rtl="0" eaLnBrk="1" fontAlgn="auto" latinLnBrk="0" hangingPunct="1">
+                        <a:lnSpc>
+                          <a:spcPct val="100000"/>
+                        </a:lnSpc>
+                        <a:spcBef>
+                          <a:spcPts val="0"/>
+                        </a:spcBef>
+                        <a:spcAft>
+                          <a:spcPts val="0"/>
+                        </a:spcAft>
+                        <a:buClrTx/>
+                        <a:buSzTx/>
+                        <a:buFontTx/>
+                        <a:buNone/>
+                        <a:tabLst/>
+                        <a:defRPr/>
+                      </a:pPr>
+                      <a:r>
+                        <a:rPr lang="en-US" sz="1050" dirty="0" smtClean="0"/>
+                        <a:t>1</a:t>
+                      </a:r>
+                      <a:endParaRPr lang="fr-FR" sz="1050" dirty="0" smtClean="0"/>
+                    </a:p>
+                  </a:txBody>
+                  <a:tcPr/>
+                </a:tc>
+                <a:tc>
+                  <a:txBody>
+                    <a:bodyPr/>
+                    <a:lstStyle/>
+                    <a:p>
+                      <a:r>
+                        <a:rPr lang="fr-FR" sz="1050" dirty="0" smtClean="0"/>
+                        <a:t>Servo.cpp</a:t>
+                      </a:r>
+                      <a:endParaRPr lang="fr-FR" sz="1050" dirty="0"/>
+                    </a:p>
+                  </a:txBody>
+                  <a:tcPr/>
+                </a:tc>
+                <a:tc>
+                  <a:txBody>
+                    <a:bodyPr/>
+                    <a:lstStyle/>
+                    <a:p>
+                      <a:r>
+                        <a:rPr lang="en-US" sz="1050" dirty="0" smtClean="0"/>
+                        <a:t>Drive up to 12 servos</a:t>
+                      </a:r>
+                      <a:endParaRPr lang="fr-FR" sz="1050" dirty="0"/>
+                    </a:p>
+                  </a:txBody>
+                  <a:tcPr/>
+                </a:tc>
+              </a:tr>
+              <a:tr h="389978">
+                <a:tc>
+                  <a:txBody>
+                    <a:bodyPr/>
+                    <a:lstStyle/>
+                    <a:p>
+                      <a:r>
+                        <a:rPr lang="en-US" sz="1050" dirty="0" smtClean="0"/>
+                        <a:t>2</a:t>
+                      </a:r>
+                      <a:endParaRPr lang="fr-FR" sz="1050" dirty="0"/>
+                    </a:p>
+                  </a:txBody>
+                  <a:tcPr/>
+                </a:tc>
+                <a:tc>
+                  <a:txBody>
+                    <a:bodyPr/>
+                    <a:lstStyle/>
+                    <a:p>
+                      <a:r>
+                        <a:rPr lang="fr-FR" sz="1050" dirty="0" smtClean="0"/>
+                        <a:t>Navigation.cpp</a:t>
+                      </a:r>
+                      <a:endParaRPr lang="fr-FR" sz="1050" dirty="0"/>
+                    </a:p>
+                  </a:txBody>
+                  <a:tcPr/>
+                </a:tc>
+                <a:tc>
+                  <a:txBody>
+                    <a:bodyPr/>
+                    <a:lstStyle/>
+                    <a:p>
+                      <a:r>
+                        <a:rPr lang="en-US" sz="1050" dirty="0" smtClean="0"/>
+                        <a:t>Generates</a:t>
+                      </a:r>
+                      <a:r>
+                        <a:rPr lang="en-US" sz="1050" baseline="0" dirty="0" smtClean="0"/>
+                        <a:t> propulsion steppers motors command</a:t>
+                      </a:r>
+                      <a:endParaRPr lang="fr-FR" sz="1050" dirty="0"/>
+                    </a:p>
+                  </a:txBody>
+                  <a:tcPr/>
+                </a:tc>
+              </a:tr>
+              <a:tr h="223178">
+                <a:tc>
+                  <a:txBody>
+                    <a:bodyPr/>
+                    <a:lstStyle/>
+                    <a:p>
+                      <a:r>
+                        <a:rPr lang="en-US" sz="1050" dirty="0" smtClean="0"/>
+                        <a:t>3</a:t>
+                      </a:r>
+                      <a:endParaRPr lang="fr-FR" sz="1050" dirty="0"/>
+                    </a:p>
+                  </a:txBody>
+                  <a:tcPr/>
+                </a:tc>
+                <a:tc>
+                  <a:txBody>
+                    <a:bodyPr/>
+                    <a:lstStyle/>
+                    <a:p>
+                      <a:r>
+                        <a:rPr lang="fr-FR" sz="1050" kern="1200" dirty="0" smtClean="0">
+                          <a:solidFill>
+                            <a:schemeClr val="dk1"/>
+                          </a:solidFill>
+                          <a:latin typeface="+mn-lt"/>
+                          <a:ea typeface="+mn-ea"/>
+                          <a:cs typeface="+mn-cs"/>
+                        </a:rPr>
+                        <a:t>GpioTools.cpp</a:t>
+                      </a:r>
+                      <a:endParaRPr lang="fr-FR" sz="1050" dirty="0"/>
+                    </a:p>
+                  </a:txBody>
+                  <a:tcPr/>
+                </a:tc>
+                <a:tc>
+                  <a:txBody>
+                    <a:bodyPr/>
+                    <a:lstStyle/>
+                    <a:p>
+                      <a:r>
+                        <a:rPr lang="en-US" sz="1050" dirty="0" err="1" smtClean="0"/>
+                        <a:t>Gpio</a:t>
+                      </a:r>
+                      <a:r>
+                        <a:rPr lang="en-US" sz="1050" dirty="0" smtClean="0"/>
+                        <a:t> input filters and </a:t>
+                      </a:r>
+                      <a:r>
+                        <a:rPr lang="en-US" sz="1050" dirty="0" err="1" smtClean="0"/>
+                        <a:t>Gpio</a:t>
+                      </a:r>
+                      <a:r>
+                        <a:rPr lang="en-US" sz="1050" dirty="0" smtClean="0"/>
+                        <a:t> output PWM</a:t>
+                      </a:r>
+                      <a:r>
+                        <a:rPr lang="en-US" sz="1050" baseline="0" dirty="0" smtClean="0"/>
+                        <a:t> generation</a:t>
+                      </a:r>
+                      <a:endParaRPr lang="fr-FR" sz="1050" dirty="0"/>
+                    </a:p>
+                  </a:txBody>
+                  <a:tcPr/>
+                </a:tc>
+              </a:tr>
+              <a:tr h="223178">
+                <a:tc>
+                  <a:txBody>
+                    <a:bodyPr/>
+                    <a:lstStyle/>
+                    <a:p>
+                      <a:pPr marL="0" marR="0" lvl="0" indent="0" algn="l" defTabSz="914400" rtl="0" eaLnBrk="1" fontAlgn="auto" latinLnBrk="0" hangingPunct="1">
+                        <a:lnSpc>
+                          <a:spcPct val="100000"/>
+                        </a:lnSpc>
+                        <a:spcBef>
+                          <a:spcPts val="0"/>
+                        </a:spcBef>
+                        <a:spcAft>
+                          <a:spcPts val="0"/>
+                        </a:spcAft>
+                        <a:buClrTx/>
+                        <a:buSzTx/>
+                        <a:buFontTx/>
+                        <a:buNone/>
+                        <a:tabLst/>
+                        <a:defRPr/>
+                      </a:pPr>
+                      <a:r>
+                        <a:rPr lang="en-US" sz="1050" dirty="0" smtClean="0"/>
+                        <a:t>4</a:t>
+                      </a:r>
+                      <a:endParaRPr lang="fr-FR" sz="1050" dirty="0" smtClean="0"/>
+                    </a:p>
+                  </a:txBody>
+                  <a:tcPr/>
+                </a:tc>
+                <a:tc>
+                  <a:txBody>
+                    <a:bodyPr/>
+                    <a:lstStyle/>
+                    <a:p>
+                      <a:r>
+                        <a:rPr lang="fr-FR" sz="1050" kern="1200" dirty="0" smtClean="0">
+                          <a:solidFill>
+                            <a:schemeClr val="dk1"/>
+                          </a:solidFill>
+                          <a:latin typeface="+mn-lt"/>
+                          <a:ea typeface="+mn-ea"/>
+                          <a:cs typeface="+mn-cs"/>
+                        </a:rPr>
+                        <a:t>Buzzer.cpp</a:t>
+                      </a:r>
+                      <a:endParaRPr lang="fr-FR" sz="1050" dirty="0"/>
+                    </a:p>
+                  </a:txBody>
+                  <a:tcPr/>
+                </a:tc>
+                <a:tc>
+                  <a:txBody>
+                    <a:bodyPr/>
+                    <a:lstStyle/>
+                    <a:p>
+                      <a:r>
+                        <a:rPr lang="en-US" sz="1050" dirty="0" smtClean="0"/>
+                        <a:t>Generate a frequency signal for the buzzer</a:t>
+                      </a:r>
+                      <a:endParaRPr lang="fr-FR" sz="1050" dirty="0"/>
+                    </a:p>
+                  </a:txBody>
+                  <a:tcPr/>
+                </a:tc>
+              </a:tr>
+            </a:tbl>
+          </a:graphicData>
+        </a:graphic>
+      </p:graphicFrame>
+    </p:spTree>
+    <p:extLst>
+      <p:ext uri="{BB962C8B-B14F-4D97-AF65-F5344CB8AC3E}">
+        <p14:creationId xmlns:p14="http://schemas.microsoft.com/office/powerpoint/2010/main" val="2684839572"/>
+      </p:ext>
+    </p:extLst>
+  </p:cSld>
+  <p:clrMapOvr>
+    <a:masterClrMapping/>
+  </p:clrMapOvr>
 </p:sld>
 </file>
 

</xml_diff>

<commit_message>
Anti-collision ajouté en simu
</commit_message>
<xml_diff>
--- a/docs/SwArchitecture.pptx
+++ b/docs/SwArchitecture.pptx
@@ -13,7 +13,8 @@
     <p:sldId id="258" r:id="rId7"/>
     <p:sldId id="263" r:id="rId8"/>
     <p:sldId id="259" r:id="rId9"/>
-    <p:sldId id="265" r:id="rId10"/>
+    <p:sldId id="266" r:id="rId10"/>
+    <p:sldId id="265" r:id="rId11"/>
   </p:sldIdLst>
   <p:sldSz cx="12192000" cy="6858000"/>
   <p:notesSz cx="6858000" cy="9144000"/>
@@ -3018,6 +3019,454 @@
 </p:sld>
 </file>
 
+<file path=ppt/slides/slide10.xml><?xml version="1.0" encoding="utf-8"?>
+<p:sld xmlns:a="http://schemas.openxmlformats.org/drawingml/2006/main" xmlns:r="http://schemas.openxmlformats.org/officeDocument/2006/relationships" xmlns:p="http://schemas.openxmlformats.org/presentationml/2006/main">
+  <p:cSld>
+    <p:spTree>
+      <p:nvGrpSpPr>
+        <p:cNvPr id="1" name=""/>
+        <p:cNvGrpSpPr/>
+        <p:nvPr/>
+      </p:nvGrpSpPr>
+      <p:grpSpPr>
+        <a:xfrm>
+          <a:off x="0" y="0"/>
+          <a:ext cx="0" cy="0"/>
+          <a:chOff x="0" y="0"/>
+          <a:chExt cx="0" cy="0"/>
+        </a:xfrm>
+      </p:grpSpPr>
+      <p:sp>
+        <p:nvSpPr>
+          <p:cNvPr id="2" name="Titre 1"/>
+          <p:cNvSpPr>
+            <a:spLocks noGrp="1"/>
+          </p:cNvSpPr>
+          <p:nvPr>
+            <p:ph type="title"/>
+          </p:nvPr>
+        </p:nvSpPr>
+        <p:spPr/>
+        <p:txBody>
+          <a:bodyPr/>
+          <a:lstStyle/>
+          <a:p>
+            <a:r>
+              <a:rPr lang="en-US" dirty="0" smtClean="0"/>
+              <a:t>Timers</a:t>
+            </a:r>
+            <a:endParaRPr lang="fr-FR" dirty="0"/>
+          </a:p>
+        </p:txBody>
+      </p:sp>
+      <p:sp>
+        <p:nvSpPr>
+          <p:cNvPr id="3" name="Espace réservé du contenu 2"/>
+          <p:cNvSpPr>
+            <a:spLocks noGrp="1"/>
+          </p:cNvSpPr>
+          <p:nvPr>
+            <p:ph idx="1"/>
+          </p:nvPr>
+        </p:nvSpPr>
+        <p:spPr/>
+        <p:txBody>
+          <a:bodyPr/>
+          <a:lstStyle/>
+          <a:p>
+            <a:pPr marL="0" indent="0">
+              <a:buNone/>
+            </a:pPr>
+            <a:r>
+              <a:rPr lang="en-US" dirty="0" smtClean="0"/>
+              <a:t>Timers affectation is defined in Robot2017.cpp</a:t>
+            </a:r>
+            <a:endParaRPr lang="fr-FR" dirty="0"/>
+          </a:p>
+        </p:txBody>
+      </p:sp>
+      <p:graphicFrame>
+        <p:nvGraphicFramePr>
+          <p:cNvPr id="4" name="Tableau 3"/>
+          <p:cNvGraphicFramePr>
+            <a:graphicFrameLocks noGrp="1"/>
+          </p:cNvGraphicFramePr>
+          <p:nvPr>
+            <p:extLst>
+              <p:ext uri="{D42A27DB-BD31-4B8C-83A1-F6EECF244321}">
+                <p14:modId xmlns:p14="http://schemas.microsoft.com/office/powerpoint/2010/main" val="2108532463"/>
+              </p:ext>
+            </p:extLst>
+          </p:nvPr>
+        </p:nvGraphicFramePr>
+        <p:xfrm>
+          <a:off x="977900" y="2463799"/>
+          <a:ext cx="8231965" cy="1647278"/>
+        </p:xfrm>
+        <a:graphic>
+          <a:graphicData uri="http://schemas.openxmlformats.org/drawingml/2006/table">
+            <a:tbl>
+              <a:tblPr firstRow="1" bandRow="1">
+                <a:tableStyleId>{69C7853C-536D-4A76-A0AE-DD22124D55A5}</a:tableStyleId>
+              </a:tblPr>
+              <a:tblGrid>
+                <a:gridCol w="1291011"/>
+                <a:gridCol w="2265548"/>
+                <a:gridCol w="4675406"/>
+              </a:tblGrid>
+              <a:tr h="209732">
+                <a:tc>
+                  <a:txBody>
+                    <a:bodyPr/>
+                    <a:lstStyle/>
+                    <a:p>
+                      <a:r>
+                        <a:rPr lang="en-US" sz="1050" dirty="0" smtClean="0"/>
+                        <a:t>Timer</a:t>
+                      </a:r>
+                      <a:endParaRPr lang="fr-FR" sz="1050" dirty="0"/>
+                    </a:p>
+                  </a:txBody>
+                  <a:tcPr/>
+                </a:tc>
+                <a:tc>
+                  <a:txBody>
+                    <a:bodyPr/>
+                    <a:lstStyle/>
+                    <a:p>
+                      <a:r>
+                        <a:rPr lang="en-US" sz="1050" dirty="0" smtClean="0"/>
+                        <a:t>Used</a:t>
+                      </a:r>
+                      <a:r>
+                        <a:rPr lang="en-US" sz="1050" baseline="0" dirty="0" smtClean="0"/>
+                        <a:t> in file</a:t>
+                      </a:r>
+                      <a:endParaRPr lang="fr-FR" sz="1050" dirty="0"/>
+                    </a:p>
+                  </a:txBody>
+                  <a:tcPr/>
+                </a:tc>
+                <a:tc>
+                  <a:txBody>
+                    <a:bodyPr/>
+                    <a:lstStyle/>
+                    <a:p>
+                      <a:r>
+                        <a:rPr lang="en-US" sz="1050" dirty="0" smtClean="0"/>
+                        <a:t>Content</a:t>
+                      </a:r>
+                      <a:endParaRPr lang="fr-FR" sz="1050" dirty="0"/>
+                    </a:p>
+                  </a:txBody>
+                  <a:tcPr/>
+                </a:tc>
+              </a:tr>
+              <a:tr h="223178">
+                <a:tc>
+                  <a:txBody>
+                    <a:bodyPr/>
+                    <a:lstStyle/>
+                    <a:p>
+                      <a:r>
+                        <a:rPr lang="en-US" sz="1050" dirty="0" smtClean="0"/>
+                        <a:t>0</a:t>
+                      </a:r>
+                      <a:endParaRPr lang="fr-FR" sz="1050" dirty="0"/>
+                    </a:p>
+                  </a:txBody>
+                  <a:tcPr/>
+                </a:tc>
+                <a:tc>
+                  <a:txBody>
+                    <a:bodyPr/>
+                    <a:lstStyle/>
+                    <a:p>
+                      <a:r>
+                        <a:rPr lang="fr-FR" sz="1050" dirty="0" err="1" smtClean="0"/>
+                        <a:t>FreeRTOS_ARM.c</a:t>
+                      </a:r>
+                      <a:endParaRPr lang="fr-FR" sz="1050" dirty="0"/>
+                    </a:p>
+                  </a:txBody>
+                  <a:tcPr/>
+                </a:tc>
+                <a:tc>
+                  <a:txBody>
+                    <a:bodyPr/>
+                    <a:lstStyle/>
+                    <a:p>
+                      <a:r>
+                        <a:rPr lang="en-US" sz="1050" dirty="0" smtClean="0"/>
+                        <a:t>Get thread CPU usage</a:t>
+                      </a:r>
+                      <a:endParaRPr lang="fr-FR" sz="1050" dirty="0"/>
+                    </a:p>
+                  </a:txBody>
+                  <a:tcPr/>
+                </a:tc>
+              </a:tr>
+              <a:tr h="223178">
+                <a:tc>
+                  <a:txBody>
+                    <a:bodyPr/>
+                    <a:lstStyle/>
+                    <a:p>
+                      <a:pPr marL="0" marR="0" lvl="0" indent="0" algn="l" defTabSz="914400" rtl="0" eaLnBrk="1" fontAlgn="auto" latinLnBrk="0" hangingPunct="1">
+                        <a:lnSpc>
+                          <a:spcPct val="100000"/>
+                        </a:lnSpc>
+                        <a:spcBef>
+                          <a:spcPts val="0"/>
+                        </a:spcBef>
+                        <a:spcAft>
+                          <a:spcPts val="0"/>
+                        </a:spcAft>
+                        <a:buClrTx/>
+                        <a:buSzTx/>
+                        <a:buFontTx/>
+                        <a:buNone/>
+                        <a:tabLst/>
+                        <a:defRPr/>
+                      </a:pPr>
+                      <a:r>
+                        <a:rPr lang="en-US" sz="1050" dirty="0" smtClean="0"/>
+                        <a:t>1</a:t>
+                      </a:r>
+                      <a:endParaRPr lang="fr-FR" sz="1050" dirty="0" smtClean="0"/>
+                    </a:p>
+                  </a:txBody>
+                  <a:tcPr/>
+                </a:tc>
+                <a:tc>
+                  <a:txBody>
+                    <a:bodyPr/>
+                    <a:lstStyle/>
+                    <a:p>
+                      <a:r>
+                        <a:rPr lang="fr-FR" sz="1050" dirty="0" smtClean="0"/>
+                        <a:t>Servo.cpp</a:t>
+                      </a:r>
+                      <a:endParaRPr lang="fr-FR" sz="1050" dirty="0"/>
+                    </a:p>
+                  </a:txBody>
+                  <a:tcPr/>
+                </a:tc>
+                <a:tc>
+                  <a:txBody>
+                    <a:bodyPr/>
+                    <a:lstStyle/>
+                    <a:p>
+                      <a:r>
+                        <a:rPr lang="en-US" sz="1050" dirty="0" smtClean="0"/>
+                        <a:t>Drive up to 12 servos</a:t>
+                      </a:r>
+                      <a:endParaRPr lang="fr-FR" sz="1050" dirty="0"/>
+                    </a:p>
+                  </a:txBody>
+                  <a:tcPr/>
+                </a:tc>
+              </a:tr>
+              <a:tr h="389978">
+                <a:tc>
+                  <a:txBody>
+                    <a:bodyPr/>
+                    <a:lstStyle/>
+                    <a:p>
+                      <a:r>
+                        <a:rPr lang="en-US" sz="1050" dirty="0" smtClean="0"/>
+                        <a:t>2</a:t>
+                      </a:r>
+                      <a:endParaRPr lang="fr-FR" sz="1050" dirty="0"/>
+                    </a:p>
+                  </a:txBody>
+                  <a:tcPr/>
+                </a:tc>
+                <a:tc>
+                  <a:txBody>
+                    <a:bodyPr/>
+                    <a:lstStyle/>
+                    <a:p>
+                      <a:r>
+                        <a:rPr lang="fr-FR" sz="1050" dirty="0" smtClean="0"/>
+                        <a:t>Navigation.cpp</a:t>
+                      </a:r>
+                      <a:endParaRPr lang="fr-FR" sz="1050" dirty="0"/>
+                    </a:p>
+                  </a:txBody>
+                  <a:tcPr/>
+                </a:tc>
+                <a:tc>
+                  <a:txBody>
+                    <a:bodyPr/>
+                    <a:lstStyle/>
+                    <a:p>
+                      <a:r>
+                        <a:rPr lang="en-US" sz="1050" dirty="0" smtClean="0"/>
+                        <a:t>Generates</a:t>
+                      </a:r>
+                      <a:r>
+                        <a:rPr lang="en-US" sz="1050" baseline="0" dirty="0" smtClean="0"/>
+                        <a:t> propulsion steppers motors command</a:t>
+                      </a:r>
+                      <a:endParaRPr lang="fr-FR" sz="1050" dirty="0"/>
+                    </a:p>
+                  </a:txBody>
+                  <a:tcPr/>
+                </a:tc>
+              </a:tr>
+              <a:tr h="223178">
+                <a:tc>
+                  <a:txBody>
+                    <a:bodyPr/>
+                    <a:lstStyle/>
+                    <a:p>
+                      <a:r>
+                        <a:rPr lang="en-US" sz="1050" dirty="0" smtClean="0"/>
+                        <a:t>3</a:t>
+                      </a:r>
+                      <a:endParaRPr lang="fr-FR" sz="1050" dirty="0"/>
+                    </a:p>
+                  </a:txBody>
+                  <a:tcPr/>
+                </a:tc>
+                <a:tc>
+                  <a:txBody>
+                    <a:bodyPr/>
+                    <a:lstStyle/>
+                    <a:p>
+                      <a:r>
+                        <a:rPr lang="fr-FR" sz="1050" kern="1200" dirty="0" smtClean="0">
+                          <a:solidFill>
+                            <a:schemeClr val="dk1"/>
+                          </a:solidFill>
+                          <a:latin typeface="+mn-lt"/>
+                          <a:ea typeface="+mn-ea"/>
+                          <a:cs typeface="+mn-cs"/>
+                        </a:rPr>
+                        <a:t>GpioTools.cpp</a:t>
+                      </a:r>
+                      <a:endParaRPr lang="fr-FR" sz="1050" dirty="0"/>
+                    </a:p>
+                  </a:txBody>
+                  <a:tcPr/>
+                </a:tc>
+                <a:tc>
+                  <a:txBody>
+                    <a:bodyPr/>
+                    <a:lstStyle/>
+                    <a:p>
+                      <a:r>
+                        <a:rPr lang="en-US" sz="1050" dirty="0" err="1" smtClean="0"/>
+                        <a:t>Gpio</a:t>
+                      </a:r>
+                      <a:r>
+                        <a:rPr lang="en-US" sz="1050" dirty="0" smtClean="0"/>
+                        <a:t> input filters and </a:t>
+                      </a:r>
+                      <a:r>
+                        <a:rPr lang="en-US" sz="1050" dirty="0" err="1" smtClean="0"/>
+                        <a:t>Gpio</a:t>
+                      </a:r>
+                      <a:r>
+                        <a:rPr lang="en-US" sz="1050" dirty="0" smtClean="0"/>
+                        <a:t> output PWM</a:t>
+                      </a:r>
+                      <a:r>
+                        <a:rPr lang="en-US" sz="1050" baseline="0" dirty="0" smtClean="0"/>
+                        <a:t> generation</a:t>
+                      </a:r>
+                      <a:endParaRPr lang="fr-FR" sz="1050" dirty="0"/>
+                    </a:p>
+                  </a:txBody>
+                  <a:tcPr/>
+                </a:tc>
+              </a:tr>
+              <a:tr h="223178">
+                <a:tc>
+                  <a:txBody>
+                    <a:bodyPr/>
+                    <a:lstStyle/>
+                    <a:p>
+                      <a:pPr marL="0" marR="0" lvl="0" indent="0" algn="l" defTabSz="914400" rtl="0" eaLnBrk="1" fontAlgn="auto" latinLnBrk="0" hangingPunct="1">
+                        <a:lnSpc>
+                          <a:spcPct val="100000"/>
+                        </a:lnSpc>
+                        <a:spcBef>
+                          <a:spcPts val="0"/>
+                        </a:spcBef>
+                        <a:spcAft>
+                          <a:spcPts val="0"/>
+                        </a:spcAft>
+                        <a:buClrTx/>
+                        <a:buSzTx/>
+                        <a:buFontTx/>
+                        <a:buNone/>
+                        <a:tabLst/>
+                        <a:defRPr/>
+                      </a:pPr>
+                      <a:r>
+                        <a:rPr lang="en-US" sz="1050" dirty="0" smtClean="0"/>
+                        <a:t>4</a:t>
+                      </a:r>
+                      <a:endParaRPr lang="fr-FR" sz="1050" dirty="0" smtClean="0"/>
+                    </a:p>
+                  </a:txBody>
+                  <a:tcPr/>
+                </a:tc>
+                <a:tc>
+                  <a:txBody>
+                    <a:bodyPr/>
+                    <a:lstStyle/>
+                    <a:p>
+                      <a:r>
+                        <a:rPr lang="fr-FR" sz="1050" kern="1200" dirty="0" smtClean="0">
+                          <a:solidFill>
+                            <a:schemeClr val="dk1"/>
+                          </a:solidFill>
+                          <a:latin typeface="+mn-lt"/>
+                          <a:ea typeface="+mn-ea"/>
+                          <a:cs typeface="+mn-cs"/>
+                        </a:rPr>
+                        <a:t>Buzzer.cpp</a:t>
+                      </a:r>
+                      <a:endParaRPr lang="fr-FR" sz="1050" dirty="0"/>
+                    </a:p>
+                  </a:txBody>
+                  <a:tcPr/>
+                </a:tc>
+                <a:tc>
+                  <a:txBody>
+                    <a:bodyPr/>
+                    <a:lstStyle/>
+                    <a:p>
+                      <a:r>
+                        <a:rPr lang="en-US" sz="1050" dirty="0" smtClean="0"/>
+                        <a:t>Generate a frequency signal for the buzzer</a:t>
+                      </a:r>
+                      <a:endParaRPr lang="fr-FR" sz="1050" dirty="0"/>
+                    </a:p>
+                  </a:txBody>
+                  <a:tcPr/>
+                </a:tc>
+              </a:tr>
+            </a:tbl>
+          </a:graphicData>
+        </a:graphic>
+      </p:graphicFrame>
+    </p:spTree>
+    <p:extLst>
+      <p:ext uri="{BB962C8B-B14F-4D97-AF65-F5344CB8AC3E}">
+        <p14:creationId xmlns:p14="http://schemas.microsoft.com/office/powerpoint/2010/main" val="2684839572"/>
+      </p:ext>
+    </p:extLst>
+  </p:cSld>
+  <p:clrMapOvr>
+    <a:masterClrMapping/>
+  </p:clrMapOvr>
+</p:sld>
+</file>
+
 <file path=ppt/slides/slide2.xml><?xml version="1.0" encoding="utf-8"?>
 <p:sld xmlns:a="http://schemas.openxmlformats.org/drawingml/2006/main" xmlns:r="http://schemas.openxmlformats.org/officeDocument/2006/relationships" xmlns:p="http://schemas.openxmlformats.org/presentationml/2006/main">
   <p:cSld>
@@ -3279,13 +3728,8 @@
             </a:r>
             <a:r>
               <a:rPr lang="en-US" dirty="0" smtClean="0"/>
-              <a:t> </a:t>
-            </a:r>
-            <a:r>
-              <a:rPr lang="en-US" dirty="0" smtClean="0"/>
-              <a:t>Drivers)</a:t>
-            </a:r>
-            <a:endParaRPr lang="en-US" dirty="0" smtClean="0"/>
+              <a:t> Drivers)</a:t>
+            </a:r>
           </a:p>
         </p:txBody>
       </p:sp>
@@ -5356,11 +5800,7 @@
             </a:r>
             <a:r>
               <a:rPr lang="en-US" dirty="0" smtClean="0"/>
-              <a:t> : contains all </a:t>
-            </a:r>
-            <a:r>
-              <a:rPr lang="en-US" dirty="0" smtClean="0"/>
-              <a:t>microcontroller drivers </a:t>
+              <a:t> : contains all microcontroller drivers </a:t>
             </a:r>
           </a:p>
           <a:p>
@@ -5370,11 +5810,7 @@
             </a:r>
             <a:r>
               <a:rPr lang="en-US" dirty="0" smtClean="0"/>
-              <a:t> </a:t>
-            </a:r>
-            <a:r>
-              <a:rPr lang="en-US" dirty="0" smtClean="0"/>
-              <a:t>: a shared package between communicating SW to handle the network layer</a:t>
+              <a:t> : a shared package between communicating SW to handle the network layer</a:t>
             </a:r>
           </a:p>
           <a:p>
@@ -5384,13 +5820,8 @@
             </a:r>
             <a:r>
               <a:rPr lang="en-US" dirty="0" smtClean="0"/>
-              <a:t> : provides SW bricks to create a </a:t>
-            </a:r>
-            <a:r>
-              <a:rPr lang="en-US" dirty="0" smtClean="0"/>
-              <a:t>robot and board/peripheral drivers</a:t>
-            </a:r>
-            <a:endParaRPr lang="en-US" dirty="0" smtClean="0"/>
+              <a:t> : provides SW bricks to create a robot and board/peripheral drivers</a:t>
+            </a:r>
           </a:p>
           <a:p>
             <a:r>
@@ -5517,14 +5948,14 @@
                 <a:gridCol w="2843689">
                   <a:extLst>
                     <a:ext uri="{9D8B030D-6E8A-4147-A177-3AD203B41FA5}">
-                      <a16:colId xmlns="" xmlns:a16="http://schemas.microsoft.com/office/drawing/2014/main" val="4249046580"/>
+                      <a16:colId xmlns:a16="http://schemas.microsoft.com/office/drawing/2014/main" xmlns="" val="4249046580"/>
                     </a:ext>
                   </a:extLst>
                 </a:gridCol>
                 <a:gridCol w="7116439">
                   <a:extLst>
                     <a:ext uri="{9D8B030D-6E8A-4147-A177-3AD203B41FA5}">
-                      <a16:colId xmlns="" xmlns:a16="http://schemas.microsoft.com/office/drawing/2014/main" val="2166689304"/>
+                      <a16:colId xmlns:a16="http://schemas.microsoft.com/office/drawing/2014/main" xmlns="" val="2166689304"/>
                     </a:ext>
                   </a:extLst>
                 </a:gridCol>
@@ -5560,7 +5991,7 @@
                 </a:tc>
                 <a:extLst>
                   <a:ext uri="{0D108BD9-81ED-4DB2-BD59-A6C34878D82A}">
-                    <a16:rowId xmlns="" xmlns:a16="http://schemas.microsoft.com/office/drawing/2014/main" val="1558262199"/>
+                    <a16:rowId xmlns:a16="http://schemas.microsoft.com/office/drawing/2014/main" xmlns="" val="1558262199"/>
                   </a:ext>
                 </a:extLst>
               </a:tr>
@@ -5599,7 +6030,7 @@
                 </a:tc>
                 <a:extLst>
                   <a:ext uri="{0D108BD9-81ED-4DB2-BD59-A6C34878D82A}">
-                    <a16:rowId xmlns="" xmlns:a16="http://schemas.microsoft.com/office/drawing/2014/main" val="3975330181"/>
+                    <a16:rowId xmlns:a16="http://schemas.microsoft.com/office/drawing/2014/main" xmlns="" val="3975330181"/>
                   </a:ext>
                 </a:extLst>
               </a:tr>
@@ -5680,7 +6111,7 @@
                 </a:tc>
                 <a:extLst>
                   <a:ext uri="{0D108BD9-81ED-4DB2-BD59-A6C34878D82A}">
-                    <a16:rowId xmlns="" xmlns:a16="http://schemas.microsoft.com/office/drawing/2014/main" val="145727790"/>
+                    <a16:rowId xmlns:a16="http://schemas.microsoft.com/office/drawing/2014/main" xmlns="" val="145727790"/>
                   </a:ext>
                 </a:extLst>
               </a:tr>
@@ -5706,11 +6137,7 @@
                     <a:p>
                       <a:r>
                         <a:rPr lang="en-US" sz="1400" dirty="0" smtClean="0"/>
-                        <a:t>Drivers for </a:t>
-                      </a:r>
-                      <a:r>
-                        <a:rPr lang="en-US" sz="1400" dirty="0" smtClean="0"/>
-                        <a:t>microcontroller</a:t>
+                        <a:t>Drivers for microcontroller</a:t>
                       </a:r>
                       <a:r>
                         <a:rPr lang="en-US" sz="1400" baseline="0" dirty="0" smtClean="0"/>
@@ -5726,11 +6153,7 @@
                       </a:r>
                       <a:r>
                         <a:rPr lang="en-US" sz="1400" dirty="0" smtClean="0"/>
-                        <a:t>parts </a:t>
-                      </a:r>
-                      <a:r>
-                        <a:rPr lang="en-US" sz="1400" dirty="0" smtClean="0"/>
-                        <a:t>below)</a:t>
+                        <a:t>parts below)</a:t>
                       </a:r>
                       <a:endParaRPr lang="fr-FR" sz="1400" dirty="0"/>
                     </a:p>
@@ -5739,7 +6162,7 @@
                 </a:tc>
                 <a:extLst>
                   <a:ext uri="{0D108BD9-81ED-4DB2-BD59-A6C34878D82A}">
-                    <a16:rowId xmlns="" xmlns:a16="http://schemas.microsoft.com/office/drawing/2014/main" val="1909270051"/>
+                    <a16:rowId xmlns:a16="http://schemas.microsoft.com/office/drawing/2014/main" xmlns="" val="1909270051"/>
                   </a:ext>
                 </a:extLst>
               </a:tr>
@@ -5802,7 +6225,7 @@
                 </a:tc>
                 <a:extLst>
                   <a:ext uri="{0D108BD9-81ED-4DB2-BD59-A6C34878D82A}">
-                    <a16:rowId xmlns="" xmlns:a16="http://schemas.microsoft.com/office/drawing/2014/main" val="1361958173"/>
+                    <a16:rowId xmlns:a16="http://schemas.microsoft.com/office/drawing/2014/main" xmlns="" val="1361958173"/>
                   </a:ext>
                 </a:extLst>
               </a:tr>
@@ -6354,14 +6777,14 @@
                 <a:gridCol w="2843689">
                   <a:extLst>
                     <a:ext uri="{9D8B030D-6E8A-4147-A177-3AD203B41FA5}">
-                      <a16:colId xmlns="" xmlns:a16="http://schemas.microsoft.com/office/drawing/2014/main" val="4249046580"/>
+                      <a16:colId xmlns:a16="http://schemas.microsoft.com/office/drawing/2014/main" xmlns="" val="4249046580"/>
                     </a:ext>
                   </a:extLst>
                 </a:gridCol>
                 <a:gridCol w="7116439">
                   <a:extLst>
                     <a:ext uri="{9D8B030D-6E8A-4147-A177-3AD203B41FA5}">
-                      <a16:colId xmlns="" xmlns:a16="http://schemas.microsoft.com/office/drawing/2014/main" val="2166689304"/>
+                      <a16:colId xmlns:a16="http://schemas.microsoft.com/office/drawing/2014/main" xmlns="" val="2166689304"/>
                     </a:ext>
                   </a:extLst>
                 </a:gridCol>
@@ -6397,7 +6820,7 @@
                 </a:tc>
                 <a:extLst>
                   <a:ext uri="{0D108BD9-81ED-4DB2-BD59-A6C34878D82A}">
-                    <a16:rowId xmlns="" xmlns:a16="http://schemas.microsoft.com/office/drawing/2014/main" val="1558262199"/>
+                    <a16:rowId xmlns:a16="http://schemas.microsoft.com/office/drawing/2014/main" xmlns="" val="1558262199"/>
                   </a:ext>
                 </a:extLst>
               </a:tr>
@@ -6454,7 +6877,7 @@
                 </a:tc>
                 <a:extLst>
                   <a:ext uri="{0D108BD9-81ED-4DB2-BD59-A6C34878D82A}">
-                    <a16:rowId xmlns="" xmlns:a16="http://schemas.microsoft.com/office/drawing/2014/main" val="3975330181"/>
+                    <a16:rowId xmlns:a16="http://schemas.microsoft.com/office/drawing/2014/main" xmlns="" val="3975330181"/>
                   </a:ext>
                 </a:extLst>
               </a:tr>
@@ -6567,7 +6990,7 @@
                 </a:tc>
                 <a:extLst>
                   <a:ext uri="{0D108BD9-81ED-4DB2-BD59-A6C34878D82A}">
-                    <a16:rowId xmlns="" xmlns:a16="http://schemas.microsoft.com/office/drawing/2014/main" val="145727790"/>
+                    <a16:rowId xmlns:a16="http://schemas.microsoft.com/office/drawing/2014/main" xmlns="" val="145727790"/>
                   </a:ext>
                 </a:extLst>
               </a:tr>
@@ -6610,7 +7033,7 @@
                 </a:tc>
                 <a:extLst>
                   <a:ext uri="{0D108BD9-81ED-4DB2-BD59-A6C34878D82A}">
-                    <a16:rowId xmlns="" xmlns:a16="http://schemas.microsoft.com/office/drawing/2014/main" val="1909270051"/>
+                    <a16:rowId xmlns:a16="http://schemas.microsoft.com/office/drawing/2014/main" xmlns="" val="1909270051"/>
                   </a:ext>
                 </a:extLst>
               </a:tr>
@@ -6645,7 +7068,7 @@
                 </a:tc>
                 <a:extLst>
                   <a:ext uri="{0D108BD9-81ED-4DB2-BD59-A6C34878D82A}">
-                    <a16:rowId xmlns="" xmlns:a16="http://schemas.microsoft.com/office/drawing/2014/main" val="1361958173"/>
+                    <a16:rowId xmlns:a16="http://schemas.microsoft.com/office/drawing/2014/main" xmlns="" val="1361958173"/>
                   </a:ext>
                 </a:extLst>
               </a:tr>
@@ -8060,14 +8483,14 @@
                 <a:gridCol w="2843689">
                   <a:extLst>
                     <a:ext uri="{9D8B030D-6E8A-4147-A177-3AD203B41FA5}">
-                      <a16:colId xmlns="" xmlns:a16="http://schemas.microsoft.com/office/drawing/2014/main" val="4249046580"/>
+                      <a16:colId xmlns:a16="http://schemas.microsoft.com/office/drawing/2014/main" xmlns="" val="4249046580"/>
                     </a:ext>
                   </a:extLst>
                 </a:gridCol>
                 <a:gridCol w="7116439">
                   <a:extLst>
                     <a:ext uri="{9D8B030D-6E8A-4147-A177-3AD203B41FA5}">
-                      <a16:colId xmlns="" xmlns:a16="http://schemas.microsoft.com/office/drawing/2014/main" val="2166689304"/>
+                      <a16:colId xmlns:a16="http://schemas.microsoft.com/office/drawing/2014/main" xmlns="" val="2166689304"/>
                     </a:ext>
                   </a:extLst>
                 </a:gridCol>
@@ -8103,7 +8526,7 @@
                 </a:tc>
                 <a:extLst>
                   <a:ext uri="{0D108BD9-81ED-4DB2-BD59-A6C34878D82A}">
-                    <a16:rowId xmlns="" xmlns:a16="http://schemas.microsoft.com/office/drawing/2014/main" val="1558262199"/>
+                    <a16:rowId xmlns:a16="http://schemas.microsoft.com/office/drawing/2014/main" xmlns="" val="1558262199"/>
                   </a:ext>
                 </a:extLst>
               </a:tr>
@@ -8150,7 +8573,7 @@
                 </a:tc>
                 <a:extLst>
                   <a:ext uri="{0D108BD9-81ED-4DB2-BD59-A6C34878D82A}">
-                    <a16:rowId xmlns="" xmlns:a16="http://schemas.microsoft.com/office/drawing/2014/main" val="3975330181"/>
+                    <a16:rowId xmlns:a16="http://schemas.microsoft.com/office/drawing/2014/main" xmlns="" val="3975330181"/>
                   </a:ext>
                 </a:extLst>
               </a:tr>
@@ -8231,7 +8654,7 @@
                 </a:tc>
                 <a:extLst>
                   <a:ext uri="{0D108BD9-81ED-4DB2-BD59-A6C34878D82A}">
-                    <a16:rowId xmlns="" xmlns:a16="http://schemas.microsoft.com/office/drawing/2014/main" val="145727790"/>
+                    <a16:rowId xmlns:a16="http://schemas.microsoft.com/office/drawing/2014/main" xmlns="" val="145727790"/>
                   </a:ext>
                 </a:extLst>
               </a:tr>
@@ -8266,7 +8689,7 @@
                 </a:tc>
                 <a:extLst>
                   <a:ext uri="{0D108BD9-81ED-4DB2-BD59-A6C34878D82A}">
-                    <a16:rowId xmlns="" xmlns:a16="http://schemas.microsoft.com/office/drawing/2014/main" val="1909270051"/>
+                    <a16:rowId xmlns:a16="http://schemas.microsoft.com/office/drawing/2014/main" xmlns="" val="1909270051"/>
                   </a:ext>
                 </a:extLst>
               </a:tr>
@@ -8296,11 +8719,7 @@
                       </a:r>
                       <a:r>
                         <a:rPr lang="en-US" sz="1400" baseline="0" dirty="0" smtClean="0"/>
-                        <a:t> </a:t>
-                      </a:r>
-                      <a:r>
-                        <a:rPr lang="en-US" sz="1400" baseline="0" dirty="0" smtClean="0"/>
-                        <a:t>drivers (see green </a:t>
+                        <a:t> drivers (see green </a:t>
                       </a:r>
                       <a:r>
                         <a:rPr lang="en-US" sz="1400" baseline="0" dirty="0" err="1" smtClean="0"/>
@@ -8324,7 +8743,7 @@
                 </a:tc>
                 <a:extLst>
                   <a:ext uri="{0D108BD9-81ED-4DB2-BD59-A6C34878D82A}">
-                    <a16:rowId xmlns="" xmlns:a16="http://schemas.microsoft.com/office/drawing/2014/main" val="1361958173"/>
+                    <a16:rowId xmlns:a16="http://schemas.microsoft.com/office/drawing/2014/main" xmlns="" val="1361958173"/>
                   </a:ext>
                 </a:extLst>
               </a:tr>
@@ -8350,11 +8769,7 @@
                     <a:p>
                       <a:r>
                         <a:rPr lang="en-US" sz="1400" dirty="0" smtClean="0"/>
-                        <a:t>Actuators </a:t>
-                      </a:r>
-                      <a:r>
-                        <a:rPr lang="en-US" sz="1400" dirty="0" smtClean="0"/>
-                        <a:t>drivers </a:t>
+                        <a:t>Actuators drivers </a:t>
                       </a:r>
                       <a:r>
                         <a:rPr lang="en-US" sz="1400" baseline="0" dirty="0" smtClean="0"/>
@@ -8543,14 +8958,14 @@
                 <a:gridCol w="2843689">
                   <a:extLst>
                     <a:ext uri="{9D8B030D-6E8A-4147-A177-3AD203B41FA5}">
-                      <a16:colId xmlns="" xmlns:a16="http://schemas.microsoft.com/office/drawing/2014/main" val="4249046580"/>
+                      <a16:colId xmlns:a16="http://schemas.microsoft.com/office/drawing/2014/main" xmlns="" val="4249046580"/>
                     </a:ext>
                   </a:extLst>
                 </a:gridCol>
                 <a:gridCol w="7116439">
                   <a:extLst>
                     <a:ext uri="{9D8B030D-6E8A-4147-A177-3AD203B41FA5}">
-                      <a16:colId xmlns="" xmlns:a16="http://schemas.microsoft.com/office/drawing/2014/main" val="2166689304"/>
+                      <a16:colId xmlns:a16="http://schemas.microsoft.com/office/drawing/2014/main" xmlns="" val="2166689304"/>
                     </a:ext>
                   </a:extLst>
                 </a:gridCol>
@@ -8586,7 +9001,7 @@
                 </a:tc>
                 <a:extLst>
                   <a:ext uri="{0D108BD9-81ED-4DB2-BD59-A6C34878D82A}">
-                    <a16:rowId xmlns="" xmlns:a16="http://schemas.microsoft.com/office/drawing/2014/main" val="1558262199"/>
+                    <a16:rowId xmlns:a16="http://schemas.microsoft.com/office/drawing/2014/main" xmlns="" val="1558262199"/>
                   </a:ext>
                 </a:extLst>
               </a:tr>
@@ -8625,7 +9040,7 @@
                 </a:tc>
                 <a:extLst>
                   <a:ext uri="{0D108BD9-81ED-4DB2-BD59-A6C34878D82A}">
-                    <a16:rowId xmlns="" xmlns:a16="http://schemas.microsoft.com/office/drawing/2014/main" val="3975330181"/>
+                    <a16:rowId xmlns:a16="http://schemas.microsoft.com/office/drawing/2014/main" xmlns="" val="3975330181"/>
                   </a:ext>
                 </a:extLst>
               </a:tr>
@@ -8694,7 +9109,7 @@
                 </a:tc>
                 <a:extLst>
                   <a:ext uri="{0D108BD9-81ED-4DB2-BD59-A6C34878D82A}">
-                    <a16:rowId xmlns="" xmlns:a16="http://schemas.microsoft.com/office/drawing/2014/main" val="145727790"/>
+                    <a16:rowId xmlns:a16="http://schemas.microsoft.com/office/drawing/2014/main" xmlns="" val="145727790"/>
                   </a:ext>
                 </a:extLst>
               </a:tr>
@@ -8749,7 +9164,7 @@
                 </a:tc>
                 <a:extLst>
                   <a:ext uri="{0D108BD9-81ED-4DB2-BD59-A6C34878D82A}">
-                    <a16:rowId xmlns="" xmlns:a16="http://schemas.microsoft.com/office/drawing/2014/main" val="1909270051"/>
+                    <a16:rowId xmlns:a16="http://schemas.microsoft.com/office/drawing/2014/main" xmlns="" val="1909270051"/>
                   </a:ext>
                 </a:extLst>
               </a:tr>
@@ -8811,7 +9226,7 @@
           <a:p>
             <a:r>
               <a:rPr lang="en-US" dirty="0" smtClean="0"/>
-              <a:t>Interrupts / Threading</a:t>
+              <a:t>Interrupt</a:t>
             </a:r>
             <a:endParaRPr lang="fr-FR" dirty="0"/>
           </a:p>
@@ -8826,14 +9241,14 @@
           <p:nvPr>
             <p:extLst>
               <p:ext uri="{D42A27DB-BD31-4B8C-83A1-F6EECF244321}">
-                <p14:modId xmlns:p14="http://schemas.microsoft.com/office/powerpoint/2010/main" val="3869567937"/>
+                <p14:modId xmlns:p14="http://schemas.microsoft.com/office/powerpoint/2010/main" val="3340247222"/>
               </p:ext>
             </p:extLst>
           </p:nvPr>
         </p:nvGraphicFramePr>
         <p:xfrm>
           <a:off x="977900" y="2463799"/>
-          <a:ext cx="10375901" cy="3980071"/>
+          <a:ext cx="10375901" cy="2956560"/>
         </p:xfrm>
         <a:graphic>
           <a:graphicData uri="http://schemas.openxmlformats.org/drawingml/2006/table">
@@ -8854,52 +9269,52 @@
                     <a:lstStyle/>
                     <a:p>
                       <a:r>
-                        <a:rPr lang="en-US" sz="1050" dirty="0" smtClean="0"/>
+                        <a:rPr lang="en-US" sz="1400" dirty="0" smtClean="0"/>
                         <a:t>Type</a:t>
                       </a:r>
-                      <a:endParaRPr lang="fr-FR" sz="1050" dirty="0"/>
-                    </a:p>
-                  </a:txBody>
-                  <a:tcPr/>
-                </a:tc>
-                <a:tc>
-                  <a:txBody>
-                    <a:bodyPr/>
-                    <a:lstStyle/>
-                    <a:p>
-                      <a:r>
-                        <a:rPr lang="en-US" sz="1050" dirty="0" smtClean="0"/>
+                      <a:endParaRPr lang="fr-FR" sz="1400" dirty="0"/>
+                    </a:p>
+                  </a:txBody>
+                  <a:tcPr/>
+                </a:tc>
+                <a:tc>
+                  <a:txBody>
+                    <a:bodyPr/>
+                    <a:lstStyle/>
+                    <a:p>
+                      <a:r>
+                        <a:rPr lang="en-US" sz="1400" dirty="0" smtClean="0"/>
                         <a:t>Function</a:t>
                       </a:r>
-                      <a:endParaRPr lang="fr-FR" sz="1050" dirty="0"/>
-                    </a:p>
-                  </a:txBody>
-                  <a:tcPr/>
-                </a:tc>
-                <a:tc>
-                  <a:txBody>
-                    <a:bodyPr/>
-                    <a:lstStyle/>
-                    <a:p>
-                      <a:r>
-                        <a:rPr lang="en-US" sz="1050" dirty="0" err="1" smtClean="0"/>
+                      <a:endParaRPr lang="fr-FR" sz="1400" dirty="0"/>
+                    </a:p>
+                  </a:txBody>
+                  <a:tcPr/>
+                </a:tc>
+                <a:tc>
+                  <a:txBody>
+                    <a:bodyPr/>
+                    <a:lstStyle/>
+                    <a:p>
+                      <a:r>
+                        <a:rPr lang="en-US" sz="1400" dirty="0" err="1" smtClean="0"/>
                         <a:t>Occurence</a:t>
                       </a:r>
-                      <a:endParaRPr lang="fr-FR" sz="1050" dirty="0"/>
-                    </a:p>
-                  </a:txBody>
-                  <a:tcPr/>
-                </a:tc>
-                <a:tc>
-                  <a:txBody>
-                    <a:bodyPr/>
-                    <a:lstStyle/>
-                    <a:p>
-                      <a:r>
-                        <a:rPr lang="en-US" sz="1050" dirty="0" smtClean="0"/>
+                      <a:endParaRPr lang="fr-FR" sz="1400" dirty="0"/>
+                    </a:p>
+                  </a:txBody>
+                  <a:tcPr/>
+                </a:tc>
+                <a:tc>
+                  <a:txBody>
+                    <a:bodyPr/>
+                    <a:lstStyle/>
+                    <a:p>
+                      <a:r>
+                        <a:rPr lang="en-US" sz="1400" dirty="0" smtClean="0"/>
                         <a:t>Content</a:t>
                       </a:r>
-                      <a:endParaRPr lang="fr-FR" sz="1050" dirty="0"/>
+                      <a:endParaRPr lang="fr-FR" sz="1400" dirty="0"/>
                     </a:p>
                   </a:txBody>
                   <a:tcPr/>
@@ -8912,60 +9327,60 @@
                     <a:lstStyle/>
                     <a:p>
                       <a:r>
-                        <a:rPr lang="en-US" sz="1050" dirty="0" smtClean="0"/>
+                        <a:rPr lang="en-US" sz="1400" dirty="0" smtClean="0"/>
                         <a:t>IT</a:t>
                       </a:r>
-                      <a:endParaRPr lang="fr-FR" sz="1050" dirty="0"/>
-                    </a:p>
-                  </a:txBody>
-                  <a:tcPr/>
-                </a:tc>
-                <a:tc>
-                  <a:txBody>
-                    <a:bodyPr/>
-                    <a:lstStyle/>
-                    <a:p>
-                      <a:r>
-                        <a:rPr lang="fr-FR" sz="1050" dirty="0" err="1" smtClean="0"/>
+                      <a:endParaRPr lang="fr-FR" sz="1400" dirty="0"/>
+                    </a:p>
+                  </a:txBody>
+                  <a:tcPr/>
+                </a:tc>
+                <a:tc>
+                  <a:txBody>
+                    <a:bodyPr/>
+                    <a:lstStyle/>
+                    <a:p>
+                      <a:r>
+                        <a:rPr lang="fr-FR" sz="1400" dirty="0" err="1" smtClean="0"/>
                         <a:t>veryFast_interrupt</a:t>
                       </a:r>
-                      <a:endParaRPr lang="fr-FR" sz="1050" dirty="0"/>
-                    </a:p>
-                  </a:txBody>
-                  <a:tcPr/>
-                </a:tc>
-                <a:tc>
-                  <a:txBody>
-                    <a:bodyPr/>
-                    <a:lstStyle/>
-                    <a:p>
-                      <a:r>
-                        <a:rPr lang="en-US" sz="1050" dirty="0" smtClean="0"/>
+                      <a:endParaRPr lang="fr-FR" sz="1400" dirty="0"/>
+                    </a:p>
+                  </a:txBody>
+                  <a:tcPr/>
+                </a:tc>
+                <a:tc>
+                  <a:txBody>
+                    <a:bodyPr/>
+                    <a:lstStyle/>
+                    <a:p>
+                      <a:r>
+                        <a:rPr lang="en-US" sz="1400" dirty="0" smtClean="0"/>
                         <a:t>Period :</a:t>
                       </a:r>
                       <a:r>
-                        <a:rPr lang="en-US" sz="1050" baseline="0" dirty="0" smtClean="0"/>
+                        <a:rPr lang="en-US" sz="1400" baseline="0" dirty="0" smtClean="0"/>
                         <a:t> 50 u</a:t>
                       </a:r>
                       <a:r>
-                        <a:rPr lang="en-US" sz="1050" dirty="0" smtClean="0"/>
+                        <a:rPr lang="en-US" sz="1400" dirty="0" smtClean="0"/>
                         <a:t>s</a:t>
                       </a:r>
-                      <a:endParaRPr lang="fr-FR" sz="1050" dirty="0"/>
-                    </a:p>
-                  </a:txBody>
-                  <a:tcPr/>
-                </a:tc>
-                <a:tc>
-                  <a:txBody>
-                    <a:bodyPr/>
-                    <a:lstStyle/>
-                    <a:p>
-                      <a:r>
-                        <a:rPr lang="en-US" sz="1050" dirty="0" smtClean="0"/>
+                      <a:endParaRPr lang="fr-FR" sz="1400" dirty="0"/>
+                    </a:p>
+                  </a:txBody>
+                  <a:tcPr/>
+                </a:tc>
+                <a:tc>
+                  <a:txBody>
+                    <a:bodyPr/>
+                    <a:lstStyle/>
+                    <a:p>
+                      <a:r>
+                        <a:rPr lang="en-US" sz="1400" dirty="0" smtClean="0"/>
                         <a:t>Stepper motor commands.</a:t>
                       </a:r>
-                      <a:endParaRPr lang="fr-FR" sz="1050" dirty="0"/>
+                      <a:endParaRPr lang="fr-FR" sz="1400" dirty="0"/>
                     </a:p>
                   </a:txBody>
                   <a:tcPr/>
@@ -8995,56 +9410,56 @@
                         <a:defRPr/>
                       </a:pPr>
                       <a:r>
-                        <a:rPr lang="en-US" sz="1050" dirty="0" smtClean="0"/>
+                        <a:rPr lang="en-US" sz="1400" dirty="0" smtClean="0"/>
                         <a:t>IT</a:t>
                       </a:r>
-                      <a:endParaRPr lang="fr-FR" sz="1050" dirty="0" smtClean="0"/>
-                    </a:p>
-                  </a:txBody>
-                  <a:tcPr/>
-                </a:tc>
-                <a:tc>
-                  <a:txBody>
-                    <a:bodyPr/>
-                    <a:lstStyle/>
-                    <a:p>
-                      <a:r>
-                        <a:rPr lang="fr-FR" sz="1050" dirty="0" err="1" smtClean="0"/>
+                      <a:endParaRPr lang="fr-FR" sz="1400" dirty="0" smtClean="0"/>
+                    </a:p>
+                  </a:txBody>
+                  <a:tcPr/>
+                </a:tc>
+                <a:tc>
+                  <a:txBody>
+                    <a:bodyPr/>
+                    <a:lstStyle/>
+                    <a:p>
+                      <a:r>
+                        <a:rPr lang="fr-FR" sz="1400" dirty="0" err="1" smtClean="0"/>
                         <a:t>fast_interrupt</a:t>
                       </a:r>
-                      <a:endParaRPr lang="fr-FR" sz="1050" dirty="0"/>
-                    </a:p>
-                  </a:txBody>
-                  <a:tcPr/>
-                </a:tc>
-                <a:tc>
-                  <a:txBody>
-                    <a:bodyPr/>
-                    <a:lstStyle/>
-                    <a:p>
-                      <a:r>
-                        <a:rPr lang="en-US" sz="1050" dirty="0" smtClean="0"/>
+                      <a:endParaRPr lang="fr-FR" sz="1400" dirty="0"/>
+                    </a:p>
+                  </a:txBody>
+                  <a:tcPr/>
+                </a:tc>
+                <a:tc>
+                  <a:txBody>
+                    <a:bodyPr/>
+                    <a:lstStyle/>
+                    <a:p>
+                      <a:r>
+                        <a:rPr lang="en-US" sz="1400" dirty="0" smtClean="0"/>
                         <a:t>Period : 1 </a:t>
                       </a:r>
                       <a:r>
-                        <a:rPr lang="en-US" sz="1050" dirty="0" err="1" smtClean="0"/>
+                        <a:rPr lang="en-US" sz="1400" dirty="0" err="1" smtClean="0"/>
                         <a:t>ms</a:t>
                       </a:r>
-                      <a:endParaRPr lang="fr-FR" sz="1050" dirty="0"/>
-                    </a:p>
-                  </a:txBody>
-                  <a:tcPr/>
-                </a:tc>
-                <a:tc>
-                  <a:txBody>
-                    <a:bodyPr/>
-                    <a:lstStyle/>
-                    <a:p>
-                      <a:r>
-                        <a:rPr lang="en-US" sz="1050" dirty="0" smtClean="0"/>
+                      <a:endParaRPr lang="fr-FR" sz="1400" dirty="0"/>
+                    </a:p>
+                  </a:txBody>
+                  <a:tcPr/>
+                </a:tc>
+                <a:tc>
+                  <a:txBody>
+                    <a:bodyPr/>
+                    <a:lstStyle/>
+                    <a:p>
+                      <a:r>
+                        <a:rPr lang="en-US" sz="1400" dirty="0" smtClean="0"/>
                         <a:t>SW GPIO filters.</a:t>
                       </a:r>
-                      <a:endParaRPr lang="fr-FR" sz="1050" dirty="0"/>
+                      <a:endParaRPr lang="fr-FR" sz="1400" dirty="0"/>
                     </a:p>
                   </a:txBody>
                   <a:tcPr/>
@@ -9057,74 +9472,74 @@
                     <a:lstStyle/>
                     <a:p>
                       <a:r>
-                        <a:rPr lang="en-US" sz="1050" dirty="0" smtClean="0"/>
+                        <a:rPr lang="en-US" sz="1400" dirty="0" smtClean="0"/>
                         <a:t>IT</a:t>
                       </a:r>
-                      <a:endParaRPr lang="fr-FR" sz="1050" dirty="0"/>
-                    </a:p>
-                  </a:txBody>
-                  <a:tcPr/>
-                </a:tc>
-                <a:tc>
-                  <a:txBody>
-                    <a:bodyPr/>
-                    <a:lstStyle/>
-                    <a:p>
-                      <a:r>
-                        <a:rPr lang="fr-FR" sz="1050" dirty="0" err="1" smtClean="0"/>
+                      <a:endParaRPr lang="fr-FR" sz="1400" dirty="0"/>
+                    </a:p>
+                  </a:txBody>
+                  <a:tcPr/>
+                </a:tc>
+                <a:tc>
+                  <a:txBody>
+                    <a:bodyPr/>
+                    <a:lstStyle/>
+                    <a:p>
+                      <a:r>
+                        <a:rPr lang="fr-FR" sz="1400" dirty="0" err="1" smtClean="0"/>
                         <a:t>ArdUART</a:t>
                       </a:r>
                       <a:r>
-                        <a:rPr lang="fr-FR" sz="1050" dirty="0" smtClean="0"/>
+                        <a:rPr lang="fr-FR" sz="1400" dirty="0" smtClean="0"/>
                         <a:t>::</a:t>
                       </a:r>
                       <a:r>
-                        <a:rPr lang="fr-FR" sz="1050" dirty="0" err="1" smtClean="0"/>
+                        <a:rPr lang="fr-FR" sz="1400" dirty="0" err="1" smtClean="0"/>
                         <a:t>IrqHandler</a:t>
                       </a:r>
-                      <a:endParaRPr lang="fr-FR" sz="1050" dirty="0"/>
-                    </a:p>
-                  </a:txBody>
-                  <a:tcPr/>
-                </a:tc>
-                <a:tc>
-                  <a:txBody>
-                    <a:bodyPr/>
-                    <a:lstStyle/>
-                    <a:p>
-                      <a:r>
-                        <a:rPr lang="en-US" sz="1050" dirty="0" smtClean="0"/>
+                      <a:endParaRPr lang="fr-FR" sz="1400" dirty="0"/>
+                    </a:p>
+                  </a:txBody>
+                  <a:tcPr/>
+                </a:tc>
+                <a:tc>
+                  <a:txBody>
+                    <a:bodyPr/>
+                    <a:lstStyle/>
+                    <a:p>
+                      <a:r>
+                        <a:rPr lang="en-US" sz="1400" dirty="0" smtClean="0"/>
                         <a:t>Every byte sent</a:t>
                       </a:r>
                     </a:p>
                     <a:p>
                       <a:r>
-                        <a:rPr lang="en-US" sz="1050" dirty="0" smtClean="0"/>
+                        <a:rPr lang="en-US" sz="1400" dirty="0" smtClean="0"/>
                         <a:t>Every byte received</a:t>
                       </a:r>
-                      <a:endParaRPr lang="fr-FR" sz="1050" dirty="0"/>
-                    </a:p>
-                  </a:txBody>
-                  <a:tcPr/>
-                </a:tc>
-                <a:tc>
-                  <a:txBody>
-                    <a:bodyPr/>
-                    <a:lstStyle/>
-                    <a:p>
-                      <a:r>
-                        <a:rPr lang="en-US" sz="1050" dirty="0" smtClean="0"/>
+                      <a:endParaRPr lang="fr-FR" sz="1400" dirty="0"/>
+                    </a:p>
+                  </a:txBody>
+                  <a:tcPr/>
+                </a:tc>
+                <a:tc>
+                  <a:txBody>
+                    <a:bodyPr/>
+                    <a:lstStyle/>
+                    <a:p>
+                      <a:r>
+                        <a:rPr lang="en-US" sz="1400" dirty="0" smtClean="0"/>
                         <a:t>Read/Send UART</a:t>
                       </a:r>
                       <a:r>
-                        <a:rPr lang="en-US" sz="1050" baseline="0" dirty="0" smtClean="0"/>
+                        <a:rPr lang="en-US" sz="1400" baseline="0" dirty="0" smtClean="0"/>
                         <a:t> </a:t>
                       </a:r>
                       <a:r>
-                        <a:rPr lang="en-US" sz="1050" dirty="0" smtClean="0"/>
+                        <a:rPr lang="en-US" sz="1400" dirty="0" smtClean="0"/>
                         <a:t>data.</a:t>
                       </a:r>
-                      <a:endParaRPr lang="fr-FR" sz="1050" dirty="0"/>
+                      <a:endParaRPr lang="fr-FR" sz="1400" dirty="0"/>
                     </a:p>
                   </a:txBody>
                   <a:tcPr/>
@@ -9137,21 +9552,21 @@
                     <a:lstStyle/>
                     <a:p>
                       <a:r>
-                        <a:rPr lang="en-US" sz="1050" dirty="0" smtClean="0"/>
+                        <a:rPr lang="en-US" sz="1400" dirty="0" smtClean="0"/>
                         <a:t>IT</a:t>
                       </a:r>
-                      <a:endParaRPr lang="fr-FR" sz="1050" dirty="0"/>
-                    </a:p>
-                  </a:txBody>
-                  <a:tcPr/>
-                </a:tc>
-                <a:tc>
-                  <a:txBody>
-                    <a:bodyPr/>
-                    <a:lstStyle/>
-                    <a:p>
-                      <a:r>
-                        <a:rPr lang="fr-FR" sz="1050" kern="1200" dirty="0" err="1" smtClean="0">
+                      <a:endParaRPr lang="fr-FR" sz="1400" dirty="0"/>
+                    </a:p>
+                  </a:txBody>
+                  <a:tcPr/>
+                </a:tc>
+                <a:tc>
+                  <a:txBody>
+                    <a:bodyPr/>
+                    <a:lstStyle/>
+                    <a:p>
+                      <a:r>
+                        <a:rPr lang="fr-FR" sz="1400" kern="1200" dirty="0" err="1" smtClean="0">
                           <a:solidFill>
                             <a:schemeClr val="dk1"/>
                           </a:solidFill>
@@ -9161,18 +9576,18 @@
                         </a:rPr>
                         <a:t>Servo_Handler</a:t>
                       </a:r>
-                      <a:endParaRPr lang="fr-FR" sz="1050" dirty="0"/>
-                    </a:p>
-                  </a:txBody>
-                  <a:tcPr/>
-                </a:tc>
-                <a:tc>
-                  <a:txBody>
-                    <a:bodyPr/>
-                    <a:lstStyle/>
-                    <a:p>
-                      <a:r>
-                        <a:rPr lang="en-US" sz="1050" dirty="0" smtClean="0">
+                      <a:endParaRPr lang="fr-FR" sz="1400" dirty="0"/>
+                    </a:p>
+                  </a:txBody>
+                  <a:tcPr/>
+                </a:tc>
+                <a:tc>
+                  <a:txBody>
+                    <a:bodyPr/>
+                    <a:lstStyle/>
+                    <a:p>
+                      <a:r>
+                        <a:rPr lang="en-US" sz="1400" dirty="0" smtClean="0">
                           <a:solidFill>
                             <a:srgbClr val="FF0000"/>
                           </a:solidFill>
@@ -9180,7 +9595,7 @@
                         <a:t>Period : 1</a:t>
                       </a:r>
                       <a:r>
-                        <a:rPr lang="en-US" sz="1050" baseline="0" dirty="0" smtClean="0">
+                        <a:rPr lang="en-US" sz="1400" baseline="0" dirty="0" smtClean="0">
                           <a:solidFill>
                             <a:srgbClr val="FF0000"/>
                           </a:solidFill>
@@ -9188,14 +9603,14 @@
                         <a:t> </a:t>
                       </a:r>
                       <a:r>
-                        <a:rPr lang="en-US" sz="1050" baseline="0" dirty="0" err="1" smtClean="0">
+                        <a:rPr lang="en-US" sz="1400" baseline="0" dirty="0" err="1" smtClean="0">
                           <a:solidFill>
                             <a:srgbClr val="FF0000"/>
                           </a:solidFill>
                         </a:rPr>
                         <a:t>ms</a:t>
                       </a:r>
-                      <a:endParaRPr lang="fr-FR" sz="1050" dirty="0">
+                      <a:endParaRPr lang="fr-FR" sz="1400" dirty="0">
                         <a:solidFill>
                           <a:srgbClr val="FF0000"/>
                         </a:solidFill>
@@ -9210,10 +9625,10 @@
                     <a:lstStyle/>
                     <a:p>
                       <a:r>
-                        <a:rPr lang="en-US" sz="1050" dirty="0" smtClean="0"/>
+                        <a:rPr lang="en-US" sz="1400" dirty="0" smtClean="0"/>
                         <a:t>Servo commands.</a:t>
                       </a:r>
-                      <a:endParaRPr lang="fr-FR" sz="1050" dirty="0"/>
+                      <a:endParaRPr lang="fr-FR" sz="1400" dirty="0"/>
                     </a:p>
                   </a:txBody>
                   <a:tcPr/>
@@ -9243,21 +9658,21 @@
                         <a:defRPr/>
                       </a:pPr>
                       <a:r>
-                        <a:rPr lang="en-US" sz="1050" dirty="0" smtClean="0"/>
+                        <a:rPr lang="en-US" sz="1400" dirty="0" smtClean="0"/>
                         <a:t>IT</a:t>
                       </a:r>
-                      <a:endParaRPr lang="fr-FR" sz="1050" dirty="0" smtClean="0"/>
-                    </a:p>
-                  </a:txBody>
-                  <a:tcPr/>
-                </a:tc>
-                <a:tc>
-                  <a:txBody>
-                    <a:bodyPr/>
-                    <a:lstStyle/>
-                    <a:p>
-                      <a:r>
-                        <a:rPr lang="fr-FR" sz="1050" kern="1200" dirty="0" err="1" smtClean="0">
+                      <a:endParaRPr lang="fr-FR" sz="1400" dirty="0" smtClean="0"/>
+                    </a:p>
+                  </a:txBody>
+                  <a:tcPr/>
+                </a:tc>
+                <a:tc>
+                  <a:txBody>
+                    <a:bodyPr/>
+                    <a:lstStyle/>
+                    <a:p>
+                      <a:r>
+                        <a:rPr lang="fr-FR" sz="1400" kern="1200" dirty="0" err="1" smtClean="0">
                           <a:solidFill>
                             <a:schemeClr val="dk1"/>
                           </a:solidFill>
@@ -9268,7 +9683,7 @@
                         <a:t>TwoWire</a:t>
                       </a:r>
                       <a:r>
-                        <a:rPr lang="fr-FR" sz="1050" kern="1200" dirty="0" smtClean="0">
+                        <a:rPr lang="fr-FR" sz="1400" kern="1200" dirty="0" smtClean="0">
                           <a:solidFill>
                             <a:schemeClr val="dk1"/>
                           </a:solidFill>
@@ -9279,7 +9694,7 @@
                         <a:t>::</a:t>
                       </a:r>
                       <a:r>
-                        <a:rPr lang="fr-FR" sz="1050" kern="1200" dirty="0" err="1" smtClean="0">
+                        <a:rPr lang="fr-FR" sz="1400" kern="1200" dirty="0" err="1" smtClean="0">
                           <a:solidFill>
                             <a:schemeClr val="dk1"/>
                           </a:solidFill>
@@ -9289,39 +9704,39 @@
                         </a:rPr>
                         <a:t>onService</a:t>
                       </a:r>
-                      <a:endParaRPr lang="fr-FR" sz="1050" dirty="0"/>
-                    </a:p>
-                  </a:txBody>
-                  <a:tcPr/>
-                </a:tc>
-                <a:tc>
-                  <a:txBody>
-                    <a:bodyPr/>
-                    <a:lstStyle/>
-                    <a:p>
-                      <a:r>
-                        <a:rPr lang="en-US" sz="1050" dirty="0" smtClean="0"/>
+                      <a:endParaRPr lang="fr-FR" sz="1400" dirty="0"/>
+                    </a:p>
+                  </a:txBody>
+                  <a:tcPr/>
+                </a:tc>
+                <a:tc>
+                  <a:txBody>
+                    <a:bodyPr/>
+                    <a:lstStyle/>
+                    <a:p>
+                      <a:r>
+                        <a:rPr lang="en-US" sz="1400" dirty="0" smtClean="0"/>
                         <a:t>I2C</a:t>
                       </a:r>
                       <a:r>
-                        <a:rPr lang="en-US" sz="1050" baseline="0" dirty="0" smtClean="0"/>
+                        <a:rPr lang="en-US" sz="1400" baseline="0" dirty="0" smtClean="0"/>
                         <a:t> event</a:t>
                       </a:r>
-                      <a:endParaRPr lang="fr-FR" sz="1050" dirty="0"/>
-                    </a:p>
-                  </a:txBody>
-                  <a:tcPr/>
-                </a:tc>
-                <a:tc>
-                  <a:txBody>
-                    <a:bodyPr/>
-                    <a:lstStyle/>
-                    <a:p>
-                      <a:r>
-                        <a:rPr lang="en-US" sz="1050" dirty="0" smtClean="0"/>
+                      <a:endParaRPr lang="fr-FR" sz="1400" dirty="0"/>
+                    </a:p>
+                  </a:txBody>
+                  <a:tcPr/>
+                </a:tc>
+                <a:tc>
+                  <a:txBody>
+                    <a:bodyPr/>
+                    <a:lstStyle/>
+                    <a:p>
+                      <a:r>
+                        <a:rPr lang="en-US" sz="1400" dirty="0" smtClean="0"/>
                         <a:t>Read/Send I2C data.</a:t>
                       </a:r>
-                      <a:endParaRPr lang="fr-FR" sz="1050" dirty="0"/>
+                      <a:endParaRPr lang="fr-FR" sz="1400" dirty="0"/>
                     </a:p>
                   </a:txBody>
                   <a:tcPr/>
@@ -9351,60 +9766,60 @@
                         <a:defRPr/>
                       </a:pPr>
                       <a:r>
-                        <a:rPr lang="en-US" sz="1050" dirty="0" smtClean="0"/>
+                        <a:rPr lang="en-US" sz="1400" dirty="0" smtClean="0"/>
                         <a:t>IT</a:t>
                       </a:r>
-                      <a:endParaRPr lang="fr-FR" sz="1050" dirty="0" smtClean="0"/>
-                    </a:p>
-                  </a:txBody>
-                  <a:tcPr/>
-                </a:tc>
-                <a:tc>
-                  <a:txBody>
-                    <a:bodyPr/>
-                    <a:lstStyle/>
-                    <a:p>
-                      <a:r>
-                        <a:rPr lang="fr-FR" sz="1050" dirty="0" err="1" smtClean="0"/>
+                      <a:endParaRPr lang="fr-FR" sz="1400" dirty="0" smtClean="0"/>
+                    </a:p>
+                  </a:txBody>
+                  <a:tcPr/>
+                </a:tc>
+                <a:tc>
+                  <a:txBody>
+                    <a:bodyPr/>
+                    <a:lstStyle/>
+                    <a:p>
+                      <a:r>
+                        <a:rPr lang="fr-FR" sz="1400" dirty="0" err="1" smtClean="0"/>
                         <a:t>SysTick_Handler</a:t>
                       </a:r>
-                      <a:endParaRPr lang="fr-FR" sz="1050" dirty="0"/>
-                    </a:p>
-                  </a:txBody>
-                  <a:tcPr/>
-                </a:tc>
-                <a:tc>
-                  <a:txBody>
-                    <a:bodyPr/>
-                    <a:lstStyle/>
-                    <a:p>
-                      <a:r>
-                        <a:rPr lang="en-US" sz="1050" dirty="0" smtClean="0"/>
+                      <a:endParaRPr lang="fr-FR" sz="1400" dirty="0"/>
+                    </a:p>
+                  </a:txBody>
+                  <a:tcPr/>
+                </a:tc>
+                <a:tc>
+                  <a:txBody>
+                    <a:bodyPr/>
+                    <a:lstStyle/>
+                    <a:p>
+                      <a:r>
+                        <a:rPr lang="en-US" sz="1400" dirty="0" smtClean="0"/>
                         <a:t>Period : 1ms</a:t>
                       </a:r>
-                      <a:endParaRPr lang="fr-FR" sz="1050" dirty="0"/>
-                    </a:p>
-                  </a:txBody>
-                  <a:tcPr/>
-                </a:tc>
-                <a:tc>
-                  <a:txBody>
-                    <a:bodyPr/>
-                    <a:lstStyle/>
-                    <a:p>
-                      <a:r>
-                        <a:rPr lang="en-US" sz="1050" dirty="0" smtClean="0"/>
+                      <a:endParaRPr lang="fr-FR" sz="1400" dirty="0"/>
+                    </a:p>
+                  </a:txBody>
+                  <a:tcPr/>
+                </a:tc>
+                <a:tc>
+                  <a:txBody>
+                    <a:bodyPr/>
+                    <a:lstStyle/>
+                    <a:p>
+                      <a:r>
+                        <a:rPr lang="en-US" sz="1400" dirty="0" smtClean="0"/>
                         <a:t>Boot</a:t>
                       </a:r>
                       <a:r>
-                        <a:rPr lang="en-US" sz="1050" baseline="0" dirty="0" smtClean="0"/>
+                        <a:rPr lang="en-US" sz="1400" baseline="0" dirty="0" smtClean="0"/>
                         <a:t> </a:t>
                       </a:r>
                       <a:r>
-                        <a:rPr lang="en-US" sz="1050" baseline="0" smtClean="0"/>
+                        <a:rPr lang="en-US" sz="1400" baseline="0" smtClean="0"/>
                         <a:t>time count</a:t>
                       </a:r>
-                      <a:endParaRPr lang="fr-FR" sz="1050" dirty="0"/>
+                      <a:endParaRPr lang="fr-FR" sz="1400" dirty="0"/>
                     </a:p>
                   </a:txBody>
                   <a:tcPr/>
@@ -9434,52 +9849,52 @@
                         <a:defRPr/>
                       </a:pPr>
                       <a:r>
-                        <a:rPr lang="en-US" sz="1050" dirty="0" smtClean="0"/>
+                        <a:rPr lang="en-US" sz="1400" dirty="0" smtClean="0"/>
                         <a:t>IT</a:t>
                       </a:r>
-                      <a:endParaRPr lang="fr-FR" sz="1050" dirty="0" smtClean="0"/>
-                    </a:p>
-                  </a:txBody>
-                  <a:tcPr/>
-                </a:tc>
-                <a:tc>
-                  <a:txBody>
-                    <a:bodyPr/>
-                    <a:lstStyle/>
-                    <a:p>
-                      <a:r>
-                        <a:rPr lang="fr-FR" sz="1050" dirty="0" err="1" smtClean="0"/>
+                      <a:endParaRPr lang="fr-FR" sz="1400" dirty="0" smtClean="0"/>
+                    </a:p>
+                  </a:txBody>
+                  <a:tcPr/>
+                </a:tc>
+                <a:tc>
+                  <a:txBody>
+                    <a:bodyPr/>
+                    <a:lstStyle/>
+                    <a:p>
+                      <a:r>
+                        <a:rPr lang="fr-FR" sz="1400" dirty="0" err="1" smtClean="0"/>
                         <a:t>Buzzer_Handler</a:t>
                       </a:r>
-                      <a:endParaRPr lang="fr-FR" sz="1050" dirty="0"/>
-                    </a:p>
-                  </a:txBody>
-                  <a:tcPr/>
-                </a:tc>
-                <a:tc>
-                  <a:txBody>
-                    <a:bodyPr/>
-                    <a:lstStyle/>
-                    <a:p>
-                      <a:r>
-                        <a:rPr lang="en-US" sz="1050" dirty="0" smtClean="0"/>
+                      <a:endParaRPr lang="fr-FR" sz="1400" dirty="0"/>
+                    </a:p>
+                  </a:txBody>
+                  <a:tcPr/>
+                </a:tc>
+                <a:tc>
+                  <a:txBody>
+                    <a:bodyPr/>
+                    <a:lstStyle/>
+                    <a:p>
+                      <a:r>
+                        <a:rPr lang="en-US" sz="1400" dirty="0" smtClean="0"/>
                         <a:t>Variable period</a:t>
                       </a:r>
-                      <a:endParaRPr lang="fr-FR" sz="1050" dirty="0"/>
-                    </a:p>
-                  </a:txBody>
-                  <a:tcPr/>
-                </a:tc>
-                <a:tc>
-                  <a:txBody>
-                    <a:bodyPr/>
-                    <a:lstStyle/>
-                    <a:p>
-                      <a:r>
-                        <a:rPr lang="en-US" sz="1050" dirty="0" smtClean="0"/>
+                      <a:endParaRPr lang="fr-FR" sz="1400" dirty="0"/>
+                    </a:p>
+                  </a:txBody>
+                  <a:tcPr/>
+                </a:tc>
+                <a:tc>
+                  <a:txBody>
+                    <a:bodyPr/>
+                    <a:lstStyle/>
+                    <a:p>
+                      <a:r>
+                        <a:rPr lang="en-US" sz="1400" dirty="0" smtClean="0"/>
                         <a:t>Buzzer command</a:t>
                       </a:r>
-                      <a:endParaRPr lang="fr-FR" sz="1050" dirty="0"/>
+                      <a:endParaRPr lang="fr-FR" sz="1400" dirty="0"/>
                     </a:p>
                   </a:txBody>
                   <a:tcPr/>
@@ -9509,724 +9924,84 @@
                         <a:defRPr/>
                       </a:pPr>
                       <a:r>
-                        <a:rPr lang="en-US" sz="1050" dirty="0" smtClean="0"/>
-                        <a:t>Thread</a:t>
-                      </a:r>
-                      <a:endParaRPr lang="fr-FR" sz="1050" dirty="0" smtClean="0"/>
-                    </a:p>
-                  </a:txBody>
-                  <a:tcPr/>
-                </a:tc>
-                <a:tc>
-                  <a:txBody>
-                    <a:bodyPr/>
-                    <a:lstStyle/>
-                    <a:p>
-                      <a:r>
-                        <a:rPr lang="fr-FR" sz="1050" dirty="0" err="1" smtClean="0"/>
-                        <a:t>prvIdleTask</a:t>
-                      </a:r>
-                      <a:endParaRPr lang="fr-FR" sz="1050" dirty="0"/>
-                    </a:p>
-                  </a:txBody>
-                  <a:tcPr/>
-                </a:tc>
-                <a:tc>
-                  <a:txBody>
-                    <a:bodyPr/>
-                    <a:lstStyle/>
-                    <a:p>
-                      <a:r>
-                        <a:rPr lang="en-US" sz="1050" dirty="0" smtClean="0"/>
-                        <a:t>When no other</a:t>
-                      </a:r>
-                      <a:r>
-                        <a:rPr lang="en-US" sz="1050" baseline="0" dirty="0" smtClean="0"/>
-                        <a:t> thread is running</a:t>
-                      </a:r>
-                      <a:endParaRPr lang="fr-FR" sz="1050" dirty="0"/>
-                    </a:p>
-                  </a:txBody>
-                  <a:tcPr/>
-                </a:tc>
-                <a:tc>
-                  <a:txBody>
-                    <a:bodyPr/>
-                    <a:lstStyle/>
-                    <a:p>
-                      <a:r>
-                        <a:rPr lang="en-US" sz="1050" dirty="0" smtClean="0"/>
-                        <a:t>“Empty”.</a:t>
-                      </a:r>
-                      <a:endParaRPr lang="fr-FR" sz="1050" dirty="0"/>
-                    </a:p>
-                  </a:txBody>
-                  <a:tcPr/>
-                </a:tc>
-              </a:tr>
-              <a:tr h="279574">
-                <a:tc>
-                  <a:txBody>
-                    <a:bodyPr/>
-                    <a:lstStyle/>
-                    <a:p>
-                      <a:r>
-                        <a:rPr lang="en-US" sz="1050" dirty="0" smtClean="0"/>
-                        <a:t>Thread</a:t>
-                      </a:r>
-                      <a:endParaRPr lang="fr-FR" sz="1050" dirty="0"/>
-                    </a:p>
-                  </a:txBody>
-                  <a:tcPr/>
-                </a:tc>
-                <a:tc>
-                  <a:txBody>
-                    <a:bodyPr/>
-                    <a:lstStyle/>
-                    <a:p>
-                      <a:pPr marL="0" marR="0" lvl="0" indent="0" algn="l" defTabSz="914400" rtl="0" eaLnBrk="1" fontAlgn="auto" latinLnBrk="0" hangingPunct="1">
-                        <a:lnSpc>
-                          <a:spcPct val="100000"/>
-                        </a:lnSpc>
-                        <a:spcBef>
-                          <a:spcPts val="0"/>
-                        </a:spcBef>
-                        <a:spcAft>
-                          <a:spcPts val="0"/>
-                        </a:spcAft>
-                        <a:buClrTx/>
-                        <a:buSzTx/>
-                        <a:buFontTx/>
-                        <a:buNone/>
-                        <a:tabLst/>
-                        <a:defRPr/>
-                      </a:pPr>
-                      <a:r>
-                        <a:rPr lang="fr-FR" sz="1050" dirty="0" err="1" smtClean="0"/>
-                        <a:t>ComOnUart</a:t>
-                      </a:r>
-                      <a:r>
-                        <a:rPr lang="fr-FR" sz="1050" dirty="0" smtClean="0"/>
-                        <a:t>::</a:t>
-                      </a:r>
-                      <a:r>
-                        <a:rPr lang="fr-FR" sz="1050" dirty="0" err="1" smtClean="0"/>
-                        <a:t>Receiver</a:t>
-                      </a:r>
-                      <a:r>
-                        <a:rPr lang="fr-FR" sz="1050" dirty="0" smtClean="0"/>
-                        <a:t>::</a:t>
-                      </a:r>
-                      <a:r>
-                        <a:rPr lang="fr-FR" sz="1050" dirty="0" err="1" smtClean="0"/>
-                        <a:t>run</a:t>
-                      </a:r>
-                      <a:endParaRPr lang="fr-FR" sz="1050" dirty="0" smtClean="0"/>
-                    </a:p>
-                  </a:txBody>
-                  <a:tcPr/>
-                </a:tc>
-                <a:tc>
-                  <a:txBody>
-                    <a:bodyPr/>
-                    <a:lstStyle/>
-                    <a:p>
-                      <a:r>
-                        <a:rPr lang="en-US" sz="1050" dirty="0" smtClean="0"/>
+                        <a:rPr lang="en-US" sz="1400" kern="1200" dirty="0" smtClean="0">
+                          <a:solidFill>
+                            <a:schemeClr val="dk1"/>
+                          </a:solidFill>
+                          <a:latin typeface="+mn-lt"/>
+                          <a:ea typeface="+mn-ea"/>
+                          <a:cs typeface="+mn-cs"/>
+                        </a:rPr>
+                        <a:t>IT</a:t>
+                      </a:r>
+                      <a:endParaRPr lang="fr-FR" sz="1400" kern="1200" dirty="0" smtClean="0">
+                        <a:solidFill>
+                          <a:schemeClr val="dk1"/>
+                        </a:solidFill>
+                        <a:latin typeface="+mn-lt"/>
+                        <a:ea typeface="+mn-ea"/>
+                        <a:cs typeface="+mn-cs"/>
+                      </a:endParaRPr>
+                    </a:p>
+                  </a:txBody>
+                  <a:tcPr/>
+                </a:tc>
+                <a:tc>
+                  <a:txBody>
+                    <a:bodyPr/>
+                    <a:lstStyle/>
+                    <a:p>
+                      <a:r>
+                        <a:rPr lang="fr-FR" sz="1400" kern="1200" dirty="0" smtClean="0">
+                          <a:solidFill>
+                            <a:schemeClr val="dk1"/>
+                          </a:solidFill>
+                          <a:latin typeface="+mn-lt"/>
+                          <a:ea typeface="+mn-ea"/>
+                          <a:cs typeface="+mn-cs"/>
+                        </a:rPr>
+                        <a:t>I2C_0.onService()</a:t>
+                      </a:r>
+                      <a:endParaRPr lang="fr-FR" sz="1400" kern="1200" dirty="0">
+                        <a:solidFill>
+                          <a:schemeClr val="dk1"/>
+                        </a:solidFill>
+                        <a:latin typeface="+mn-lt"/>
+                        <a:ea typeface="+mn-ea"/>
+                        <a:cs typeface="+mn-cs"/>
+                      </a:endParaRPr>
+                    </a:p>
+                  </a:txBody>
+                  <a:tcPr/>
+                </a:tc>
+                <a:tc>
+                  <a:txBody>
+                    <a:bodyPr/>
+                    <a:lstStyle/>
+                    <a:p>
+                      <a:r>
+                        <a:rPr lang="en-US" sz="1400" dirty="0" smtClean="0"/>
                         <a:t>Episodic</a:t>
                       </a:r>
-                      <a:endParaRPr lang="fr-FR" sz="1050" dirty="0"/>
-                    </a:p>
-                  </a:txBody>
-                  <a:tcPr/>
-                </a:tc>
-                <a:tc>
-                  <a:txBody>
-                    <a:bodyPr/>
-                    <a:lstStyle/>
-                    <a:p>
-                      <a:pPr marL="0" marR="0" lvl="0" indent="0" algn="l" defTabSz="914400" rtl="0" eaLnBrk="1" fontAlgn="auto" latinLnBrk="0" hangingPunct="1">
-                        <a:lnSpc>
-                          <a:spcPct val="100000"/>
-                        </a:lnSpc>
-                        <a:spcBef>
-                          <a:spcPts val="0"/>
-                        </a:spcBef>
-                        <a:spcAft>
-                          <a:spcPts val="0"/>
-                        </a:spcAft>
-                        <a:buClrTx/>
-                        <a:buSzTx/>
-                        <a:buFontTx/>
-                        <a:buNone/>
-                        <a:tabLst/>
-                        <a:defRPr/>
-                      </a:pPr>
-                      <a:r>
-                        <a:rPr lang="en-US" sz="1050" dirty="0" smtClean="0"/>
-                        <a:t>Reads what </a:t>
-                      </a:r>
-                      <a:r>
-                        <a:rPr lang="fr-FR" sz="1050" dirty="0" err="1" smtClean="0"/>
-                        <a:t>ArdUART</a:t>
-                      </a:r>
-                      <a:r>
-                        <a:rPr lang="fr-FR" sz="1050" dirty="0" smtClean="0"/>
-                        <a:t>::</a:t>
-                      </a:r>
-                      <a:r>
-                        <a:rPr lang="fr-FR" sz="1050" dirty="0" err="1" smtClean="0"/>
-                        <a:t>IrqHandler</a:t>
-                      </a:r>
-                      <a:r>
-                        <a:rPr lang="fr-FR" sz="1050" dirty="0" smtClean="0"/>
-                        <a:t> has </a:t>
-                      </a:r>
-                      <a:r>
-                        <a:rPr lang="fr-FR" sz="1050" dirty="0" err="1" smtClean="0"/>
-                        <a:t>provided</a:t>
-                      </a:r>
-                      <a:r>
-                        <a:rPr lang="en-US" sz="1050" dirty="0" smtClean="0"/>
-                        <a:t> .</a:t>
-                      </a:r>
-                      <a:endParaRPr lang="fr-FR" sz="1050" dirty="0"/>
-                    </a:p>
-                  </a:txBody>
-                  <a:tcPr/>
-                </a:tc>
-              </a:tr>
-              <a:tr h="223178">
-                <a:tc>
-                  <a:txBody>
-                    <a:bodyPr/>
-                    <a:lstStyle/>
-                    <a:p>
-                      <a:pPr marL="0" marR="0" lvl="0" indent="0" algn="l" defTabSz="914400" rtl="0" eaLnBrk="1" fontAlgn="auto" latinLnBrk="0" hangingPunct="1">
-                        <a:lnSpc>
-                          <a:spcPct val="100000"/>
-                        </a:lnSpc>
-                        <a:spcBef>
-                          <a:spcPts val="0"/>
-                        </a:spcBef>
-                        <a:spcAft>
-                          <a:spcPts val="0"/>
-                        </a:spcAft>
-                        <a:buClrTx/>
-                        <a:buSzTx/>
-                        <a:buFontTx/>
-                        <a:buNone/>
-                        <a:tabLst/>
-                        <a:defRPr/>
-                      </a:pPr>
-                      <a:r>
-                        <a:rPr lang="en-US" sz="1050" dirty="0" smtClean="0"/>
-                        <a:t>Thread</a:t>
-                      </a:r>
-                      <a:endParaRPr lang="fr-FR" sz="1050" dirty="0"/>
-                    </a:p>
-                  </a:txBody>
-                  <a:tcPr/>
-                </a:tc>
-                <a:tc>
-                  <a:txBody>
-                    <a:bodyPr/>
-                    <a:lstStyle/>
-                    <a:p>
-                      <a:pPr marL="0" marR="0" lvl="0" indent="0" algn="l" defTabSz="914400" rtl="0" eaLnBrk="1" fontAlgn="auto" latinLnBrk="0" hangingPunct="1">
-                        <a:lnSpc>
-                          <a:spcPct val="100000"/>
-                        </a:lnSpc>
-                        <a:spcBef>
-                          <a:spcPts val="0"/>
-                        </a:spcBef>
-                        <a:spcAft>
-                          <a:spcPts val="0"/>
-                        </a:spcAft>
-                        <a:buClrTx/>
-                        <a:buSzTx/>
-                        <a:buFontTx/>
-                        <a:buNone/>
-                        <a:tabLst/>
-                        <a:defRPr/>
-                      </a:pPr>
-                      <a:r>
-                        <a:rPr lang="fr-FR" sz="1050" dirty="0" err="1" smtClean="0"/>
-                        <a:t>ComOnUart</a:t>
-                      </a:r>
-                      <a:r>
-                        <a:rPr lang="fr-FR" sz="1050" dirty="0" smtClean="0"/>
-                        <a:t>::Sender::</a:t>
-                      </a:r>
-                      <a:r>
-                        <a:rPr lang="fr-FR" sz="1050" dirty="0" err="1" smtClean="0"/>
-                        <a:t>run</a:t>
-                      </a:r>
-                      <a:endParaRPr lang="fr-FR" sz="1050" dirty="0" smtClean="0"/>
-                    </a:p>
-                  </a:txBody>
-                  <a:tcPr/>
-                </a:tc>
-                <a:tc>
-                  <a:txBody>
-                    <a:bodyPr/>
-                    <a:lstStyle/>
-                    <a:p>
-                      <a:pPr marL="0" marR="0" lvl="0" indent="0" algn="l" defTabSz="914400" rtl="0" eaLnBrk="1" fontAlgn="auto" latinLnBrk="0" hangingPunct="1">
-                        <a:lnSpc>
-                          <a:spcPct val="100000"/>
-                        </a:lnSpc>
-                        <a:spcBef>
-                          <a:spcPts val="0"/>
-                        </a:spcBef>
-                        <a:spcAft>
-                          <a:spcPts val="0"/>
-                        </a:spcAft>
-                        <a:buClrTx/>
-                        <a:buSzTx/>
-                        <a:buFontTx/>
-                        <a:buNone/>
-                        <a:tabLst/>
-                        <a:defRPr/>
-                      </a:pPr>
-                      <a:r>
-                        <a:rPr lang="en-US" sz="1050" dirty="0" smtClean="0"/>
-                        <a:t>Episodic</a:t>
-                      </a:r>
-                      <a:endParaRPr lang="fr-FR" sz="1050" dirty="0" smtClean="0"/>
-                    </a:p>
-                  </a:txBody>
-                  <a:tcPr/>
-                </a:tc>
-                <a:tc>
-                  <a:txBody>
-                    <a:bodyPr/>
-                    <a:lstStyle/>
-                    <a:p>
-                      <a:pPr marL="0" marR="0" lvl="0" indent="0" algn="l" defTabSz="914400" rtl="0" eaLnBrk="1" fontAlgn="auto" latinLnBrk="0" hangingPunct="1">
-                        <a:lnSpc>
-                          <a:spcPct val="100000"/>
-                        </a:lnSpc>
-                        <a:spcBef>
-                          <a:spcPts val="0"/>
-                        </a:spcBef>
-                        <a:spcAft>
-                          <a:spcPts val="0"/>
-                        </a:spcAft>
-                        <a:buClrTx/>
-                        <a:buSzTx/>
-                        <a:buFontTx/>
-                        <a:buNone/>
-                        <a:tabLst/>
-                        <a:defRPr/>
-                      </a:pPr>
-                      <a:r>
-                        <a:rPr lang="en-US" sz="1050" dirty="0" smtClean="0"/>
-                        <a:t>Feeds </a:t>
-                      </a:r>
-                      <a:r>
-                        <a:rPr lang="fr-FR" sz="1050" dirty="0" err="1" smtClean="0"/>
-                        <a:t>ArdUART</a:t>
-                      </a:r>
-                      <a:r>
-                        <a:rPr lang="fr-FR" sz="1050" dirty="0" smtClean="0"/>
-                        <a:t>::</a:t>
-                      </a:r>
-                      <a:r>
-                        <a:rPr lang="fr-FR" sz="1050" dirty="0" err="1" smtClean="0"/>
-                        <a:t>IrqHandler</a:t>
-                      </a:r>
-                      <a:r>
-                        <a:rPr lang="fr-FR" sz="1050" dirty="0" smtClean="0"/>
-                        <a:t>.</a:t>
-                      </a:r>
-                      <a:endParaRPr lang="fr-FR" sz="1050" dirty="0"/>
-                    </a:p>
-                  </a:txBody>
-                  <a:tcPr/>
-                </a:tc>
-              </a:tr>
-              <a:tr h="223178">
-                <a:tc>
-                  <a:txBody>
-                    <a:bodyPr/>
-                    <a:lstStyle/>
-                    <a:p>
-                      <a:pPr marL="0" marR="0" lvl="0" indent="0" algn="l" defTabSz="914400" rtl="0" eaLnBrk="1" fontAlgn="auto" latinLnBrk="0" hangingPunct="1">
-                        <a:lnSpc>
-                          <a:spcPct val="100000"/>
-                        </a:lnSpc>
-                        <a:spcBef>
-                          <a:spcPts val="0"/>
-                        </a:spcBef>
-                        <a:spcAft>
-                          <a:spcPts val="0"/>
-                        </a:spcAft>
-                        <a:buClrTx/>
-                        <a:buSzTx/>
-                        <a:buFontTx/>
-                        <a:buNone/>
-                        <a:tabLst/>
-                        <a:defRPr/>
-                      </a:pPr>
-                      <a:r>
-                        <a:rPr lang="en-US" sz="1050" dirty="0" smtClean="0"/>
-                        <a:t>Thread</a:t>
-                      </a:r>
-                      <a:endParaRPr lang="fr-FR" sz="1050" dirty="0" smtClean="0"/>
-                    </a:p>
-                  </a:txBody>
-                  <a:tcPr/>
-                </a:tc>
-                <a:tc>
-                  <a:txBody>
-                    <a:bodyPr/>
-                    <a:lstStyle/>
-                    <a:p>
-                      <a:r>
-                        <a:rPr lang="fr-FR" sz="1050" dirty="0" err="1" smtClean="0"/>
-                        <a:t>HmiThread</a:t>
-                      </a:r>
-                      <a:r>
-                        <a:rPr lang="fr-FR" sz="1050" dirty="0" smtClean="0"/>
-                        <a:t>::</a:t>
-                      </a:r>
-                      <a:r>
-                        <a:rPr lang="fr-FR" sz="1050" dirty="0" err="1" smtClean="0"/>
-                        <a:t>run</a:t>
-                      </a:r>
-                      <a:endParaRPr lang="fr-FR" sz="1050" dirty="0"/>
-                    </a:p>
-                  </a:txBody>
-                  <a:tcPr/>
-                </a:tc>
-                <a:tc>
-                  <a:txBody>
-                    <a:bodyPr/>
-                    <a:lstStyle/>
-                    <a:p>
-                      <a:r>
-                        <a:rPr lang="en-US" sz="1050" dirty="0" smtClean="0"/>
-                        <a:t>Period : 50 </a:t>
-                      </a:r>
-                      <a:r>
-                        <a:rPr lang="en-US" sz="1050" dirty="0" err="1" smtClean="0"/>
-                        <a:t>ms</a:t>
-                      </a:r>
-                      <a:endParaRPr lang="fr-FR" sz="1050" dirty="0"/>
-                    </a:p>
-                  </a:txBody>
-                  <a:tcPr/>
-                </a:tc>
-                <a:tc>
-                  <a:txBody>
-                    <a:bodyPr/>
-                    <a:lstStyle/>
-                    <a:p>
-                      <a:r>
-                        <a:rPr lang="en-US" sz="1050" dirty="0" smtClean="0"/>
-                        <a:t>LEDs</a:t>
-                      </a:r>
-                      <a:r>
-                        <a:rPr lang="en-US" sz="1050" baseline="0" dirty="0" smtClean="0"/>
-                        <a:t> commands.</a:t>
-                      </a:r>
-                      <a:endParaRPr lang="fr-FR" sz="1050" dirty="0"/>
-                    </a:p>
-                  </a:txBody>
-                  <a:tcPr/>
-                </a:tc>
-              </a:tr>
-              <a:tr h="223178">
-                <a:tc>
-                  <a:txBody>
-                    <a:bodyPr/>
-                    <a:lstStyle/>
-                    <a:p>
-                      <a:pPr marL="0" marR="0" lvl="0" indent="0" algn="l" defTabSz="914400" rtl="0" eaLnBrk="1" fontAlgn="auto" latinLnBrk="0" hangingPunct="1">
-                        <a:lnSpc>
-                          <a:spcPct val="100000"/>
-                        </a:lnSpc>
-                        <a:spcBef>
-                          <a:spcPts val="0"/>
-                        </a:spcBef>
-                        <a:spcAft>
-                          <a:spcPts val="0"/>
-                        </a:spcAft>
-                        <a:buClrTx/>
-                        <a:buSzTx/>
-                        <a:buFontTx/>
-                        <a:buNone/>
-                        <a:tabLst/>
-                        <a:defRPr/>
-                      </a:pPr>
-                      <a:r>
-                        <a:rPr lang="en-US" sz="1050" dirty="0" smtClean="0"/>
-                        <a:t>Thread</a:t>
-                      </a:r>
-                      <a:endParaRPr lang="fr-FR" sz="1050" dirty="0" smtClean="0"/>
-                    </a:p>
-                  </a:txBody>
-                  <a:tcPr/>
-                </a:tc>
-                <a:tc>
-                  <a:txBody>
-                    <a:bodyPr/>
-                    <a:lstStyle/>
-                    <a:p>
-                      <a:r>
-                        <a:rPr lang="fr-FR" sz="1050" dirty="0" err="1" smtClean="0"/>
-                        <a:t>StrategyThread</a:t>
-                      </a:r>
-                      <a:r>
-                        <a:rPr lang="fr-FR" sz="1050" dirty="0" smtClean="0"/>
-                        <a:t>::</a:t>
-                      </a:r>
-                      <a:r>
-                        <a:rPr lang="fr-FR" sz="1050" dirty="0" err="1" smtClean="0"/>
-                        <a:t>run</a:t>
-                      </a:r>
-                      <a:endParaRPr lang="fr-FR" sz="1050" dirty="0"/>
-                    </a:p>
-                  </a:txBody>
-                  <a:tcPr/>
-                </a:tc>
-                <a:tc>
-                  <a:txBody>
-                    <a:bodyPr/>
-                    <a:lstStyle/>
-                    <a:p>
-                      <a:r>
-                        <a:rPr lang="en-US" sz="1050" dirty="0" smtClean="0"/>
-                        <a:t>Episodic</a:t>
-                      </a:r>
-                      <a:endParaRPr lang="fr-FR" sz="1050" dirty="0"/>
-                    </a:p>
-                  </a:txBody>
-                  <a:tcPr/>
-                </a:tc>
-                <a:tc>
-                  <a:txBody>
-                    <a:bodyPr/>
-                    <a:lstStyle/>
-                    <a:p>
-                      <a:r>
-                        <a:rPr lang="en-US" sz="1050" dirty="0" smtClean="0"/>
-                        <a:t>Robot</a:t>
-                      </a:r>
-                      <a:r>
-                        <a:rPr lang="en-US" sz="1050" baseline="0" dirty="0" smtClean="0"/>
-                        <a:t> artificial intelligence</a:t>
-                      </a:r>
-                      <a:endParaRPr lang="fr-FR" sz="1050" dirty="0"/>
-                    </a:p>
-                  </a:txBody>
-                  <a:tcPr/>
-                </a:tc>
-              </a:tr>
-              <a:tr h="223178">
-                <a:tc>
-                  <a:txBody>
-                    <a:bodyPr/>
-                    <a:lstStyle/>
-                    <a:p>
-                      <a:pPr marL="0" marR="0" lvl="0" indent="0" algn="l" defTabSz="914400" rtl="0" eaLnBrk="1" fontAlgn="auto" latinLnBrk="0" hangingPunct="1">
-                        <a:lnSpc>
-                          <a:spcPct val="100000"/>
-                        </a:lnSpc>
-                        <a:spcBef>
-                          <a:spcPts val="0"/>
-                        </a:spcBef>
-                        <a:spcAft>
-                          <a:spcPts val="0"/>
-                        </a:spcAft>
-                        <a:buClrTx/>
-                        <a:buSzTx/>
-                        <a:buFontTx/>
-                        <a:buNone/>
-                        <a:tabLst/>
-                        <a:defRPr/>
-                      </a:pPr>
-                      <a:r>
-                        <a:rPr lang="en-US" sz="1050" dirty="0" smtClean="0"/>
-                        <a:t>Thread</a:t>
-                      </a:r>
-                      <a:endParaRPr lang="fr-FR" sz="1050" dirty="0" smtClean="0"/>
-                    </a:p>
-                  </a:txBody>
-                  <a:tcPr/>
-                </a:tc>
-                <a:tc>
-                  <a:txBody>
-                    <a:bodyPr/>
-                    <a:lstStyle/>
-                    <a:p>
-                      <a:r>
-                        <a:rPr lang="fr-FR" sz="1050" dirty="0" err="1" smtClean="0"/>
-                        <a:t>PollerThread</a:t>
-                      </a:r>
-                      <a:r>
-                        <a:rPr lang="fr-FR" sz="1050" dirty="0" smtClean="0"/>
-                        <a:t>::</a:t>
-                      </a:r>
-                      <a:r>
-                        <a:rPr lang="fr-FR" sz="1050" dirty="0" err="1" smtClean="0"/>
-                        <a:t>run</a:t>
-                      </a:r>
-                      <a:endParaRPr lang="fr-FR" sz="1050" dirty="0"/>
-                    </a:p>
-                  </a:txBody>
-                  <a:tcPr/>
-                </a:tc>
-                <a:tc>
-                  <a:txBody>
-                    <a:bodyPr/>
-                    <a:lstStyle/>
-                    <a:p>
-                      <a:pPr marL="0" marR="0" lvl="0" indent="0" algn="l" defTabSz="914400" rtl="0" eaLnBrk="1" fontAlgn="auto" latinLnBrk="0" hangingPunct="1">
-                        <a:lnSpc>
-                          <a:spcPct val="100000"/>
-                        </a:lnSpc>
-                        <a:spcBef>
-                          <a:spcPts val="0"/>
-                        </a:spcBef>
-                        <a:spcAft>
-                          <a:spcPts val="0"/>
-                        </a:spcAft>
-                        <a:buClrTx/>
-                        <a:buSzTx/>
-                        <a:buFontTx/>
-                        <a:buNone/>
-                        <a:tabLst/>
-                        <a:defRPr/>
-                      </a:pPr>
-                      <a:r>
-                        <a:rPr lang="en-US" sz="1050" dirty="0" smtClean="0"/>
-                        <a:t>Period : 100 </a:t>
-                      </a:r>
-                      <a:r>
-                        <a:rPr lang="en-US" sz="1050" dirty="0" err="1" smtClean="0"/>
-                        <a:t>ms</a:t>
-                      </a:r>
-                      <a:endParaRPr lang="fr-FR" sz="1050" dirty="0"/>
-                    </a:p>
-                  </a:txBody>
-                  <a:tcPr/>
-                </a:tc>
-                <a:tc>
-                  <a:txBody>
-                    <a:bodyPr/>
-                    <a:lstStyle/>
-                    <a:p>
-                      <a:r>
-                        <a:rPr lang="en-US" sz="1050" dirty="0" smtClean="0"/>
-                        <a:t>Actuators/Sensors</a:t>
-                      </a:r>
-                      <a:r>
-                        <a:rPr lang="en-US" sz="1050" baseline="0" dirty="0" smtClean="0"/>
-                        <a:t> commands.</a:t>
-                      </a:r>
-                      <a:endParaRPr lang="fr-FR" sz="1050" dirty="0"/>
-                    </a:p>
-                  </a:txBody>
-                  <a:tcPr/>
-                </a:tc>
-              </a:tr>
-              <a:tr h="223178">
-                <a:tc>
-                  <a:txBody>
-                    <a:bodyPr/>
-                    <a:lstStyle/>
-                    <a:p>
-                      <a:pPr marL="0" marR="0" lvl="0" indent="0" algn="l" defTabSz="914400" rtl="0" eaLnBrk="1" fontAlgn="auto" latinLnBrk="0" hangingPunct="1">
-                        <a:lnSpc>
-                          <a:spcPct val="100000"/>
-                        </a:lnSpc>
-                        <a:spcBef>
-                          <a:spcPts val="0"/>
-                        </a:spcBef>
-                        <a:spcAft>
-                          <a:spcPts val="0"/>
-                        </a:spcAft>
-                        <a:buClrTx/>
-                        <a:buSzTx/>
-                        <a:buFontTx/>
-                        <a:buNone/>
-                        <a:tabLst/>
-                        <a:defRPr/>
-                      </a:pPr>
-                      <a:r>
-                        <a:rPr lang="en-US" sz="1050" dirty="0" smtClean="0"/>
-                        <a:t>Thread</a:t>
-                      </a:r>
-                      <a:endParaRPr lang="fr-FR" sz="1050" dirty="0" smtClean="0"/>
-                    </a:p>
-                  </a:txBody>
-                  <a:tcPr/>
-                </a:tc>
-                <a:tc>
-                  <a:txBody>
-                    <a:bodyPr/>
-                    <a:lstStyle/>
-                    <a:p>
-                      <a:r>
-                        <a:rPr lang="fr-FR" sz="1050" dirty="0" smtClean="0"/>
-                        <a:t>Navigation::</a:t>
-                      </a:r>
-                      <a:r>
-                        <a:rPr lang="fr-FR" sz="1050" dirty="0" err="1" smtClean="0"/>
-                        <a:t>run</a:t>
-                      </a:r>
-                      <a:endParaRPr lang="fr-FR" sz="1050" dirty="0"/>
-                    </a:p>
-                  </a:txBody>
-                  <a:tcPr/>
-                </a:tc>
-                <a:tc>
-                  <a:txBody>
-                    <a:bodyPr/>
-                    <a:lstStyle/>
-                    <a:p>
-                      <a:pPr marL="0" marR="0" lvl="0" indent="0" algn="l" defTabSz="914400" rtl="0" eaLnBrk="1" fontAlgn="auto" latinLnBrk="0" hangingPunct="1">
-                        <a:lnSpc>
-                          <a:spcPct val="100000"/>
-                        </a:lnSpc>
-                        <a:spcBef>
-                          <a:spcPts val="0"/>
-                        </a:spcBef>
-                        <a:spcAft>
-                          <a:spcPts val="0"/>
-                        </a:spcAft>
-                        <a:buClrTx/>
-                        <a:buSzTx/>
-                        <a:buFontTx/>
-                        <a:buNone/>
-                        <a:tabLst/>
-                        <a:defRPr/>
-                      </a:pPr>
-                      <a:r>
-                        <a:rPr lang="en-US" sz="1050" dirty="0" smtClean="0"/>
-                        <a:t>Period : 20ms</a:t>
-                      </a:r>
-                      <a:endParaRPr lang="fr-FR" sz="1050" dirty="0"/>
-                    </a:p>
-                  </a:txBody>
-                  <a:tcPr/>
-                </a:tc>
-                <a:tc>
-                  <a:txBody>
-                    <a:bodyPr/>
-                    <a:lstStyle/>
-                    <a:p>
-                      <a:r>
-                        <a:rPr lang="en-US" sz="1050" dirty="0" smtClean="0"/>
-                        <a:t>Robot</a:t>
-                      </a:r>
-                      <a:r>
-                        <a:rPr lang="en-US" sz="1050" baseline="0" dirty="0" smtClean="0"/>
-                        <a:t> displacement management</a:t>
-                      </a:r>
-                      <a:endParaRPr lang="fr-FR" sz="1050" dirty="0"/>
+                      <a:endParaRPr lang="fr-FR" sz="1400" dirty="0"/>
+                    </a:p>
+                  </a:txBody>
+                  <a:tcPr/>
+                </a:tc>
+                <a:tc>
+                  <a:txBody>
+                    <a:bodyPr/>
+                    <a:lstStyle/>
+                    <a:p>
+                      <a:r>
+                        <a:rPr lang="en-US" sz="1400" dirty="0" smtClean="0"/>
+                        <a:t>I2C0 interrupt</a:t>
+                      </a:r>
+                      <a:r>
+                        <a:rPr lang="en-US" sz="1400" baseline="0" dirty="0" smtClean="0"/>
+                        <a:t> handler</a:t>
+                      </a:r>
+                      <a:endParaRPr lang="fr-FR" sz="1400" dirty="0"/>
                     </a:p>
                   </a:txBody>
                   <a:tcPr/>
@@ -10245,7 +10020,7 @@
         <p:spPr>
           <a:xfrm>
             <a:off x="977900" y="1457919"/>
-            <a:ext cx="10541000" cy="923330"/>
+            <a:ext cx="10541000" cy="646331"/>
           </a:xfrm>
           <a:prstGeom prst="rect">
             <a:avLst/>
@@ -10280,71 +10055,27 @@
             </a:r>
             <a:r>
               <a:rPr lang="en-US" dirty="0" smtClean="0"/>
-              <a:t>contains all the threading/interrupt configuration.</a:t>
-            </a:r>
-          </a:p>
-          <a:p>
+              <a:t>contains all the </a:t>
+            </a:r>
             <a:r>
               <a:rPr lang="en-US" dirty="0" smtClean="0"/>
-              <a:t>The Robot2017.cpp file contains most of interrupts mapping.</a:t>
-            </a:r>
-          </a:p>
-          <a:p>
+              <a:t>interrupt </a:t>
+            </a:r>
             <a:r>
               <a:rPr lang="en-US" dirty="0" smtClean="0"/>
-              <a:t>Thread mapping is done in each SW component </a:t>
-            </a:r>
-            <a:r>
-              <a:rPr lang="en-US" dirty="0" err="1" smtClean="0"/>
-              <a:t>instanciated</a:t>
-            </a:r>
+              <a:t>configuration.</a:t>
+            </a:r>
+          </a:p>
+          <a:p>
             <a:r>
               <a:rPr lang="en-US" dirty="0" smtClean="0"/>
-              <a:t> by the Robot2017 class.</a:t>
-            </a:r>
-            <a:endParaRPr lang="fr-FR" dirty="0"/>
-          </a:p>
-        </p:txBody>
-      </p:sp>
-      <p:sp>
-        <p:nvSpPr>
-          <p:cNvPr id="9" name="ZoneTexte 8"/>
-          <p:cNvSpPr txBox="1"/>
-          <p:nvPr/>
-        </p:nvSpPr>
-        <p:spPr>
-          <a:xfrm>
-            <a:off x="1384301" y="6578600"/>
-            <a:ext cx="10337800" cy="230832"/>
-          </a:xfrm>
-          <a:prstGeom prst="rect">
-            <a:avLst/>
-          </a:prstGeom>
-          <a:noFill/>
-        </p:spPr>
-        <p:txBody>
-          <a:bodyPr wrap="square" rtlCol="0">
-            <a:spAutoFit/>
-          </a:bodyPr>
-          <a:lstStyle/>
-          <a:p>
-            <a:r>
-              <a:rPr lang="en-US" sz="900" dirty="0" smtClean="0"/>
-              <a:t>Thread mapping should have been done in Robot2017.cpp to decouple threading and functions. It would also help to have a synthetic view of </a:t>
-            </a:r>
-            <a:r>
-              <a:rPr lang="en-US" sz="900" dirty="0" err="1" smtClean="0"/>
-              <a:t>instanciated</a:t>
-            </a:r>
-            <a:r>
-              <a:rPr lang="en-US" sz="900" dirty="0" smtClean="0"/>
-              <a:t> threads and prevent the need for </a:t>
-            </a:r>
-            <a:r>
-              <a:rPr lang="en-US" sz="900" dirty="0" err="1" smtClean="0"/>
-              <a:t>K_thread_config.h</a:t>
-            </a:r>
-            <a:endParaRPr lang="fr-FR" sz="900" dirty="0"/>
+              <a:t>The Robot2017.cpp file contains most of interrupts mapping</a:t>
+            </a:r>
+            <a:r>
+              <a:rPr lang="en-US" dirty="0" smtClean="0"/>
+              <a:t>.</a:t>
+            </a:r>
+            <a:endParaRPr lang="en-US" dirty="0" smtClean="0"/>
           </a:p>
         </p:txBody>
       </p:sp>
@@ -10402,33 +10133,7 @@
           <a:p>
             <a:r>
               <a:rPr lang="en-US" dirty="0" smtClean="0"/>
-              <a:t>Timers</a:t>
-            </a:r>
-            <a:endParaRPr lang="fr-FR" dirty="0"/>
-          </a:p>
-        </p:txBody>
-      </p:sp>
-      <p:sp>
-        <p:nvSpPr>
-          <p:cNvPr id="3" name="Espace réservé du contenu 2"/>
-          <p:cNvSpPr>
-            <a:spLocks noGrp="1"/>
-          </p:cNvSpPr>
-          <p:nvPr>
-            <p:ph idx="1"/>
-          </p:nvPr>
-        </p:nvSpPr>
-        <p:spPr/>
-        <p:txBody>
-          <a:bodyPr/>
-          <a:lstStyle/>
-          <a:p>
-            <a:pPr marL="0" indent="0">
-              <a:buNone/>
-            </a:pPr>
-            <a:r>
-              <a:rPr lang="en-US" dirty="0" smtClean="0"/>
-              <a:t>Timers affectation is defined in Robot2017.cpp</a:t>
+              <a:t>Threading</a:t>
             </a:r>
             <a:endParaRPr lang="fr-FR" dirty="0"/>
           </a:p>
@@ -10436,21 +10141,21 @@
       </p:sp>
       <p:graphicFrame>
         <p:nvGraphicFramePr>
-          <p:cNvPr id="4" name="Tableau 3"/>
+          <p:cNvPr id="7" name="Tableau 6"/>
           <p:cNvGraphicFramePr>
             <a:graphicFrameLocks noGrp="1"/>
           </p:cNvGraphicFramePr>
           <p:nvPr>
             <p:extLst>
               <p:ext uri="{D42A27DB-BD31-4B8C-83A1-F6EECF244321}">
-                <p14:modId xmlns:p14="http://schemas.microsoft.com/office/powerpoint/2010/main" val="2108532463"/>
+                <p14:modId xmlns:p14="http://schemas.microsoft.com/office/powerpoint/2010/main" val="3737551710"/>
               </p:ext>
             </p:extLst>
           </p:nvPr>
         </p:nvGraphicFramePr>
         <p:xfrm>
           <a:off x="977900" y="2463799"/>
-          <a:ext cx="8231965" cy="1647278"/>
+          <a:ext cx="10375901" cy="2651760"/>
         </p:xfrm>
         <a:graphic>
           <a:graphicData uri="http://schemas.openxmlformats.org/drawingml/2006/table">
@@ -10461,101 +10166,68 @@
               <a:tblGrid>
                 <a:gridCol w="1291011"/>
                 <a:gridCol w="2265548"/>
+                <a:gridCol w="2143936"/>
                 <a:gridCol w="4675406"/>
               </a:tblGrid>
-              <a:tr h="209732">
-                <a:tc>
-                  <a:txBody>
-                    <a:bodyPr/>
-                    <a:lstStyle/>
-                    <a:p>
-                      <a:r>
-                        <a:rPr lang="en-US" sz="1050" dirty="0" smtClean="0"/>
-                        <a:t>Timer</a:t>
-                      </a:r>
-                      <a:endParaRPr lang="fr-FR" sz="1050" dirty="0"/>
-                    </a:p>
-                  </a:txBody>
-                  <a:tcPr/>
-                </a:tc>
-                <a:tc>
-                  <a:txBody>
-                    <a:bodyPr/>
-                    <a:lstStyle/>
-                    <a:p>
-                      <a:r>
-                        <a:rPr lang="en-US" sz="1050" dirty="0" smtClean="0"/>
-                        <a:t>Used</a:t>
-                      </a:r>
-                      <a:r>
-                        <a:rPr lang="en-US" sz="1050" baseline="0" dirty="0" smtClean="0"/>
-                        <a:t> in file</a:t>
-                      </a:r>
-                      <a:endParaRPr lang="fr-FR" sz="1050" dirty="0"/>
-                    </a:p>
-                  </a:txBody>
-                  <a:tcPr/>
-                </a:tc>
-                <a:tc>
-                  <a:txBody>
-                    <a:bodyPr/>
-                    <a:lstStyle/>
-                    <a:p>
-                      <a:r>
-                        <a:rPr lang="en-US" sz="1050" dirty="0" smtClean="0"/>
+              <a:tr h="223178">
+                <a:tc>
+                  <a:txBody>
+                    <a:bodyPr/>
+                    <a:lstStyle/>
+                    <a:p>
+                      <a:r>
+                        <a:rPr lang="en-US" sz="1400" dirty="0" smtClean="0"/>
+                        <a:t>Type</a:t>
+                      </a:r>
+                      <a:endParaRPr lang="fr-FR" sz="1400" dirty="0"/>
+                    </a:p>
+                  </a:txBody>
+                  <a:tcPr/>
+                </a:tc>
+                <a:tc>
+                  <a:txBody>
+                    <a:bodyPr/>
+                    <a:lstStyle/>
+                    <a:p>
+                      <a:r>
+                        <a:rPr lang="en-US" sz="1400" dirty="0" smtClean="0"/>
+                        <a:t>Function</a:t>
+                      </a:r>
+                      <a:endParaRPr lang="fr-FR" sz="1400" dirty="0"/>
+                    </a:p>
+                  </a:txBody>
+                  <a:tcPr/>
+                </a:tc>
+                <a:tc>
+                  <a:txBody>
+                    <a:bodyPr/>
+                    <a:lstStyle/>
+                    <a:p>
+                      <a:r>
+                        <a:rPr lang="en-US" sz="1400" dirty="0" err="1" smtClean="0"/>
+                        <a:t>Occurence</a:t>
+                      </a:r>
+                      <a:endParaRPr lang="fr-FR" sz="1400" dirty="0"/>
+                    </a:p>
+                  </a:txBody>
+                  <a:tcPr/>
+                </a:tc>
+                <a:tc>
+                  <a:txBody>
+                    <a:bodyPr/>
+                    <a:lstStyle/>
+                    <a:p>
+                      <a:r>
+                        <a:rPr lang="en-US" sz="1400" dirty="0" smtClean="0"/>
                         <a:t>Content</a:t>
                       </a:r>
-                      <a:endParaRPr lang="fr-FR" sz="1050" dirty="0"/>
+                      <a:endParaRPr lang="fr-FR" sz="1400" dirty="0"/>
                     </a:p>
                   </a:txBody>
                   <a:tcPr/>
                 </a:tc>
               </a:tr>
-              <a:tr h="223178">
-                <a:tc>
-                  <a:txBody>
-                    <a:bodyPr/>
-                    <a:lstStyle/>
-                    <a:p>
-                      <a:r>
-                        <a:rPr lang="en-US" sz="1050" dirty="0" smtClean="0"/>
-                        <a:t>0</a:t>
-                      </a:r>
-                      <a:endParaRPr lang="fr-FR" sz="1050" dirty="0"/>
-                    </a:p>
-                  </a:txBody>
-                  <a:tcPr/>
-                </a:tc>
-                <a:tc>
-                  <a:txBody>
-                    <a:bodyPr/>
-                    <a:lstStyle/>
-                    <a:p>
-                      <a:r>
-                        <a:rPr lang="fr-FR" sz="1050" dirty="0" err="1" smtClean="0"/>
-                        <a:t>FreeRTOS_ARM.c</a:t>
-                      </a:r>
-                      <a:endParaRPr lang="fr-FR" sz="1050" dirty="0"/>
-                    </a:p>
-                  </a:txBody>
-                  <a:tcPr/>
-                </a:tc>
-                <a:tc>
-                  <a:txBody>
-                    <a:bodyPr/>
-                    <a:lstStyle/>
-                    <a:p>
-                      <a:r>
-                        <a:rPr lang="en-US" sz="1050" dirty="0" smtClean="0"/>
-                        <a:t>Get thread CPU usage</a:t>
-                      </a:r>
-                      <a:endParaRPr lang="fr-FR" sz="1050" dirty="0"/>
-                    </a:p>
-                  </a:txBody>
-                  <a:tcPr/>
-                </a:tc>
-              </a:tr>
-              <a:tr h="223178">
+              <a:tr h="258139">
                 <a:tc>
                   <a:txBody>
                     <a:bodyPr/>
@@ -10579,159 +10251,76 @@
                         <a:defRPr/>
                       </a:pPr>
                       <a:r>
-                        <a:rPr lang="en-US" sz="1050" dirty="0" smtClean="0"/>
-                        <a:t>1</a:t>
-                      </a:r>
-                      <a:endParaRPr lang="fr-FR" sz="1050" dirty="0" smtClean="0"/>
-                    </a:p>
-                  </a:txBody>
-                  <a:tcPr/>
-                </a:tc>
-                <a:tc>
-                  <a:txBody>
-                    <a:bodyPr/>
-                    <a:lstStyle/>
-                    <a:p>
-                      <a:r>
-                        <a:rPr lang="fr-FR" sz="1050" dirty="0" smtClean="0"/>
-                        <a:t>Servo.cpp</a:t>
-                      </a:r>
-                      <a:endParaRPr lang="fr-FR" sz="1050" dirty="0"/>
-                    </a:p>
-                  </a:txBody>
-                  <a:tcPr/>
-                </a:tc>
-                <a:tc>
-                  <a:txBody>
-                    <a:bodyPr/>
-                    <a:lstStyle/>
-                    <a:p>
-                      <a:r>
-                        <a:rPr lang="en-US" sz="1050" dirty="0" smtClean="0"/>
-                        <a:t>Drive up to 12 servos</a:t>
-                      </a:r>
-                      <a:endParaRPr lang="fr-FR" sz="1050" dirty="0"/>
+                        <a:rPr lang="en-US" sz="1400" dirty="0" smtClean="0"/>
+                        <a:t>Thread</a:t>
+                      </a:r>
+                      <a:endParaRPr lang="fr-FR" sz="1400" dirty="0" smtClean="0"/>
+                    </a:p>
+                  </a:txBody>
+                  <a:tcPr/>
+                </a:tc>
+                <a:tc>
+                  <a:txBody>
+                    <a:bodyPr/>
+                    <a:lstStyle/>
+                    <a:p>
+                      <a:r>
+                        <a:rPr lang="fr-FR" sz="1400" dirty="0" err="1" smtClean="0"/>
+                        <a:t>prvIdleTask</a:t>
+                      </a:r>
+                      <a:endParaRPr lang="fr-FR" sz="1400" dirty="0"/>
+                    </a:p>
+                  </a:txBody>
+                  <a:tcPr/>
+                </a:tc>
+                <a:tc>
+                  <a:txBody>
+                    <a:bodyPr/>
+                    <a:lstStyle/>
+                    <a:p>
+                      <a:r>
+                        <a:rPr lang="en-US" sz="1400" dirty="0" smtClean="0"/>
+                        <a:t>When no other</a:t>
+                      </a:r>
+                      <a:r>
+                        <a:rPr lang="en-US" sz="1400" baseline="0" dirty="0" smtClean="0"/>
+                        <a:t> thread is running</a:t>
+                      </a:r>
+                      <a:endParaRPr lang="fr-FR" sz="1400" dirty="0"/>
+                    </a:p>
+                  </a:txBody>
+                  <a:tcPr/>
+                </a:tc>
+                <a:tc>
+                  <a:txBody>
+                    <a:bodyPr/>
+                    <a:lstStyle/>
+                    <a:p>
+                      <a:r>
+                        <a:rPr lang="en-US" sz="1400" dirty="0" smtClean="0"/>
+                        <a:t>“Empty”.</a:t>
+                      </a:r>
+                      <a:endParaRPr lang="fr-FR" sz="1400" dirty="0"/>
                     </a:p>
                   </a:txBody>
                   <a:tcPr/>
                 </a:tc>
               </a:tr>
-              <a:tr h="389978">
-                <a:tc>
-                  <a:txBody>
-                    <a:bodyPr/>
-                    <a:lstStyle/>
-                    <a:p>
-                      <a:r>
-                        <a:rPr lang="en-US" sz="1050" dirty="0" smtClean="0"/>
-                        <a:t>2</a:t>
-                      </a:r>
-                      <a:endParaRPr lang="fr-FR" sz="1050" dirty="0"/>
-                    </a:p>
-                  </a:txBody>
-                  <a:tcPr/>
-                </a:tc>
-                <a:tc>
-                  <a:txBody>
-                    <a:bodyPr/>
-                    <a:lstStyle/>
-                    <a:p>
-                      <a:r>
-                        <a:rPr lang="fr-FR" sz="1050" dirty="0" smtClean="0"/>
-                        <a:t>Navigation.cpp</a:t>
-                      </a:r>
-                      <a:endParaRPr lang="fr-FR" sz="1050" dirty="0"/>
-                    </a:p>
-                  </a:txBody>
-                  <a:tcPr/>
-                </a:tc>
-                <a:tc>
-                  <a:txBody>
-                    <a:bodyPr/>
-                    <a:lstStyle/>
-                    <a:p>
-                      <a:r>
-                        <a:rPr lang="en-US" sz="1050" dirty="0" smtClean="0"/>
-                        <a:t>Generates</a:t>
-                      </a:r>
-                      <a:r>
-                        <a:rPr lang="en-US" sz="1050" baseline="0" dirty="0" smtClean="0"/>
-                        <a:t> propulsion steppers motors command</a:t>
-                      </a:r>
-                      <a:endParaRPr lang="fr-FR" sz="1050" dirty="0"/>
-                    </a:p>
-                  </a:txBody>
-                  <a:tcPr/>
-                </a:tc>
-              </a:tr>
-              <a:tr h="223178">
-                <a:tc>
-                  <a:txBody>
-                    <a:bodyPr/>
-                    <a:lstStyle/>
-                    <a:p>
-                      <a:r>
-                        <a:rPr lang="en-US" sz="1050" dirty="0" smtClean="0"/>
-                        <a:t>3</a:t>
-                      </a:r>
-                      <a:endParaRPr lang="fr-FR" sz="1050" dirty="0"/>
-                    </a:p>
-                  </a:txBody>
-                  <a:tcPr/>
-                </a:tc>
-                <a:tc>
-                  <a:txBody>
-                    <a:bodyPr/>
-                    <a:lstStyle/>
-                    <a:p>
-                      <a:r>
-                        <a:rPr lang="fr-FR" sz="1050" kern="1200" dirty="0" smtClean="0">
-                          <a:solidFill>
-                            <a:schemeClr val="dk1"/>
-                          </a:solidFill>
-                          <a:latin typeface="+mn-lt"/>
-                          <a:ea typeface="+mn-ea"/>
-                          <a:cs typeface="+mn-cs"/>
-                        </a:rPr>
-                        <a:t>GpioTools.cpp</a:t>
-                      </a:r>
-                      <a:endParaRPr lang="fr-FR" sz="1050" dirty="0"/>
-                    </a:p>
-                  </a:txBody>
-                  <a:tcPr/>
-                </a:tc>
-                <a:tc>
-                  <a:txBody>
-                    <a:bodyPr/>
-                    <a:lstStyle/>
-                    <a:p>
-                      <a:r>
-                        <a:rPr lang="en-US" sz="1050" dirty="0" err="1" smtClean="0"/>
-                        <a:t>Gpio</a:t>
-                      </a:r>
-                      <a:r>
-                        <a:rPr lang="en-US" sz="1050" dirty="0" smtClean="0"/>
-                        <a:t> input filters and </a:t>
-                      </a:r>
-                      <a:r>
-                        <a:rPr lang="en-US" sz="1050" dirty="0" err="1" smtClean="0"/>
-                        <a:t>Gpio</a:t>
-                      </a:r>
-                      <a:r>
-                        <a:rPr lang="en-US" sz="1050" dirty="0" smtClean="0"/>
-                        <a:t> output PWM</a:t>
-                      </a:r>
-                      <a:r>
-                        <a:rPr lang="en-US" sz="1050" baseline="0" dirty="0" smtClean="0"/>
-                        <a:t> generation</a:t>
-                      </a:r>
-                      <a:endParaRPr lang="fr-FR" sz="1050" dirty="0"/>
-                    </a:p>
-                  </a:txBody>
-                  <a:tcPr/>
-                </a:tc>
-              </a:tr>
-              <a:tr h="223178">
+              <a:tr h="279574">
+                <a:tc>
+                  <a:txBody>
+                    <a:bodyPr/>
+                    <a:lstStyle/>
+                    <a:p>
+                      <a:r>
+                        <a:rPr lang="en-US" sz="1400" dirty="0" smtClean="0"/>
+                        <a:t>Thread</a:t>
+                      </a:r>
+                      <a:endParaRPr lang="fr-FR" sz="1400" dirty="0"/>
+                    </a:p>
+                  </a:txBody>
+                  <a:tcPr/>
+                </a:tc>
                 <a:tc>
                   <a:txBody>
                     <a:bodyPr/>
@@ -10755,45 +10344,631 @@
                         <a:defRPr/>
                       </a:pPr>
                       <a:r>
-                        <a:rPr lang="en-US" sz="1050" dirty="0" smtClean="0"/>
-                        <a:t>4</a:t>
-                      </a:r>
-                      <a:endParaRPr lang="fr-FR" sz="1050" dirty="0" smtClean="0"/>
-                    </a:p>
-                  </a:txBody>
-                  <a:tcPr/>
-                </a:tc>
-                <a:tc>
-                  <a:txBody>
-                    <a:bodyPr/>
-                    <a:lstStyle/>
-                    <a:p>
-                      <a:r>
-                        <a:rPr lang="fr-FR" sz="1050" kern="1200" dirty="0" smtClean="0">
-                          <a:solidFill>
-                            <a:schemeClr val="dk1"/>
-                          </a:solidFill>
-                          <a:latin typeface="+mn-lt"/>
-                          <a:ea typeface="+mn-ea"/>
-                          <a:cs typeface="+mn-cs"/>
-                        </a:rPr>
-                        <a:t>Buzzer.cpp</a:t>
-                      </a:r>
-                      <a:endParaRPr lang="fr-FR" sz="1050" dirty="0"/>
-                    </a:p>
-                  </a:txBody>
-                  <a:tcPr/>
-                </a:tc>
-                <a:tc>
-                  <a:txBody>
-                    <a:bodyPr/>
-                    <a:lstStyle/>
-                    <a:p>
-                      <a:r>
-                        <a:rPr lang="en-US" sz="1050" dirty="0" smtClean="0"/>
-                        <a:t>Generate a frequency signal for the buzzer</a:t>
-                      </a:r>
-                      <a:endParaRPr lang="fr-FR" sz="1050" dirty="0"/>
+                        <a:rPr lang="fr-FR" sz="1400" dirty="0" err="1" smtClean="0"/>
+                        <a:t>ComOnUart</a:t>
+                      </a:r>
+                      <a:r>
+                        <a:rPr lang="fr-FR" sz="1400" dirty="0" smtClean="0"/>
+                        <a:t>::</a:t>
+                      </a:r>
+                      <a:r>
+                        <a:rPr lang="fr-FR" sz="1400" dirty="0" err="1" smtClean="0"/>
+                        <a:t>Receiver</a:t>
+                      </a:r>
+                      <a:r>
+                        <a:rPr lang="fr-FR" sz="1400" dirty="0" smtClean="0"/>
+                        <a:t>::</a:t>
+                      </a:r>
+                      <a:r>
+                        <a:rPr lang="fr-FR" sz="1400" dirty="0" err="1" smtClean="0"/>
+                        <a:t>run</a:t>
+                      </a:r>
+                      <a:endParaRPr lang="fr-FR" sz="1400" dirty="0" smtClean="0"/>
+                    </a:p>
+                  </a:txBody>
+                  <a:tcPr/>
+                </a:tc>
+                <a:tc>
+                  <a:txBody>
+                    <a:bodyPr/>
+                    <a:lstStyle/>
+                    <a:p>
+                      <a:r>
+                        <a:rPr lang="en-US" sz="1400" dirty="0" smtClean="0"/>
+                        <a:t>Episodic</a:t>
+                      </a:r>
+                      <a:endParaRPr lang="fr-FR" sz="1400" dirty="0"/>
+                    </a:p>
+                  </a:txBody>
+                  <a:tcPr/>
+                </a:tc>
+                <a:tc>
+                  <a:txBody>
+                    <a:bodyPr/>
+                    <a:lstStyle/>
+                    <a:p>
+                      <a:pPr marL="0" marR="0" lvl="0" indent="0" algn="l" defTabSz="914400" rtl="0" eaLnBrk="1" fontAlgn="auto" latinLnBrk="0" hangingPunct="1">
+                        <a:lnSpc>
+                          <a:spcPct val="100000"/>
+                        </a:lnSpc>
+                        <a:spcBef>
+                          <a:spcPts val="0"/>
+                        </a:spcBef>
+                        <a:spcAft>
+                          <a:spcPts val="0"/>
+                        </a:spcAft>
+                        <a:buClrTx/>
+                        <a:buSzTx/>
+                        <a:buFontTx/>
+                        <a:buNone/>
+                        <a:tabLst/>
+                        <a:defRPr/>
+                      </a:pPr>
+                      <a:r>
+                        <a:rPr lang="en-US" sz="1400" dirty="0" smtClean="0"/>
+                        <a:t>Reads what </a:t>
+                      </a:r>
+                      <a:r>
+                        <a:rPr lang="fr-FR" sz="1400" dirty="0" err="1" smtClean="0"/>
+                        <a:t>ArdUART</a:t>
+                      </a:r>
+                      <a:r>
+                        <a:rPr lang="fr-FR" sz="1400" dirty="0" smtClean="0"/>
+                        <a:t>::</a:t>
+                      </a:r>
+                      <a:r>
+                        <a:rPr lang="fr-FR" sz="1400" dirty="0" err="1" smtClean="0"/>
+                        <a:t>IrqHandler</a:t>
+                      </a:r>
+                      <a:r>
+                        <a:rPr lang="fr-FR" sz="1400" dirty="0" smtClean="0"/>
+                        <a:t> has </a:t>
+                      </a:r>
+                      <a:r>
+                        <a:rPr lang="fr-FR" sz="1400" dirty="0" err="1" smtClean="0"/>
+                        <a:t>provided</a:t>
+                      </a:r>
+                      <a:r>
+                        <a:rPr lang="en-US" sz="1400" dirty="0" smtClean="0"/>
+                        <a:t> .</a:t>
+                      </a:r>
+                      <a:endParaRPr lang="fr-FR" sz="1400" dirty="0"/>
+                    </a:p>
+                  </a:txBody>
+                  <a:tcPr/>
+                </a:tc>
+              </a:tr>
+              <a:tr h="223178">
+                <a:tc>
+                  <a:txBody>
+                    <a:bodyPr/>
+                    <a:lstStyle/>
+                    <a:p>
+                      <a:pPr marL="0" marR="0" lvl="0" indent="0" algn="l" defTabSz="914400" rtl="0" eaLnBrk="1" fontAlgn="auto" latinLnBrk="0" hangingPunct="1">
+                        <a:lnSpc>
+                          <a:spcPct val="100000"/>
+                        </a:lnSpc>
+                        <a:spcBef>
+                          <a:spcPts val="0"/>
+                        </a:spcBef>
+                        <a:spcAft>
+                          <a:spcPts val="0"/>
+                        </a:spcAft>
+                        <a:buClrTx/>
+                        <a:buSzTx/>
+                        <a:buFontTx/>
+                        <a:buNone/>
+                        <a:tabLst/>
+                        <a:defRPr/>
+                      </a:pPr>
+                      <a:r>
+                        <a:rPr lang="en-US" sz="1400" dirty="0" smtClean="0"/>
+                        <a:t>Thread</a:t>
+                      </a:r>
+                      <a:endParaRPr lang="fr-FR" sz="1400" dirty="0"/>
+                    </a:p>
+                  </a:txBody>
+                  <a:tcPr/>
+                </a:tc>
+                <a:tc>
+                  <a:txBody>
+                    <a:bodyPr/>
+                    <a:lstStyle/>
+                    <a:p>
+                      <a:pPr marL="0" marR="0" lvl="0" indent="0" algn="l" defTabSz="914400" rtl="0" eaLnBrk="1" fontAlgn="auto" latinLnBrk="0" hangingPunct="1">
+                        <a:lnSpc>
+                          <a:spcPct val="100000"/>
+                        </a:lnSpc>
+                        <a:spcBef>
+                          <a:spcPts val="0"/>
+                        </a:spcBef>
+                        <a:spcAft>
+                          <a:spcPts val="0"/>
+                        </a:spcAft>
+                        <a:buClrTx/>
+                        <a:buSzTx/>
+                        <a:buFontTx/>
+                        <a:buNone/>
+                        <a:tabLst/>
+                        <a:defRPr/>
+                      </a:pPr>
+                      <a:r>
+                        <a:rPr lang="fr-FR" sz="1400" dirty="0" err="1" smtClean="0"/>
+                        <a:t>ComOnUart</a:t>
+                      </a:r>
+                      <a:r>
+                        <a:rPr lang="fr-FR" sz="1400" dirty="0" smtClean="0"/>
+                        <a:t>::Sender::</a:t>
+                      </a:r>
+                      <a:r>
+                        <a:rPr lang="fr-FR" sz="1400" dirty="0" err="1" smtClean="0"/>
+                        <a:t>run</a:t>
+                      </a:r>
+                      <a:endParaRPr lang="fr-FR" sz="1400" dirty="0" smtClean="0"/>
+                    </a:p>
+                  </a:txBody>
+                  <a:tcPr/>
+                </a:tc>
+                <a:tc>
+                  <a:txBody>
+                    <a:bodyPr/>
+                    <a:lstStyle/>
+                    <a:p>
+                      <a:pPr marL="0" marR="0" lvl="0" indent="0" algn="l" defTabSz="914400" rtl="0" eaLnBrk="1" fontAlgn="auto" latinLnBrk="0" hangingPunct="1">
+                        <a:lnSpc>
+                          <a:spcPct val="100000"/>
+                        </a:lnSpc>
+                        <a:spcBef>
+                          <a:spcPts val="0"/>
+                        </a:spcBef>
+                        <a:spcAft>
+                          <a:spcPts val="0"/>
+                        </a:spcAft>
+                        <a:buClrTx/>
+                        <a:buSzTx/>
+                        <a:buFontTx/>
+                        <a:buNone/>
+                        <a:tabLst/>
+                        <a:defRPr/>
+                      </a:pPr>
+                      <a:r>
+                        <a:rPr lang="en-US" sz="1400" dirty="0" smtClean="0"/>
+                        <a:t>Episodic</a:t>
+                      </a:r>
+                      <a:endParaRPr lang="fr-FR" sz="1400" dirty="0" smtClean="0"/>
+                    </a:p>
+                  </a:txBody>
+                  <a:tcPr/>
+                </a:tc>
+                <a:tc>
+                  <a:txBody>
+                    <a:bodyPr/>
+                    <a:lstStyle/>
+                    <a:p>
+                      <a:pPr marL="0" marR="0" lvl="0" indent="0" algn="l" defTabSz="914400" rtl="0" eaLnBrk="1" fontAlgn="auto" latinLnBrk="0" hangingPunct="1">
+                        <a:lnSpc>
+                          <a:spcPct val="100000"/>
+                        </a:lnSpc>
+                        <a:spcBef>
+                          <a:spcPts val="0"/>
+                        </a:spcBef>
+                        <a:spcAft>
+                          <a:spcPts val="0"/>
+                        </a:spcAft>
+                        <a:buClrTx/>
+                        <a:buSzTx/>
+                        <a:buFontTx/>
+                        <a:buNone/>
+                        <a:tabLst/>
+                        <a:defRPr/>
+                      </a:pPr>
+                      <a:r>
+                        <a:rPr lang="en-US" sz="1400" dirty="0" smtClean="0"/>
+                        <a:t>Feeds </a:t>
+                      </a:r>
+                      <a:r>
+                        <a:rPr lang="fr-FR" sz="1400" dirty="0" err="1" smtClean="0"/>
+                        <a:t>ArdUART</a:t>
+                      </a:r>
+                      <a:r>
+                        <a:rPr lang="fr-FR" sz="1400" dirty="0" smtClean="0"/>
+                        <a:t>::</a:t>
+                      </a:r>
+                      <a:r>
+                        <a:rPr lang="fr-FR" sz="1400" dirty="0" err="1" smtClean="0"/>
+                        <a:t>IrqHandler</a:t>
+                      </a:r>
+                      <a:r>
+                        <a:rPr lang="fr-FR" sz="1400" dirty="0" smtClean="0"/>
+                        <a:t>.</a:t>
+                      </a:r>
+                      <a:endParaRPr lang="fr-FR" sz="1400" dirty="0"/>
+                    </a:p>
+                  </a:txBody>
+                  <a:tcPr/>
+                </a:tc>
+              </a:tr>
+              <a:tr h="223178">
+                <a:tc>
+                  <a:txBody>
+                    <a:bodyPr/>
+                    <a:lstStyle/>
+                    <a:p>
+                      <a:pPr marL="0" marR="0" lvl="0" indent="0" algn="l" defTabSz="914400" rtl="0" eaLnBrk="1" fontAlgn="auto" latinLnBrk="0" hangingPunct="1">
+                        <a:lnSpc>
+                          <a:spcPct val="100000"/>
+                        </a:lnSpc>
+                        <a:spcBef>
+                          <a:spcPts val="0"/>
+                        </a:spcBef>
+                        <a:spcAft>
+                          <a:spcPts val="0"/>
+                        </a:spcAft>
+                        <a:buClrTx/>
+                        <a:buSzTx/>
+                        <a:buFontTx/>
+                        <a:buNone/>
+                        <a:tabLst/>
+                        <a:defRPr/>
+                      </a:pPr>
+                      <a:r>
+                        <a:rPr lang="en-US" sz="1400" dirty="0" smtClean="0"/>
+                        <a:t>Thread</a:t>
+                      </a:r>
+                      <a:endParaRPr lang="fr-FR" sz="1400" dirty="0" smtClean="0"/>
+                    </a:p>
+                  </a:txBody>
+                  <a:tcPr/>
+                </a:tc>
+                <a:tc>
+                  <a:txBody>
+                    <a:bodyPr/>
+                    <a:lstStyle/>
+                    <a:p>
+                      <a:r>
+                        <a:rPr lang="fr-FR" sz="1400" dirty="0" err="1" smtClean="0"/>
+                        <a:t>HmiThread</a:t>
+                      </a:r>
+                      <a:r>
+                        <a:rPr lang="fr-FR" sz="1400" dirty="0" smtClean="0"/>
+                        <a:t>::</a:t>
+                      </a:r>
+                      <a:r>
+                        <a:rPr lang="fr-FR" sz="1400" dirty="0" err="1" smtClean="0"/>
+                        <a:t>run</a:t>
+                      </a:r>
+                      <a:endParaRPr lang="fr-FR" sz="1400" dirty="0"/>
+                    </a:p>
+                  </a:txBody>
+                  <a:tcPr/>
+                </a:tc>
+                <a:tc>
+                  <a:txBody>
+                    <a:bodyPr/>
+                    <a:lstStyle/>
+                    <a:p>
+                      <a:r>
+                        <a:rPr lang="en-US" sz="1400" dirty="0" smtClean="0"/>
+                        <a:t>Period : 50 </a:t>
+                      </a:r>
+                      <a:r>
+                        <a:rPr lang="en-US" sz="1400" dirty="0" err="1" smtClean="0"/>
+                        <a:t>ms</a:t>
+                      </a:r>
+                      <a:endParaRPr lang="fr-FR" sz="1400" dirty="0"/>
+                    </a:p>
+                  </a:txBody>
+                  <a:tcPr/>
+                </a:tc>
+                <a:tc>
+                  <a:txBody>
+                    <a:bodyPr/>
+                    <a:lstStyle/>
+                    <a:p>
+                      <a:r>
+                        <a:rPr lang="en-US" sz="1400" dirty="0" smtClean="0"/>
+                        <a:t>LEDs</a:t>
+                      </a:r>
+                      <a:r>
+                        <a:rPr lang="en-US" sz="1400" baseline="0" dirty="0" smtClean="0"/>
+                        <a:t> commands.</a:t>
+                      </a:r>
+                      <a:endParaRPr lang="fr-FR" sz="1400" dirty="0"/>
+                    </a:p>
+                  </a:txBody>
+                  <a:tcPr/>
+                </a:tc>
+              </a:tr>
+              <a:tr h="223178">
+                <a:tc>
+                  <a:txBody>
+                    <a:bodyPr/>
+                    <a:lstStyle/>
+                    <a:p>
+                      <a:pPr marL="0" marR="0" lvl="0" indent="0" algn="l" defTabSz="914400" rtl="0" eaLnBrk="1" fontAlgn="auto" latinLnBrk="0" hangingPunct="1">
+                        <a:lnSpc>
+                          <a:spcPct val="100000"/>
+                        </a:lnSpc>
+                        <a:spcBef>
+                          <a:spcPts val="0"/>
+                        </a:spcBef>
+                        <a:spcAft>
+                          <a:spcPts val="0"/>
+                        </a:spcAft>
+                        <a:buClrTx/>
+                        <a:buSzTx/>
+                        <a:buFontTx/>
+                        <a:buNone/>
+                        <a:tabLst/>
+                        <a:defRPr/>
+                      </a:pPr>
+                      <a:r>
+                        <a:rPr lang="en-US" sz="1400" dirty="0" smtClean="0"/>
+                        <a:t>Thread</a:t>
+                      </a:r>
+                      <a:endParaRPr lang="fr-FR" sz="1400" dirty="0" smtClean="0"/>
+                    </a:p>
+                  </a:txBody>
+                  <a:tcPr/>
+                </a:tc>
+                <a:tc>
+                  <a:txBody>
+                    <a:bodyPr/>
+                    <a:lstStyle/>
+                    <a:p>
+                      <a:r>
+                        <a:rPr lang="fr-FR" sz="1400" dirty="0" err="1" smtClean="0"/>
+                        <a:t>StrategyThread</a:t>
+                      </a:r>
+                      <a:r>
+                        <a:rPr lang="fr-FR" sz="1400" dirty="0" smtClean="0"/>
+                        <a:t>::</a:t>
+                      </a:r>
+                      <a:r>
+                        <a:rPr lang="fr-FR" sz="1400" dirty="0" err="1" smtClean="0"/>
+                        <a:t>run</a:t>
+                      </a:r>
+                      <a:endParaRPr lang="fr-FR" sz="1400" dirty="0"/>
+                    </a:p>
+                  </a:txBody>
+                  <a:tcPr/>
+                </a:tc>
+                <a:tc>
+                  <a:txBody>
+                    <a:bodyPr/>
+                    <a:lstStyle/>
+                    <a:p>
+                      <a:r>
+                        <a:rPr lang="en-US" sz="1400" dirty="0" smtClean="0"/>
+                        <a:t>Episodic</a:t>
+                      </a:r>
+                      <a:endParaRPr lang="fr-FR" sz="1400" dirty="0"/>
+                    </a:p>
+                  </a:txBody>
+                  <a:tcPr/>
+                </a:tc>
+                <a:tc>
+                  <a:txBody>
+                    <a:bodyPr/>
+                    <a:lstStyle/>
+                    <a:p>
+                      <a:r>
+                        <a:rPr lang="en-US" sz="1400" dirty="0" smtClean="0"/>
+                        <a:t>Robot</a:t>
+                      </a:r>
+                      <a:r>
+                        <a:rPr lang="en-US" sz="1400" baseline="0" dirty="0" smtClean="0"/>
+                        <a:t> artificial intelligence</a:t>
+                      </a:r>
+                      <a:endParaRPr lang="fr-FR" sz="1400" dirty="0"/>
+                    </a:p>
+                  </a:txBody>
+                  <a:tcPr/>
+                </a:tc>
+              </a:tr>
+              <a:tr h="223178">
+                <a:tc>
+                  <a:txBody>
+                    <a:bodyPr/>
+                    <a:lstStyle/>
+                    <a:p>
+                      <a:pPr marL="0" marR="0" lvl="0" indent="0" algn="l" defTabSz="914400" rtl="0" eaLnBrk="1" fontAlgn="auto" latinLnBrk="0" hangingPunct="1">
+                        <a:lnSpc>
+                          <a:spcPct val="100000"/>
+                        </a:lnSpc>
+                        <a:spcBef>
+                          <a:spcPts val="0"/>
+                        </a:spcBef>
+                        <a:spcAft>
+                          <a:spcPts val="0"/>
+                        </a:spcAft>
+                        <a:buClrTx/>
+                        <a:buSzTx/>
+                        <a:buFontTx/>
+                        <a:buNone/>
+                        <a:tabLst/>
+                        <a:defRPr/>
+                      </a:pPr>
+                      <a:r>
+                        <a:rPr lang="en-US" sz="1400" dirty="0" smtClean="0"/>
+                        <a:t>Thread</a:t>
+                      </a:r>
+                      <a:endParaRPr lang="fr-FR" sz="1400" dirty="0" smtClean="0"/>
+                    </a:p>
+                  </a:txBody>
+                  <a:tcPr/>
+                </a:tc>
+                <a:tc>
+                  <a:txBody>
+                    <a:bodyPr/>
+                    <a:lstStyle/>
+                    <a:p>
+                      <a:r>
+                        <a:rPr lang="fr-FR" sz="1400" dirty="0" err="1" smtClean="0"/>
+                        <a:t>PollerThread</a:t>
+                      </a:r>
+                      <a:r>
+                        <a:rPr lang="fr-FR" sz="1400" dirty="0" smtClean="0"/>
+                        <a:t>::</a:t>
+                      </a:r>
+                      <a:r>
+                        <a:rPr lang="fr-FR" sz="1400" dirty="0" err="1" smtClean="0"/>
+                        <a:t>run</a:t>
+                      </a:r>
+                      <a:endParaRPr lang="fr-FR" sz="1400" dirty="0"/>
+                    </a:p>
+                  </a:txBody>
+                  <a:tcPr/>
+                </a:tc>
+                <a:tc>
+                  <a:txBody>
+                    <a:bodyPr/>
+                    <a:lstStyle/>
+                    <a:p>
+                      <a:pPr marL="0" marR="0" lvl="0" indent="0" algn="l" defTabSz="914400" rtl="0" eaLnBrk="1" fontAlgn="auto" latinLnBrk="0" hangingPunct="1">
+                        <a:lnSpc>
+                          <a:spcPct val="100000"/>
+                        </a:lnSpc>
+                        <a:spcBef>
+                          <a:spcPts val="0"/>
+                        </a:spcBef>
+                        <a:spcAft>
+                          <a:spcPts val="0"/>
+                        </a:spcAft>
+                        <a:buClrTx/>
+                        <a:buSzTx/>
+                        <a:buFontTx/>
+                        <a:buNone/>
+                        <a:tabLst/>
+                        <a:defRPr/>
+                      </a:pPr>
+                      <a:r>
+                        <a:rPr lang="en-US" sz="1400" dirty="0" smtClean="0"/>
+                        <a:t>Period : 100 </a:t>
+                      </a:r>
+                      <a:r>
+                        <a:rPr lang="en-US" sz="1400" dirty="0" err="1" smtClean="0"/>
+                        <a:t>ms</a:t>
+                      </a:r>
+                      <a:endParaRPr lang="fr-FR" sz="1400" dirty="0"/>
+                    </a:p>
+                  </a:txBody>
+                  <a:tcPr/>
+                </a:tc>
+                <a:tc>
+                  <a:txBody>
+                    <a:bodyPr/>
+                    <a:lstStyle/>
+                    <a:p>
+                      <a:r>
+                        <a:rPr lang="en-US" sz="1400" dirty="0" smtClean="0"/>
+                        <a:t>Actuators/Sensors</a:t>
+                      </a:r>
+                      <a:r>
+                        <a:rPr lang="en-US" sz="1400" baseline="0" dirty="0" smtClean="0"/>
+                        <a:t> commands.</a:t>
+                      </a:r>
+                      <a:endParaRPr lang="fr-FR" sz="1400" dirty="0"/>
+                    </a:p>
+                  </a:txBody>
+                  <a:tcPr/>
+                </a:tc>
+              </a:tr>
+              <a:tr h="223178">
+                <a:tc>
+                  <a:txBody>
+                    <a:bodyPr/>
+                    <a:lstStyle/>
+                    <a:p>
+                      <a:pPr marL="0" marR="0" lvl="0" indent="0" algn="l" defTabSz="914400" rtl="0" eaLnBrk="1" fontAlgn="auto" latinLnBrk="0" hangingPunct="1">
+                        <a:lnSpc>
+                          <a:spcPct val="100000"/>
+                        </a:lnSpc>
+                        <a:spcBef>
+                          <a:spcPts val="0"/>
+                        </a:spcBef>
+                        <a:spcAft>
+                          <a:spcPts val="0"/>
+                        </a:spcAft>
+                        <a:buClrTx/>
+                        <a:buSzTx/>
+                        <a:buFontTx/>
+                        <a:buNone/>
+                        <a:tabLst/>
+                        <a:defRPr/>
+                      </a:pPr>
+                      <a:r>
+                        <a:rPr lang="en-US" sz="1400" dirty="0" smtClean="0"/>
+                        <a:t>Thread</a:t>
+                      </a:r>
+                      <a:endParaRPr lang="fr-FR" sz="1400" dirty="0" smtClean="0"/>
+                    </a:p>
+                  </a:txBody>
+                  <a:tcPr/>
+                </a:tc>
+                <a:tc>
+                  <a:txBody>
+                    <a:bodyPr/>
+                    <a:lstStyle/>
+                    <a:p>
+                      <a:r>
+                        <a:rPr lang="fr-FR" sz="1400" dirty="0" smtClean="0"/>
+                        <a:t>Navigation::</a:t>
+                      </a:r>
+                      <a:r>
+                        <a:rPr lang="fr-FR" sz="1400" dirty="0" err="1" smtClean="0"/>
+                        <a:t>run</a:t>
+                      </a:r>
+                      <a:endParaRPr lang="fr-FR" sz="1400" dirty="0"/>
+                    </a:p>
+                  </a:txBody>
+                  <a:tcPr/>
+                </a:tc>
+                <a:tc>
+                  <a:txBody>
+                    <a:bodyPr/>
+                    <a:lstStyle/>
+                    <a:p>
+                      <a:pPr marL="0" marR="0" lvl="0" indent="0" algn="l" defTabSz="914400" rtl="0" eaLnBrk="1" fontAlgn="auto" latinLnBrk="0" hangingPunct="1">
+                        <a:lnSpc>
+                          <a:spcPct val="100000"/>
+                        </a:lnSpc>
+                        <a:spcBef>
+                          <a:spcPts val="0"/>
+                        </a:spcBef>
+                        <a:spcAft>
+                          <a:spcPts val="0"/>
+                        </a:spcAft>
+                        <a:buClrTx/>
+                        <a:buSzTx/>
+                        <a:buFontTx/>
+                        <a:buNone/>
+                        <a:tabLst/>
+                        <a:defRPr/>
+                      </a:pPr>
+                      <a:r>
+                        <a:rPr lang="en-US" sz="1400" dirty="0" smtClean="0"/>
+                        <a:t>Period : 20ms</a:t>
+                      </a:r>
+                      <a:endParaRPr lang="fr-FR" sz="1400" dirty="0"/>
+                    </a:p>
+                  </a:txBody>
+                  <a:tcPr/>
+                </a:tc>
+                <a:tc>
+                  <a:txBody>
+                    <a:bodyPr/>
+                    <a:lstStyle/>
+                    <a:p>
+                      <a:r>
+                        <a:rPr lang="en-US" sz="1400" dirty="0" smtClean="0"/>
+                        <a:t>Robot</a:t>
+                      </a:r>
+                      <a:r>
+                        <a:rPr lang="en-US" sz="1400" baseline="0" dirty="0" smtClean="0"/>
+                        <a:t> displacement management</a:t>
+                      </a:r>
+                      <a:endParaRPr lang="fr-FR" sz="1400" dirty="0"/>
                     </a:p>
                   </a:txBody>
                   <a:tcPr/>
@@ -10803,16 +10978,145 @@
           </a:graphicData>
         </a:graphic>
       </p:graphicFrame>
+      <p:sp>
+        <p:nvSpPr>
+          <p:cNvPr id="8" name="ZoneTexte 7"/>
+          <p:cNvSpPr txBox="1"/>
+          <p:nvPr/>
+        </p:nvSpPr>
+        <p:spPr>
+          <a:xfrm>
+            <a:off x="977900" y="1457919"/>
+            <a:ext cx="10541000" cy="646331"/>
+          </a:xfrm>
+          <a:prstGeom prst="rect">
+            <a:avLst/>
+          </a:prstGeom>
+          <a:noFill/>
+        </p:spPr>
+        <p:txBody>
+          <a:bodyPr wrap="square" rtlCol="0">
+            <a:spAutoFit/>
+          </a:bodyPr>
+          <a:lstStyle/>
+          <a:p>
+            <a:r>
+              <a:rPr lang="en-US" dirty="0" smtClean="0"/>
+              <a:t>The </a:t>
+            </a:r>
+            <a:r>
+              <a:rPr lang="en-US" b="1" dirty="0" err="1" smtClean="0"/>
+              <a:t>K_thread_config.h</a:t>
+            </a:r>
+            <a:r>
+              <a:rPr lang="en-US" b="1" dirty="0" smtClean="0"/>
+              <a:t> </a:t>
+            </a:r>
+            <a:r>
+              <a:rPr lang="en-US" dirty="0" smtClean="0"/>
+              <a:t>file</a:t>
+            </a:r>
+            <a:r>
+              <a:rPr lang="en-US" b="1" dirty="0" smtClean="0"/>
+              <a:t> </a:t>
+            </a:r>
+            <a:r>
+              <a:rPr lang="en-US" dirty="0" smtClean="0"/>
+              <a:t>contains all the </a:t>
+            </a:r>
+            <a:r>
+              <a:rPr lang="en-US" dirty="0" smtClean="0"/>
+              <a:t>threading </a:t>
+            </a:r>
+            <a:r>
+              <a:rPr lang="en-US" dirty="0" smtClean="0"/>
+              <a:t>configuration.</a:t>
+            </a:r>
+          </a:p>
+          <a:p>
+            <a:r>
+              <a:rPr lang="en-US" dirty="0" smtClean="0"/>
+              <a:t>Thread </a:t>
+            </a:r>
+            <a:r>
+              <a:rPr lang="en-US" dirty="0" smtClean="0"/>
+              <a:t>mapping is done in each SW component </a:t>
+            </a:r>
+            <a:r>
+              <a:rPr lang="en-US" dirty="0" err="1" smtClean="0"/>
+              <a:t>instanciated</a:t>
+            </a:r>
+            <a:r>
+              <a:rPr lang="en-US" dirty="0" smtClean="0"/>
+              <a:t> by the Robot2017 class.</a:t>
+            </a:r>
+            <a:endParaRPr lang="fr-FR" dirty="0"/>
+          </a:p>
+        </p:txBody>
+      </p:sp>
+      <p:sp>
+        <p:nvSpPr>
+          <p:cNvPr id="9" name="ZoneTexte 8"/>
+          <p:cNvSpPr txBox="1"/>
+          <p:nvPr/>
+        </p:nvSpPr>
+        <p:spPr>
+          <a:xfrm>
+            <a:off x="838200" y="5359692"/>
+            <a:ext cx="10337800" cy="646331"/>
+          </a:xfrm>
+          <a:prstGeom prst="rect">
+            <a:avLst/>
+          </a:prstGeom>
+          <a:noFill/>
+        </p:spPr>
+        <p:txBody>
+          <a:bodyPr wrap="square" rtlCol="0">
+            <a:spAutoFit/>
+          </a:bodyPr>
+          <a:lstStyle/>
+          <a:p>
+            <a:r>
+              <a:rPr lang="en-US" dirty="0" smtClean="0"/>
+              <a:t>Thread mapping should have been done in Robot2017.cpp </a:t>
+            </a:r>
+            <a:r>
+              <a:rPr lang="en-US" dirty="0"/>
+              <a:t>to decouple threading and functions. It would also help to have a synthetic view of </a:t>
+            </a:r>
+            <a:r>
+              <a:rPr lang="en-US" dirty="0" err="1"/>
+              <a:t>instanciated</a:t>
+            </a:r>
+            <a:r>
+              <a:rPr lang="en-US" dirty="0"/>
+              <a:t> threads and prevent the need for </a:t>
+            </a:r>
+            <a:r>
+              <a:rPr lang="en-US" dirty="0" err="1"/>
+              <a:t>K_thread_config.h</a:t>
+            </a:r>
+            <a:endParaRPr lang="fr-FR" dirty="0"/>
+          </a:p>
+        </p:txBody>
+      </p:sp>
     </p:spTree>
     <p:extLst>
       <p:ext uri="{BB962C8B-B14F-4D97-AF65-F5344CB8AC3E}">
-        <p14:creationId xmlns:p14="http://schemas.microsoft.com/office/powerpoint/2010/main" val="2684839572"/>
+        <p14:creationId xmlns:p14="http://schemas.microsoft.com/office/powerpoint/2010/main" val="617968583"/>
       </p:ext>
     </p:extLst>
   </p:cSld>
   <p:clrMapOvr>
     <a:masterClrMapping/>
   </p:clrMapOvr>
+  <p:timing>
+    <p:tnLst>
+      <p:par>
+        <p:cTn id="1" dur="indefinite" restart="never" nodeType="tmRoot"/>
+      </p:par>
+    </p:tnLst>
+  </p:timing>
 </p:sld>
 </file>
 

</xml_diff>

<commit_message>
Robot configuration rework, now accepts dynamic changes, Vizu upgraded to manage config
</commit_message>
<xml_diff>
--- a/docs/SwArchitecture.pptx
+++ b/docs/SwArchitecture.pptx
@@ -15,6 +15,7 @@
     <p:sldId id="259" r:id="rId9"/>
     <p:sldId id="266" r:id="rId10"/>
     <p:sldId id="265" r:id="rId11"/>
+    <p:sldId id="267" r:id="rId12"/>
   </p:sldIdLst>
   <p:sldSz cx="12192000" cy="6858000"/>
   <p:notesSz cx="6858000" cy="9144000"/>
@@ -250,7 +251,7 @@
           <a:p>
             <a:fld id="{2782ACDD-568A-4D5B-9A72-61F2F85B1323}" type="datetimeFigureOut">
               <a:rPr lang="fr-FR" smtClean="0"/>
-              <a:t>26/03/2017</a:t>
+              <a:t>01/04/2017</a:t>
             </a:fld>
             <a:endParaRPr lang="fr-FR"/>
           </a:p>
@@ -418,7 +419,7 @@
           <a:p>
             <a:fld id="{2782ACDD-568A-4D5B-9A72-61F2F85B1323}" type="datetimeFigureOut">
               <a:rPr lang="fr-FR" smtClean="0"/>
-              <a:t>26/03/2017</a:t>
+              <a:t>01/04/2017</a:t>
             </a:fld>
             <a:endParaRPr lang="fr-FR"/>
           </a:p>
@@ -596,7 +597,7 @@
           <a:p>
             <a:fld id="{2782ACDD-568A-4D5B-9A72-61F2F85B1323}" type="datetimeFigureOut">
               <a:rPr lang="fr-FR" smtClean="0"/>
-              <a:t>26/03/2017</a:t>
+              <a:t>01/04/2017</a:t>
             </a:fld>
             <a:endParaRPr lang="fr-FR"/>
           </a:p>
@@ -764,7 +765,7 @@
           <a:p>
             <a:fld id="{2782ACDD-568A-4D5B-9A72-61F2F85B1323}" type="datetimeFigureOut">
               <a:rPr lang="fr-FR" smtClean="0"/>
-              <a:t>26/03/2017</a:t>
+              <a:t>01/04/2017</a:t>
             </a:fld>
             <a:endParaRPr lang="fr-FR"/>
           </a:p>
@@ -1009,7 +1010,7 @@
           <a:p>
             <a:fld id="{2782ACDD-568A-4D5B-9A72-61F2F85B1323}" type="datetimeFigureOut">
               <a:rPr lang="fr-FR" smtClean="0"/>
-              <a:t>26/03/2017</a:t>
+              <a:t>01/04/2017</a:t>
             </a:fld>
             <a:endParaRPr lang="fr-FR"/>
           </a:p>
@@ -1238,7 +1239,7 @@
           <a:p>
             <a:fld id="{2782ACDD-568A-4D5B-9A72-61F2F85B1323}" type="datetimeFigureOut">
               <a:rPr lang="fr-FR" smtClean="0"/>
-              <a:t>26/03/2017</a:t>
+              <a:t>01/04/2017</a:t>
             </a:fld>
             <a:endParaRPr lang="fr-FR"/>
           </a:p>
@@ -1602,7 +1603,7 @@
           <a:p>
             <a:fld id="{2782ACDD-568A-4D5B-9A72-61F2F85B1323}" type="datetimeFigureOut">
               <a:rPr lang="fr-FR" smtClean="0"/>
-              <a:t>26/03/2017</a:t>
+              <a:t>01/04/2017</a:t>
             </a:fld>
             <a:endParaRPr lang="fr-FR"/>
           </a:p>
@@ -1719,7 +1720,7 @@
           <a:p>
             <a:fld id="{2782ACDD-568A-4D5B-9A72-61F2F85B1323}" type="datetimeFigureOut">
               <a:rPr lang="fr-FR" smtClean="0"/>
-              <a:t>26/03/2017</a:t>
+              <a:t>01/04/2017</a:t>
             </a:fld>
             <a:endParaRPr lang="fr-FR"/>
           </a:p>
@@ -1814,7 +1815,7 @@
           <a:p>
             <a:fld id="{2782ACDD-568A-4D5B-9A72-61F2F85B1323}" type="datetimeFigureOut">
               <a:rPr lang="fr-FR" smtClean="0"/>
-              <a:t>26/03/2017</a:t>
+              <a:t>01/04/2017</a:t>
             </a:fld>
             <a:endParaRPr lang="fr-FR"/>
           </a:p>
@@ -2089,7 +2090,7 @@
           <a:p>
             <a:fld id="{2782ACDD-568A-4D5B-9A72-61F2F85B1323}" type="datetimeFigureOut">
               <a:rPr lang="fr-FR" smtClean="0"/>
-              <a:t>26/03/2017</a:t>
+              <a:t>01/04/2017</a:t>
             </a:fld>
             <a:endParaRPr lang="fr-FR"/>
           </a:p>
@@ -2341,7 +2342,7 @@
           <a:p>
             <a:fld id="{2782ACDD-568A-4D5B-9A72-61F2F85B1323}" type="datetimeFigureOut">
               <a:rPr lang="fr-FR" smtClean="0"/>
-              <a:t>26/03/2017</a:t>
+              <a:t>01/04/2017</a:t>
             </a:fld>
             <a:endParaRPr lang="fr-FR"/>
           </a:p>
@@ -2552,7 +2553,7 @@
           <a:p>
             <a:fld id="{2782ACDD-568A-4D5B-9A72-61F2F85B1323}" type="datetimeFigureOut">
               <a:rPr lang="fr-FR" smtClean="0"/>
-              <a:t>26/03/2017</a:t>
+              <a:t>01/04/2017</a:t>
             </a:fld>
             <a:endParaRPr lang="fr-FR"/>
           </a:p>
@@ -3467,6 +3468,365 @@
 </p:sld>
 </file>
 
+<file path=ppt/slides/slide11.xml><?xml version="1.0" encoding="utf-8"?>
+<p:sld xmlns:a="http://schemas.openxmlformats.org/drawingml/2006/main" xmlns:r="http://schemas.openxmlformats.org/officeDocument/2006/relationships" xmlns:p="http://schemas.openxmlformats.org/presentationml/2006/main">
+  <p:cSld>
+    <p:spTree>
+      <p:nvGrpSpPr>
+        <p:cNvPr id="1" name=""/>
+        <p:cNvGrpSpPr/>
+        <p:nvPr/>
+      </p:nvGrpSpPr>
+      <p:grpSpPr>
+        <a:xfrm>
+          <a:off x="0" y="0"/>
+          <a:ext cx="0" cy="0"/>
+          <a:chOff x="0" y="0"/>
+          <a:chExt cx="0" cy="0"/>
+        </a:xfrm>
+      </p:grpSpPr>
+      <p:sp>
+        <p:nvSpPr>
+          <p:cNvPr id="2" name="Titre 1"/>
+          <p:cNvSpPr>
+            <a:spLocks noGrp="1"/>
+          </p:cNvSpPr>
+          <p:nvPr>
+            <p:ph type="title"/>
+          </p:nvPr>
+        </p:nvSpPr>
+        <p:spPr/>
+        <p:txBody>
+          <a:bodyPr/>
+          <a:lstStyle/>
+          <a:p>
+            <a:r>
+              <a:rPr lang="en-US" dirty="0" smtClean="0"/>
+              <a:t>Equations</a:t>
+            </a:r>
+            <a:endParaRPr lang="fr-FR" dirty="0"/>
+          </a:p>
+        </p:txBody>
+      </p:sp>
+      <p:sp>
+        <p:nvSpPr>
+          <p:cNvPr id="3" name="Espace réservé du contenu 2"/>
+          <p:cNvSpPr>
+            <a:spLocks noGrp="1"/>
+          </p:cNvSpPr>
+          <p:nvPr>
+            <p:ph idx="1"/>
+          </p:nvPr>
+        </p:nvSpPr>
+        <p:spPr/>
+        <p:txBody>
+          <a:bodyPr>
+            <a:normAutofit fontScale="77500" lnSpcReduction="20000"/>
+          </a:bodyPr>
+          <a:lstStyle/>
+          <a:p>
+            <a:pPr marL="0" indent="0">
+              <a:buNone/>
+            </a:pPr>
+            <a:r>
+              <a:rPr lang="en-US" dirty="0" smtClean="0"/>
+              <a:t>Command to Motor :</a:t>
+            </a:r>
+          </a:p>
+          <a:p>
+            <a:r>
+              <a:rPr lang="en-US" dirty="0" err="1" smtClean="0">
+                <a:solidFill>
+                  <a:schemeClr val="accent1"/>
+                </a:solidFill>
+              </a:rPr>
+              <a:t>Step_r</a:t>
+            </a:r>
+            <a:r>
+              <a:rPr lang="en-US" dirty="0" smtClean="0">
+                <a:solidFill>
+                  <a:schemeClr val="accent1"/>
+                </a:solidFill>
+              </a:rPr>
+              <a:t> = (ds + </a:t>
+            </a:r>
+            <a:r>
+              <a:rPr lang="en-US" dirty="0" err="1" smtClean="0">
+                <a:solidFill>
+                  <a:schemeClr val="accent1"/>
+                </a:solidFill>
+              </a:rPr>
+              <a:t>E.dh</a:t>
+            </a:r>
+            <a:r>
+              <a:rPr lang="en-US" dirty="0" smtClean="0">
+                <a:solidFill>
+                  <a:schemeClr val="accent1"/>
+                </a:solidFill>
+              </a:rPr>
+              <a:t>)/</a:t>
+            </a:r>
+            <a:r>
+              <a:rPr lang="en-US" dirty="0" err="1" smtClean="0">
+                <a:solidFill>
+                  <a:schemeClr val="accent1"/>
+                </a:solidFill>
+              </a:rPr>
+              <a:t>gain_r</a:t>
+            </a:r>
+            <a:endParaRPr lang="en-US" dirty="0" smtClean="0">
+              <a:solidFill>
+                <a:schemeClr val="accent1"/>
+              </a:solidFill>
+            </a:endParaRPr>
+          </a:p>
+          <a:p>
+            <a:r>
+              <a:rPr lang="en-US" dirty="0" err="1" smtClean="0">
+                <a:solidFill>
+                  <a:schemeClr val="accent1"/>
+                </a:solidFill>
+              </a:rPr>
+              <a:t>Step_l</a:t>
+            </a:r>
+            <a:r>
+              <a:rPr lang="en-US" dirty="0" smtClean="0">
+                <a:solidFill>
+                  <a:schemeClr val="accent1"/>
+                </a:solidFill>
+              </a:rPr>
+              <a:t> = (ds - </a:t>
+            </a:r>
+            <a:r>
+              <a:rPr lang="en-US" dirty="0" err="1" smtClean="0">
+                <a:solidFill>
+                  <a:schemeClr val="accent1"/>
+                </a:solidFill>
+              </a:rPr>
+              <a:t>E.dh</a:t>
+            </a:r>
+            <a:r>
+              <a:rPr lang="en-US" dirty="0" smtClean="0">
+                <a:solidFill>
+                  <a:schemeClr val="accent1"/>
+                </a:solidFill>
+              </a:rPr>
+              <a:t>)/</a:t>
+            </a:r>
+            <a:r>
+              <a:rPr lang="en-US" dirty="0" err="1" smtClean="0">
+                <a:solidFill>
+                  <a:schemeClr val="accent1"/>
+                </a:solidFill>
+              </a:rPr>
+              <a:t>gain_l</a:t>
+            </a:r>
+            <a:endParaRPr lang="en-US" dirty="0" smtClean="0">
+              <a:solidFill>
+                <a:schemeClr val="accent1"/>
+              </a:solidFill>
+            </a:endParaRPr>
+          </a:p>
+          <a:p>
+            <a:pPr marL="457200" lvl="1" indent="0">
+              <a:buNone/>
+            </a:pPr>
+            <a:endParaRPr lang="en-US" dirty="0" smtClean="0"/>
+          </a:p>
+          <a:p>
+            <a:pPr marL="0" indent="0">
+              <a:buNone/>
+            </a:pPr>
+            <a:r>
+              <a:rPr lang="en-US" dirty="0" smtClean="0"/>
+              <a:t>Motor to position :</a:t>
+            </a:r>
+          </a:p>
+          <a:p>
+            <a:r>
+              <a:rPr lang="en-US" dirty="0">
+                <a:solidFill>
+                  <a:schemeClr val="accent1"/>
+                </a:solidFill>
+              </a:rPr>
+              <a:t>d</a:t>
+            </a:r>
+            <a:r>
+              <a:rPr lang="en-US" dirty="0" smtClean="0">
+                <a:solidFill>
+                  <a:schemeClr val="accent1"/>
+                </a:solidFill>
+              </a:rPr>
+              <a:t>s = (</a:t>
+            </a:r>
+            <a:r>
+              <a:rPr lang="en-US" dirty="0" err="1" smtClean="0">
+                <a:solidFill>
+                  <a:schemeClr val="accent1"/>
+                </a:solidFill>
+              </a:rPr>
+              <a:t>Step_r.gain_r</a:t>
+            </a:r>
+            <a:r>
+              <a:rPr lang="en-US" dirty="0" smtClean="0">
+                <a:solidFill>
+                  <a:schemeClr val="accent1"/>
+                </a:solidFill>
+              </a:rPr>
+              <a:t> + </a:t>
+            </a:r>
+            <a:r>
+              <a:rPr lang="en-US" dirty="0" err="1" smtClean="0">
+                <a:solidFill>
+                  <a:schemeClr val="accent1"/>
+                </a:solidFill>
+              </a:rPr>
+              <a:t>Step_l.gain_l</a:t>
+            </a:r>
+            <a:r>
+              <a:rPr lang="en-US" dirty="0" smtClean="0">
+                <a:solidFill>
+                  <a:schemeClr val="accent1"/>
+                </a:solidFill>
+              </a:rPr>
+              <a:t>)/2</a:t>
+            </a:r>
+          </a:p>
+          <a:p>
+            <a:r>
+              <a:rPr lang="en-US" dirty="0">
+                <a:solidFill>
+                  <a:schemeClr val="accent1"/>
+                </a:solidFill>
+              </a:rPr>
+              <a:t>d</a:t>
+            </a:r>
+            <a:r>
+              <a:rPr lang="en-US" dirty="0" smtClean="0">
+                <a:solidFill>
+                  <a:schemeClr val="accent1"/>
+                </a:solidFill>
+              </a:rPr>
+              <a:t>h = (</a:t>
+            </a:r>
+            <a:r>
+              <a:rPr lang="en-US" dirty="0" err="1" smtClean="0">
+                <a:solidFill>
+                  <a:schemeClr val="accent1"/>
+                </a:solidFill>
+              </a:rPr>
+              <a:t>Step_r.gain_r</a:t>
+            </a:r>
+            <a:r>
+              <a:rPr lang="en-US" dirty="0" smtClean="0">
+                <a:solidFill>
+                  <a:schemeClr val="accent1"/>
+                </a:solidFill>
+              </a:rPr>
+              <a:t> – </a:t>
+            </a:r>
+            <a:r>
+              <a:rPr lang="en-US" dirty="0" err="1" smtClean="0">
+                <a:solidFill>
+                  <a:schemeClr val="accent1"/>
+                </a:solidFill>
+              </a:rPr>
+              <a:t>Step_l.gain_l</a:t>
+            </a:r>
+            <a:r>
+              <a:rPr lang="en-US" dirty="0" smtClean="0">
+                <a:solidFill>
+                  <a:schemeClr val="accent1"/>
+                </a:solidFill>
+              </a:rPr>
+              <a:t>)/(2.E)</a:t>
+            </a:r>
+          </a:p>
+          <a:p>
+            <a:pPr marL="0" indent="0">
+              <a:buNone/>
+            </a:pPr>
+            <a:endParaRPr lang="en-US" dirty="0"/>
+          </a:p>
+          <a:p>
+            <a:pPr marL="0" indent="0">
+              <a:buNone/>
+            </a:pPr>
+            <a:r>
+              <a:rPr lang="en-US" dirty="0" smtClean="0"/>
+              <a:t>With </a:t>
+            </a:r>
+            <a:r>
+              <a:rPr lang="en-US" dirty="0"/>
+              <a:t>:</a:t>
+            </a:r>
+          </a:p>
+          <a:p>
+            <a:pPr lvl="1"/>
+            <a:r>
+              <a:rPr lang="en-US" dirty="0" err="1"/>
+              <a:t>gain_x</a:t>
+            </a:r>
+            <a:r>
+              <a:rPr lang="en-US" dirty="0"/>
+              <a:t> in mm/steps (includes the wheel diameter)</a:t>
+            </a:r>
+          </a:p>
+          <a:p>
+            <a:pPr lvl="1"/>
+            <a:r>
+              <a:rPr lang="en-US" dirty="0"/>
+              <a:t>E space between wheels</a:t>
+            </a:r>
+          </a:p>
+          <a:p>
+            <a:pPr lvl="1"/>
+            <a:r>
+              <a:rPr lang="en-US" dirty="0" err="1"/>
+              <a:t>ds,dh</a:t>
+            </a:r>
+            <a:r>
+              <a:rPr lang="en-US" dirty="0"/>
+              <a:t> the distance/heading </a:t>
+            </a:r>
+            <a:r>
+              <a:rPr lang="en-US" dirty="0" smtClean="0"/>
+              <a:t>change between 2 computations</a:t>
+            </a:r>
+          </a:p>
+          <a:p>
+            <a:pPr lvl="1"/>
+            <a:r>
+              <a:rPr lang="en-US" dirty="0" err="1" smtClean="0"/>
+              <a:t>Step_x</a:t>
+            </a:r>
+            <a:r>
+              <a:rPr lang="en-US" dirty="0" smtClean="0"/>
+              <a:t> the step count between 2 computations</a:t>
+            </a:r>
+            <a:endParaRPr lang="en-US" dirty="0"/>
+          </a:p>
+          <a:p>
+            <a:pPr marL="0" indent="0">
+              <a:buNone/>
+            </a:pPr>
+            <a:endParaRPr lang="fr-FR" dirty="0"/>
+          </a:p>
+        </p:txBody>
+      </p:sp>
+    </p:spTree>
+    <p:extLst>
+      <p:ext uri="{BB962C8B-B14F-4D97-AF65-F5344CB8AC3E}">
+        <p14:creationId xmlns:p14="http://schemas.microsoft.com/office/powerpoint/2010/main" val="1650193998"/>
+      </p:ext>
+    </p:extLst>
+  </p:cSld>
+  <p:clrMapOvr>
+    <a:masterClrMapping/>
+  </p:clrMapOvr>
+</p:sld>
+</file>
+
 <file path=ppt/slides/slide2.xml><?xml version="1.0" encoding="utf-8"?>
 <p:sld xmlns:a="http://schemas.openxmlformats.org/drawingml/2006/main" xmlns:r="http://schemas.openxmlformats.org/officeDocument/2006/relationships" xmlns:p="http://schemas.openxmlformats.org/presentationml/2006/main">
   <p:cSld>
@@ -5948,14 +6308,14 @@
                 <a:gridCol w="2843689">
                   <a:extLst>
                     <a:ext uri="{9D8B030D-6E8A-4147-A177-3AD203B41FA5}">
-                      <a16:colId xmlns:a16="http://schemas.microsoft.com/office/drawing/2014/main" xmlns="" val="4249046580"/>
+                      <a16:colId xmlns="" xmlns:a16="http://schemas.microsoft.com/office/drawing/2014/main" val="4249046580"/>
                     </a:ext>
                   </a:extLst>
                 </a:gridCol>
                 <a:gridCol w="7116439">
                   <a:extLst>
                     <a:ext uri="{9D8B030D-6E8A-4147-A177-3AD203B41FA5}">
-                      <a16:colId xmlns:a16="http://schemas.microsoft.com/office/drawing/2014/main" xmlns="" val="2166689304"/>
+                      <a16:colId xmlns="" xmlns:a16="http://schemas.microsoft.com/office/drawing/2014/main" val="2166689304"/>
                     </a:ext>
                   </a:extLst>
                 </a:gridCol>
@@ -5991,7 +6351,7 @@
                 </a:tc>
                 <a:extLst>
                   <a:ext uri="{0D108BD9-81ED-4DB2-BD59-A6C34878D82A}">
-                    <a16:rowId xmlns:a16="http://schemas.microsoft.com/office/drawing/2014/main" xmlns="" val="1558262199"/>
+                    <a16:rowId xmlns="" xmlns:a16="http://schemas.microsoft.com/office/drawing/2014/main" val="1558262199"/>
                   </a:ext>
                 </a:extLst>
               </a:tr>
@@ -6030,7 +6390,7 @@
                 </a:tc>
                 <a:extLst>
                   <a:ext uri="{0D108BD9-81ED-4DB2-BD59-A6C34878D82A}">
-                    <a16:rowId xmlns:a16="http://schemas.microsoft.com/office/drawing/2014/main" xmlns="" val="3975330181"/>
+                    <a16:rowId xmlns="" xmlns:a16="http://schemas.microsoft.com/office/drawing/2014/main" val="3975330181"/>
                   </a:ext>
                 </a:extLst>
               </a:tr>
@@ -6111,7 +6471,7 @@
                 </a:tc>
                 <a:extLst>
                   <a:ext uri="{0D108BD9-81ED-4DB2-BD59-A6C34878D82A}">
-                    <a16:rowId xmlns:a16="http://schemas.microsoft.com/office/drawing/2014/main" xmlns="" val="145727790"/>
+                    <a16:rowId xmlns="" xmlns:a16="http://schemas.microsoft.com/office/drawing/2014/main" val="145727790"/>
                   </a:ext>
                 </a:extLst>
               </a:tr>
@@ -6162,7 +6522,7 @@
                 </a:tc>
                 <a:extLst>
                   <a:ext uri="{0D108BD9-81ED-4DB2-BD59-A6C34878D82A}">
-                    <a16:rowId xmlns:a16="http://schemas.microsoft.com/office/drawing/2014/main" xmlns="" val="1909270051"/>
+                    <a16:rowId xmlns="" xmlns:a16="http://schemas.microsoft.com/office/drawing/2014/main" val="1909270051"/>
                   </a:ext>
                 </a:extLst>
               </a:tr>
@@ -6225,7 +6585,7 @@
                 </a:tc>
                 <a:extLst>
                   <a:ext uri="{0D108BD9-81ED-4DB2-BD59-A6C34878D82A}">
-                    <a16:rowId xmlns:a16="http://schemas.microsoft.com/office/drawing/2014/main" xmlns="" val="1361958173"/>
+                    <a16:rowId xmlns="" xmlns:a16="http://schemas.microsoft.com/office/drawing/2014/main" val="1361958173"/>
                   </a:ext>
                 </a:extLst>
               </a:tr>
@@ -6777,14 +7137,14 @@
                 <a:gridCol w="2843689">
                   <a:extLst>
                     <a:ext uri="{9D8B030D-6E8A-4147-A177-3AD203B41FA5}">
-                      <a16:colId xmlns:a16="http://schemas.microsoft.com/office/drawing/2014/main" xmlns="" val="4249046580"/>
+                      <a16:colId xmlns="" xmlns:a16="http://schemas.microsoft.com/office/drawing/2014/main" val="4249046580"/>
                     </a:ext>
                   </a:extLst>
                 </a:gridCol>
                 <a:gridCol w="7116439">
                   <a:extLst>
                     <a:ext uri="{9D8B030D-6E8A-4147-A177-3AD203B41FA5}">
-                      <a16:colId xmlns:a16="http://schemas.microsoft.com/office/drawing/2014/main" xmlns="" val="2166689304"/>
+                      <a16:colId xmlns="" xmlns:a16="http://schemas.microsoft.com/office/drawing/2014/main" val="2166689304"/>
                     </a:ext>
                   </a:extLst>
                 </a:gridCol>
@@ -6820,7 +7180,7 @@
                 </a:tc>
                 <a:extLst>
                   <a:ext uri="{0D108BD9-81ED-4DB2-BD59-A6C34878D82A}">
-                    <a16:rowId xmlns:a16="http://schemas.microsoft.com/office/drawing/2014/main" xmlns="" val="1558262199"/>
+                    <a16:rowId xmlns="" xmlns:a16="http://schemas.microsoft.com/office/drawing/2014/main" val="1558262199"/>
                   </a:ext>
                 </a:extLst>
               </a:tr>
@@ -6877,7 +7237,7 @@
                 </a:tc>
                 <a:extLst>
                   <a:ext uri="{0D108BD9-81ED-4DB2-BD59-A6C34878D82A}">
-                    <a16:rowId xmlns:a16="http://schemas.microsoft.com/office/drawing/2014/main" xmlns="" val="3975330181"/>
+                    <a16:rowId xmlns="" xmlns:a16="http://schemas.microsoft.com/office/drawing/2014/main" val="3975330181"/>
                   </a:ext>
                 </a:extLst>
               </a:tr>
@@ -6990,7 +7350,7 @@
                 </a:tc>
                 <a:extLst>
                   <a:ext uri="{0D108BD9-81ED-4DB2-BD59-A6C34878D82A}">
-                    <a16:rowId xmlns:a16="http://schemas.microsoft.com/office/drawing/2014/main" xmlns="" val="145727790"/>
+                    <a16:rowId xmlns="" xmlns:a16="http://schemas.microsoft.com/office/drawing/2014/main" val="145727790"/>
                   </a:ext>
                 </a:extLst>
               </a:tr>
@@ -7033,7 +7393,7 @@
                 </a:tc>
                 <a:extLst>
                   <a:ext uri="{0D108BD9-81ED-4DB2-BD59-A6C34878D82A}">
-                    <a16:rowId xmlns:a16="http://schemas.microsoft.com/office/drawing/2014/main" xmlns="" val="1909270051"/>
+                    <a16:rowId xmlns="" xmlns:a16="http://schemas.microsoft.com/office/drawing/2014/main" val="1909270051"/>
                   </a:ext>
                 </a:extLst>
               </a:tr>
@@ -7068,7 +7428,7 @@
                 </a:tc>
                 <a:extLst>
                   <a:ext uri="{0D108BD9-81ED-4DB2-BD59-A6C34878D82A}">
-                    <a16:rowId xmlns:a16="http://schemas.microsoft.com/office/drawing/2014/main" xmlns="" val="1361958173"/>
+                    <a16:rowId xmlns="" xmlns:a16="http://schemas.microsoft.com/office/drawing/2014/main" val="1361958173"/>
                   </a:ext>
                 </a:extLst>
               </a:tr>
@@ -8483,14 +8843,14 @@
                 <a:gridCol w="2843689">
                   <a:extLst>
                     <a:ext uri="{9D8B030D-6E8A-4147-A177-3AD203B41FA5}">
-                      <a16:colId xmlns:a16="http://schemas.microsoft.com/office/drawing/2014/main" xmlns="" val="4249046580"/>
+                      <a16:colId xmlns="" xmlns:a16="http://schemas.microsoft.com/office/drawing/2014/main" val="4249046580"/>
                     </a:ext>
                   </a:extLst>
                 </a:gridCol>
                 <a:gridCol w="7116439">
                   <a:extLst>
                     <a:ext uri="{9D8B030D-6E8A-4147-A177-3AD203B41FA5}">
-                      <a16:colId xmlns:a16="http://schemas.microsoft.com/office/drawing/2014/main" xmlns="" val="2166689304"/>
+                      <a16:colId xmlns="" xmlns:a16="http://schemas.microsoft.com/office/drawing/2014/main" val="2166689304"/>
                     </a:ext>
                   </a:extLst>
                 </a:gridCol>
@@ -8526,7 +8886,7 @@
                 </a:tc>
                 <a:extLst>
                   <a:ext uri="{0D108BD9-81ED-4DB2-BD59-A6C34878D82A}">
-                    <a16:rowId xmlns:a16="http://schemas.microsoft.com/office/drawing/2014/main" xmlns="" val="1558262199"/>
+                    <a16:rowId xmlns="" xmlns:a16="http://schemas.microsoft.com/office/drawing/2014/main" val="1558262199"/>
                   </a:ext>
                 </a:extLst>
               </a:tr>
@@ -8573,7 +8933,7 @@
                 </a:tc>
                 <a:extLst>
                   <a:ext uri="{0D108BD9-81ED-4DB2-BD59-A6C34878D82A}">
-                    <a16:rowId xmlns:a16="http://schemas.microsoft.com/office/drawing/2014/main" xmlns="" val="3975330181"/>
+                    <a16:rowId xmlns="" xmlns:a16="http://schemas.microsoft.com/office/drawing/2014/main" val="3975330181"/>
                   </a:ext>
                 </a:extLst>
               </a:tr>
@@ -8654,7 +9014,7 @@
                 </a:tc>
                 <a:extLst>
                   <a:ext uri="{0D108BD9-81ED-4DB2-BD59-A6C34878D82A}">
-                    <a16:rowId xmlns:a16="http://schemas.microsoft.com/office/drawing/2014/main" xmlns="" val="145727790"/>
+                    <a16:rowId xmlns="" xmlns:a16="http://schemas.microsoft.com/office/drawing/2014/main" val="145727790"/>
                   </a:ext>
                 </a:extLst>
               </a:tr>
@@ -8689,7 +9049,7 @@
                 </a:tc>
                 <a:extLst>
                   <a:ext uri="{0D108BD9-81ED-4DB2-BD59-A6C34878D82A}">
-                    <a16:rowId xmlns:a16="http://schemas.microsoft.com/office/drawing/2014/main" xmlns="" val="1909270051"/>
+                    <a16:rowId xmlns="" xmlns:a16="http://schemas.microsoft.com/office/drawing/2014/main" val="1909270051"/>
                   </a:ext>
                 </a:extLst>
               </a:tr>
@@ -8743,7 +9103,7 @@
                 </a:tc>
                 <a:extLst>
                   <a:ext uri="{0D108BD9-81ED-4DB2-BD59-A6C34878D82A}">
-                    <a16:rowId xmlns:a16="http://schemas.microsoft.com/office/drawing/2014/main" xmlns="" val="1361958173"/>
+                    <a16:rowId xmlns="" xmlns:a16="http://schemas.microsoft.com/office/drawing/2014/main" val="1361958173"/>
                   </a:ext>
                 </a:extLst>
               </a:tr>
@@ -8958,14 +9318,14 @@
                 <a:gridCol w="2843689">
                   <a:extLst>
                     <a:ext uri="{9D8B030D-6E8A-4147-A177-3AD203B41FA5}">
-                      <a16:colId xmlns:a16="http://schemas.microsoft.com/office/drawing/2014/main" xmlns="" val="4249046580"/>
+                      <a16:colId xmlns="" xmlns:a16="http://schemas.microsoft.com/office/drawing/2014/main" val="4249046580"/>
                     </a:ext>
                   </a:extLst>
                 </a:gridCol>
                 <a:gridCol w="7116439">
                   <a:extLst>
                     <a:ext uri="{9D8B030D-6E8A-4147-A177-3AD203B41FA5}">
-                      <a16:colId xmlns:a16="http://schemas.microsoft.com/office/drawing/2014/main" xmlns="" val="2166689304"/>
+                      <a16:colId xmlns="" xmlns:a16="http://schemas.microsoft.com/office/drawing/2014/main" val="2166689304"/>
                     </a:ext>
                   </a:extLst>
                 </a:gridCol>
@@ -9001,7 +9361,7 @@
                 </a:tc>
                 <a:extLst>
                   <a:ext uri="{0D108BD9-81ED-4DB2-BD59-A6C34878D82A}">
-                    <a16:rowId xmlns:a16="http://schemas.microsoft.com/office/drawing/2014/main" xmlns="" val="1558262199"/>
+                    <a16:rowId xmlns="" xmlns:a16="http://schemas.microsoft.com/office/drawing/2014/main" val="1558262199"/>
                   </a:ext>
                 </a:extLst>
               </a:tr>
@@ -9040,7 +9400,7 @@
                 </a:tc>
                 <a:extLst>
                   <a:ext uri="{0D108BD9-81ED-4DB2-BD59-A6C34878D82A}">
-                    <a16:rowId xmlns:a16="http://schemas.microsoft.com/office/drawing/2014/main" xmlns="" val="3975330181"/>
+                    <a16:rowId xmlns="" xmlns:a16="http://schemas.microsoft.com/office/drawing/2014/main" val="3975330181"/>
                   </a:ext>
                 </a:extLst>
               </a:tr>
@@ -9109,7 +9469,7 @@
                 </a:tc>
                 <a:extLst>
                   <a:ext uri="{0D108BD9-81ED-4DB2-BD59-A6C34878D82A}">
-                    <a16:rowId xmlns:a16="http://schemas.microsoft.com/office/drawing/2014/main" xmlns="" val="145727790"/>
+                    <a16:rowId xmlns="" xmlns:a16="http://schemas.microsoft.com/office/drawing/2014/main" val="145727790"/>
                   </a:ext>
                 </a:extLst>
               </a:tr>
@@ -9164,7 +9524,7 @@
                 </a:tc>
                 <a:extLst>
                   <a:ext uri="{0D108BD9-81ED-4DB2-BD59-A6C34878D82A}">
-                    <a16:rowId xmlns:a16="http://schemas.microsoft.com/office/drawing/2014/main" xmlns="" val="1909270051"/>
+                    <a16:rowId xmlns="" xmlns:a16="http://schemas.microsoft.com/office/drawing/2014/main" val="1909270051"/>
                   </a:ext>
                 </a:extLst>
               </a:tr>
@@ -10055,27 +10415,14 @@
             </a:r>
             <a:r>
               <a:rPr lang="en-US" dirty="0" smtClean="0"/>
-              <a:t>contains all the </a:t>
-            </a:r>
+              <a:t>contains all the interrupt configuration.</a:t>
+            </a:r>
+          </a:p>
+          <a:p>
             <a:r>
               <a:rPr lang="en-US" dirty="0" smtClean="0"/>
-              <a:t>interrupt </a:t>
-            </a:r>
-            <a:r>
-              <a:rPr lang="en-US" dirty="0" smtClean="0"/>
-              <a:t>configuration.</a:t>
-            </a:r>
-          </a:p>
-          <a:p>
-            <a:r>
-              <a:rPr lang="en-US" dirty="0" smtClean="0"/>
-              <a:t>The Robot2017.cpp file contains most of interrupts mapping</a:t>
-            </a:r>
-            <a:r>
-              <a:rPr lang="en-US" dirty="0" smtClean="0"/>
-              <a:t>.</a:t>
-            </a:r>
-            <a:endParaRPr lang="en-US" dirty="0" smtClean="0"/>
+              <a:t>The Robot2017.cpp file contains most of interrupts mapping.</a:t>
+            </a:r>
           </a:p>
         </p:txBody>
       </p:sp>
@@ -11022,25 +11369,13 @@
             </a:r>
             <a:r>
               <a:rPr lang="en-US" dirty="0" smtClean="0"/>
-              <a:t>contains all the </a:t>
-            </a:r>
+              <a:t>contains all the threading configuration.</a:t>
+            </a:r>
+          </a:p>
+          <a:p>
             <a:r>
               <a:rPr lang="en-US" dirty="0" smtClean="0"/>
-              <a:t>threading </a:t>
-            </a:r>
-            <a:r>
-              <a:rPr lang="en-US" dirty="0" smtClean="0"/>
-              <a:t>configuration.</a:t>
-            </a:r>
-          </a:p>
-          <a:p>
-            <a:r>
-              <a:rPr lang="en-US" dirty="0" smtClean="0"/>
-              <a:t>Thread </a:t>
-            </a:r>
-            <a:r>
-              <a:rPr lang="en-US" dirty="0" smtClean="0"/>
-              <a:t>mapping is done in each SW component </a:t>
+              <a:t>Thread mapping is done in each SW component </a:t>
             </a:r>
             <a:r>
               <a:rPr lang="en-US" dirty="0" err="1" smtClean="0"/>

</xml_diff>